<commit_message>
adding pics / changing text / changing pic  names
</commit_message>
<xml_diff>
--- a/docs/_static/images/tutorial_fig_2017_medium.pptx
+++ b/docs/_static/images/tutorial_fig_2017_medium.pptx
@@ -5,10 +5,36 @@
     <p:sldMasterId id="2147483648" r:id="rId1"/>
   </p:sldMasterIdLst>
   <p:notesMasterIdLst>
-    <p:notesMasterId r:id="rId3"/>
+    <p:notesMasterId r:id="rId29"/>
   </p:notesMasterIdLst>
   <p:sldIdLst>
-    <p:sldId id="256" r:id="rId2"/>
+    <p:sldId id="274" r:id="rId2"/>
+    <p:sldId id="275" r:id="rId3"/>
+    <p:sldId id="276" r:id="rId4"/>
+    <p:sldId id="277" r:id="rId5"/>
+    <p:sldId id="278" r:id="rId6"/>
+    <p:sldId id="279" r:id="rId7"/>
+    <p:sldId id="280" r:id="rId8"/>
+    <p:sldId id="281" r:id="rId9"/>
+    <p:sldId id="283" r:id="rId10"/>
+    <p:sldId id="282" r:id="rId11"/>
+    <p:sldId id="284" r:id="rId12"/>
+    <p:sldId id="285" r:id="rId13"/>
+    <p:sldId id="286" r:id="rId14"/>
+    <p:sldId id="288" r:id="rId15"/>
+    <p:sldId id="287" r:id="rId16"/>
+    <p:sldId id="289" r:id="rId17"/>
+    <p:sldId id="290" r:id="rId18"/>
+    <p:sldId id="291" r:id="rId19"/>
+    <p:sldId id="292" r:id="rId20"/>
+    <p:sldId id="293" r:id="rId21"/>
+    <p:sldId id="294" r:id="rId22"/>
+    <p:sldId id="295" r:id="rId23"/>
+    <p:sldId id="296" r:id="rId24"/>
+    <p:sldId id="297" r:id="rId25"/>
+    <p:sldId id="298" r:id="rId26"/>
+    <p:sldId id="299" r:id="rId27"/>
+    <p:sldId id="300" r:id="rId28"/>
   </p:sldIdLst>
   <p:sldSz cx="6859588" cy="3960813"/>
   <p:notesSz cx="6858000" cy="9144000"/>
@@ -107,6 +133,22 @@
       </a:defRPr>
     </a:lvl9pPr>
   </p:defaultTextStyle>
+  <p:extLst>
+    <p:ext uri="{EFAFB233-063F-42B5-8137-9DF3F51BA10A}">
+      <p15:sldGuideLst xmlns:p15="http://schemas.microsoft.com/office/powerpoint/2012/main">
+        <p15:guide id="1" orient="horz" pos="1248">
+          <p15:clr>
+            <a:srgbClr val="A4A3A4"/>
+          </p15:clr>
+        </p15:guide>
+        <p15:guide id="2" pos="2161">
+          <p15:clr>
+            <a:srgbClr val="A4A3A4"/>
+          </p15:clr>
+        </p15:guide>
+      </p15:sldGuideLst>
+    </p:ext>
+  </p:extLst>
 </p:presentation>
 </file>
 
@@ -192,7 +234,7 @@
           <a:p>
             <a:fld id="{0BFDEB59-2AE6-43B2-B23B-9934E14E8D33}" type="datetimeFigureOut">
               <a:rPr lang="en-US" smtClean="0"/>
-              <a:t>2017-03-14</a:t>
+              <a:t>2021-12-07</a:t>
             </a:fld>
             <a:endParaRPr lang="en-US"/>
           </a:p>
@@ -256,38 +298,37 @@
           <a:p>
             <a:pPr lvl="0"/>
             <a:r>
-              <a:rPr lang="en-US" smtClean="0"/>
+              <a:rPr lang="en-US"/>
               <a:t>Click to edit Master text styles</a:t>
             </a:r>
           </a:p>
           <a:p>
             <a:pPr lvl="1"/>
             <a:r>
-              <a:rPr lang="en-US" smtClean="0"/>
+              <a:rPr lang="en-US"/>
               <a:t>Second level</a:t>
             </a:r>
           </a:p>
           <a:p>
             <a:pPr lvl="2"/>
             <a:r>
-              <a:rPr lang="en-US" smtClean="0"/>
+              <a:rPr lang="en-US"/>
               <a:t>Third level</a:t>
             </a:r>
           </a:p>
           <a:p>
             <a:pPr lvl="3"/>
             <a:r>
-              <a:rPr lang="en-US" smtClean="0"/>
+              <a:rPr lang="en-US"/>
               <a:t>Fourth level</a:t>
             </a:r>
           </a:p>
           <a:p>
             <a:pPr lvl="4"/>
             <a:r>
-              <a:rPr lang="en-US" smtClean="0"/>
+              <a:rPr lang="en-US"/>
               <a:t>Fifth level</a:t>
             </a:r>
-            <a:endParaRPr lang="en-US"/>
           </a:p>
         </p:txBody>
       </p:sp>
@@ -460,94 +501,6 @@
 </p:notesMaster>
 </file>
 
-<file path=ppt/notesSlides/notesSlide1.xml><?xml version="1.0" encoding="utf-8"?>
-<p:notes xmlns:a="http://schemas.openxmlformats.org/drawingml/2006/main" xmlns:r="http://schemas.openxmlformats.org/officeDocument/2006/relationships" xmlns:p="http://schemas.openxmlformats.org/presentationml/2006/main">
-  <p:cSld>
-    <p:spTree>
-      <p:nvGrpSpPr>
-        <p:cNvPr id="1" name=""/>
-        <p:cNvGrpSpPr/>
-        <p:nvPr/>
-      </p:nvGrpSpPr>
-      <p:grpSpPr>
-        <a:xfrm>
-          <a:off x="0" y="0"/>
-          <a:ext cx="0" cy="0"/>
-          <a:chOff x="0" y="0"/>
-          <a:chExt cx="0" cy="0"/>
-        </a:xfrm>
-      </p:grpSpPr>
-      <p:sp>
-        <p:nvSpPr>
-          <p:cNvPr id="2" name="Slide Image Placeholder 1"/>
-          <p:cNvSpPr>
-            <a:spLocks noGrp="1" noRot="1" noChangeAspect="1"/>
-          </p:cNvSpPr>
-          <p:nvPr>
-            <p:ph type="sldImg"/>
-          </p:nvPr>
-        </p:nvSpPr>
-        <p:spPr/>
-      </p:sp>
-      <p:sp>
-        <p:nvSpPr>
-          <p:cNvPr id="3" name="Notes Placeholder 2"/>
-          <p:cNvSpPr>
-            <a:spLocks noGrp="1"/>
-          </p:cNvSpPr>
-          <p:nvPr>
-            <p:ph type="body" idx="1"/>
-          </p:nvPr>
-        </p:nvSpPr>
-        <p:spPr/>
-        <p:txBody>
-          <a:bodyPr/>
-          <a:lstStyle/>
-          <a:p>
-            <a:r>
-              <a:rPr lang="en-US" smtClean="0"/>
-              <a:t>Name:FindGenes_linearFitAdjust</a:t>
-            </a:r>
-            <a:endParaRPr lang="en-US" dirty="0"/>
-          </a:p>
-        </p:txBody>
-      </p:sp>
-      <p:sp>
-        <p:nvSpPr>
-          <p:cNvPr id="4" name="Slide Number Placeholder 3"/>
-          <p:cNvSpPr>
-            <a:spLocks noGrp="1"/>
-          </p:cNvSpPr>
-          <p:nvPr>
-            <p:ph type="sldNum" sz="quarter" idx="10"/>
-          </p:nvPr>
-        </p:nvSpPr>
-        <p:spPr/>
-        <p:txBody>
-          <a:bodyPr/>
-          <a:lstStyle/>
-          <a:p>
-            <a:fld id="{B5B4478B-CC29-436C-AE87-04EEE467A890}" type="slidenum">
-              <a:rPr lang="en-US" smtClean="0"/>
-              <a:t>1</a:t>
-            </a:fld>
-            <a:endParaRPr lang="en-US"/>
-          </a:p>
-        </p:txBody>
-      </p:sp>
-    </p:spTree>
-    <p:extLst>
-      <p:ext uri="{BB962C8B-B14F-4D97-AF65-F5344CB8AC3E}">
-        <p14:creationId xmlns:p14="http://schemas.microsoft.com/office/powerpoint/2010/main" val="646897811"/>
-      </p:ext>
-    </p:extLst>
-  </p:cSld>
-  <p:clrMapOvr>
-    <a:masterClrMapping/>
-  </p:clrMapOvr>
-</p:notes>
-</file>
-
 <file path=ppt/slideLayouts/slideLayout1.xml><?xml version="1.0" encoding="utf-8"?>
 <p:sldLayout xmlns:a="http://schemas.openxmlformats.org/drawingml/2006/main" xmlns:r="http://schemas.openxmlformats.org/officeDocument/2006/relationships" xmlns:p="http://schemas.openxmlformats.org/presentationml/2006/main" type="title" preserve="1">
   <p:cSld name="Title Slide">
@@ -586,10 +539,9 @@
           <a:lstStyle/>
           <a:p>
             <a:r>
-              <a:rPr lang="en-US" smtClean="0"/>
+              <a:rPr lang="en-US"/>
               <a:t>Click to edit Master title style</a:t>
             </a:r>
-            <a:endParaRPr lang="en-US"/>
           </a:p>
         </p:txBody>
       </p:sp>
@@ -705,10 +657,9 @@
           </a:lstStyle>
           <a:p>
             <a:r>
-              <a:rPr lang="en-US" smtClean="0"/>
+              <a:rPr lang="en-US"/>
               <a:t>Click to edit Master subtitle style</a:t>
             </a:r>
-            <a:endParaRPr lang="en-US"/>
           </a:p>
         </p:txBody>
       </p:sp>
@@ -729,7 +680,7 @@
           <a:p>
             <a:fld id="{5DC0F521-E06D-40A8-BBC9-7E6ABFC6426B}" type="datetimeFigureOut">
               <a:rPr lang="en-US" smtClean="0"/>
-              <a:t>2017-03-14</a:t>
+              <a:t>2021-12-07</a:t>
             </a:fld>
             <a:endParaRPr lang="en-US"/>
           </a:p>
@@ -823,10 +774,9 @@
           <a:lstStyle/>
           <a:p>
             <a:r>
-              <a:rPr lang="en-US" smtClean="0"/>
+              <a:rPr lang="en-US"/>
               <a:t>Click to edit Master title style</a:t>
             </a:r>
-            <a:endParaRPr lang="en-US"/>
           </a:p>
         </p:txBody>
       </p:sp>
@@ -847,38 +797,37 @@
           <a:p>
             <a:pPr lvl="0"/>
             <a:r>
-              <a:rPr lang="en-US" smtClean="0"/>
+              <a:rPr lang="en-US"/>
               <a:t>Click to edit Master text styles</a:t>
             </a:r>
           </a:p>
           <a:p>
             <a:pPr lvl="1"/>
             <a:r>
-              <a:rPr lang="en-US" smtClean="0"/>
+              <a:rPr lang="en-US"/>
               <a:t>Second level</a:t>
             </a:r>
           </a:p>
           <a:p>
             <a:pPr lvl="2"/>
             <a:r>
-              <a:rPr lang="en-US" smtClean="0"/>
+              <a:rPr lang="en-US"/>
               <a:t>Third level</a:t>
             </a:r>
           </a:p>
           <a:p>
             <a:pPr lvl="3"/>
             <a:r>
-              <a:rPr lang="en-US" smtClean="0"/>
+              <a:rPr lang="en-US"/>
               <a:t>Fourth level</a:t>
             </a:r>
           </a:p>
           <a:p>
             <a:pPr lvl="4"/>
             <a:r>
-              <a:rPr lang="en-US" smtClean="0"/>
+              <a:rPr lang="en-US"/>
               <a:t>Fifth level</a:t>
             </a:r>
-            <a:endParaRPr lang="en-US"/>
           </a:p>
         </p:txBody>
       </p:sp>
@@ -899,7 +848,7 @@
           <a:p>
             <a:fld id="{5DC0F521-E06D-40A8-BBC9-7E6ABFC6426B}" type="datetimeFigureOut">
               <a:rPr lang="en-US" smtClean="0"/>
-              <a:t>2017-03-14</a:t>
+              <a:t>2021-12-07</a:t>
             </a:fld>
             <a:endParaRPr lang="en-US"/>
           </a:p>
@@ -998,10 +947,9 @@
           <a:lstStyle/>
           <a:p>
             <a:r>
-              <a:rPr lang="en-US" smtClean="0"/>
+              <a:rPr lang="en-US"/>
               <a:t>Click to edit Master title style</a:t>
             </a:r>
-            <a:endParaRPr lang="en-US"/>
           </a:p>
         </p:txBody>
       </p:sp>
@@ -1027,38 +975,37 @@
           <a:p>
             <a:pPr lvl="0"/>
             <a:r>
-              <a:rPr lang="en-US" smtClean="0"/>
+              <a:rPr lang="en-US"/>
               <a:t>Click to edit Master text styles</a:t>
             </a:r>
           </a:p>
           <a:p>
             <a:pPr lvl="1"/>
             <a:r>
-              <a:rPr lang="en-US" smtClean="0"/>
+              <a:rPr lang="en-US"/>
               <a:t>Second level</a:t>
             </a:r>
           </a:p>
           <a:p>
             <a:pPr lvl="2"/>
             <a:r>
-              <a:rPr lang="en-US" smtClean="0"/>
+              <a:rPr lang="en-US"/>
               <a:t>Third level</a:t>
             </a:r>
           </a:p>
           <a:p>
             <a:pPr lvl="3"/>
             <a:r>
-              <a:rPr lang="en-US" smtClean="0"/>
+              <a:rPr lang="en-US"/>
               <a:t>Fourth level</a:t>
             </a:r>
           </a:p>
           <a:p>
             <a:pPr lvl="4"/>
             <a:r>
-              <a:rPr lang="en-US" smtClean="0"/>
+              <a:rPr lang="en-US"/>
               <a:t>Fifth level</a:t>
             </a:r>
-            <a:endParaRPr lang="en-US"/>
           </a:p>
         </p:txBody>
       </p:sp>
@@ -1079,7 +1026,7 @@
           <a:p>
             <a:fld id="{5DC0F521-E06D-40A8-BBC9-7E6ABFC6426B}" type="datetimeFigureOut">
               <a:rPr lang="en-US" smtClean="0"/>
-              <a:t>2017-03-14</a:t>
+              <a:t>2021-12-07</a:t>
             </a:fld>
             <a:endParaRPr lang="en-US"/>
           </a:p>
@@ -1173,10 +1120,9 @@
           <a:lstStyle/>
           <a:p>
             <a:r>
-              <a:rPr lang="en-US" smtClean="0"/>
+              <a:rPr lang="en-US"/>
               <a:t>Click to edit Master title style</a:t>
             </a:r>
-            <a:endParaRPr lang="en-US"/>
           </a:p>
         </p:txBody>
       </p:sp>
@@ -1197,38 +1143,37 @@
           <a:p>
             <a:pPr lvl="0"/>
             <a:r>
-              <a:rPr lang="en-US" smtClean="0"/>
+              <a:rPr lang="en-US"/>
               <a:t>Click to edit Master text styles</a:t>
             </a:r>
           </a:p>
           <a:p>
             <a:pPr lvl="1"/>
             <a:r>
-              <a:rPr lang="en-US" smtClean="0"/>
+              <a:rPr lang="en-US"/>
               <a:t>Second level</a:t>
             </a:r>
           </a:p>
           <a:p>
             <a:pPr lvl="2"/>
             <a:r>
-              <a:rPr lang="en-US" smtClean="0"/>
+              <a:rPr lang="en-US"/>
               <a:t>Third level</a:t>
             </a:r>
           </a:p>
           <a:p>
             <a:pPr lvl="3"/>
             <a:r>
-              <a:rPr lang="en-US" smtClean="0"/>
+              <a:rPr lang="en-US"/>
               <a:t>Fourth level</a:t>
             </a:r>
           </a:p>
           <a:p>
             <a:pPr lvl="4"/>
             <a:r>
-              <a:rPr lang="en-US" smtClean="0"/>
+              <a:rPr lang="en-US"/>
               <a:t>Fifth level</a:t>
             </a:r>
-            <a:endParaRPr lang="en-US"/>
           </a:p>
         </p:txBody>
       </p:sp>
@@ -1249,7 +1194,7 @@
           <a:p>
             <a:fld id="{5DC0F521-E06D-40A8-BBC9-7E6ABFC6426B}" type="datetimeFigureOut">
               <a:rPr lang="en-US" smtClean="0"/>
-              <a:t>2017-03-14</a:t>
+              <a:t>2021-12-07</a:t>
             </a:fld>
             <a:endParaRPr lang="en-US"/>
           </a:p>
@@ -1352,10 +1297,9 @@
           </a:lstStyle>
           <a:p>
             <a:r>
-              <a:rPr lang="en-US" smtClean="0"/>
+              <a:rPr lang="en-US"/>
               <a:t>Click to edit Master title style</a:t>
             </a:r>
-            <a:endParaRPr lang="en-US"/>
           </a:p>
         </p:txBody>
       </p:sp>
@@ -1472,7 +1416,7 @@
           <a:p>
             <a:pPr lvl="0"/>
             <a:r>
-              <a:rPr lang="en-US" smtClean="0"/>
+              <a:rPr lang="en-US"/>
               <a:t>Click to edit Master text styles</a:t>
             </a:r>
           </a:p>
@@ -1495,7 +1439,7 @@
           <a:p>
             <a:fld id="{5DC0F521-E06D-40A8-BBC9-7E6ABFC6426B}" type="datetimeFigureOut">
               <a:rPr lang="en-US" smtClean="0"/>
-              <a:t>2017-03-14</a:t>
+              <a:t>2021-12-07</a:t>
             </a:fld>
             <a:endParaRPr lang="en-US"/>
           </a:p>
@@ -1589,10 +1533,9 @@
           <a:lstStyle/>
           <a:p>
             <a:r>
-              <a:rPr lang="en-US" smtClean="0"/>
+              <a:rPr lang="en-US"/>
               <a:t>Click to edit Master title style</a:t>
             </a:r>
-            <a:endParaRPr lang="en-US"/>
           </a:p>
         </p:txBody>
       </p:sp>
@@ -1646,38 +1589,37 @@
           <a:p>
             <a:pPr lvl="0"/>
             <a:r>
-              <a:rPr lang="en-US" smtClean="0"/>
+              <a:rPr lang="en-US"/>
               <a:t>Click to edit Master text styles</a:t>
             </a:r>
           </a:p>
           <a:p>
             <a:pPr lvl="1"/>
             <a:r>
-              <a:rPr lang="en-US" smtClean="0"/>
+              <a:rPr lang="en-US"/>
               <a:t>Second level</a:t>
             </a:r>
           </a:p>
           <a:p>
             <a:pPr lvl="2"/>
             <a:r>
-              <a:rPr lang="en-US" smtClean="0"/>
+              <a:rPr lang="en-US"/>
               <a:t>Third level</a:t>
             </a:r>
           </a:p>
           <a:p>
             <a:pPr lvl="3"/>
             <a:r>
-              <a:rPr lang="en-US" smtClean="0"/>
+              <a:rPr lang="en-US"/>
               <a:t>Fourth level</a:t>
             </a:r>
           </a:p>
           <a:p>
             <a:pPr lvl="4"/>
             <a:r>
-              <a:rPr lang="en-US" smtClean="0"/>
+              <a:rPr lang="en-US"/>
               <a:t>Fifth level</a:t>
             </a:r>
-            <a:endParaRPr lang="en-US"/>
           </a:p>
         </p:txBody>
       </p:sp>
@@ -1731,38 +1673,37 @@
           <a:p>
             <a:pPr lvl="0"/>
             <a:r>
-              <a:rPr lang="en-US" smtClean="0"/>
+              <a:rPr lang="en-US"/>
               <a:t>Click to edit Master text styles</a:t>
             </a:r>
           </a:p>
           <a:p>
             <a:pPr lvl="1"/>
             <a:r>
-              <a:rPr lang="en-US" smtClean="0"/>
+              <a:rPr lang="en-US"/>
               <a:t>Second level</a:t>
             </a:r>
           </a:p>
           <a:p>
             <a:pPr lvl="2"/>
             <a:r>
-              <a:rPr lang="en-US" smtClean="0"/>
+              <a:rPr lang="en-US"/>
               <a:t>Third level</a:t>
             </a:r>
           </a:p>
           <a:p>
             <a:pPr lvl="3"/>
             <a:r>
-              <a:rPr lang="en-US" smtClean="0"/>
+              <a:rPr lang="en-US"/>
               <a:t>Fourth level</a:t>
             </a:r>
           </a:p>
           <a:p>
             <a:pPr lvl="4"/>
             <a:r>
-              <a:rPr lang="en-US" smtClean="0"/>
+              <a:rPr lang="en-US"/>
               <a:t>Fifth level</a:t>
             </a:r>
-            <a:endParaRPr lang="en-US"/>
           </a:p>
         </p:txBody>
       </p:sp>
@@ -1783,7 +1724,7 @@
           <a:p>
             <a:fld id="{5DC0F521-E06D-40A8-BBC9-7E6ABFC6426B}" type="datetimeFigureOut">
               <a:rPr lang="en-US" smtClean="0"/>
-              <a:t>2017-03-14</a:t>
+              <a:t>2021-12-07</a:t>
             </a:fld>
             <a:endParaRPr lang="en-US"/>
           </a:p>
@@ -1881,10 +1822,9 @@
           </a:lstStyle>
           <a:p>
             <a:r>
-              <a:rPr lang="en-US" smtClean="0"/>
+              <a:rPr lang="en-US"/>
               <a:t>Click to edit Master title style</a:t>
             </a:r>
-            <a:endParaRPr lang="en-US"/>
           </a:p>
         </p:txBody>
       </p:sp>
@@ -1947,7 +1887,7 @@
           <a:p>
             <a:pPr lvl="0"/>
             <a:r>
-              <a:rPr lang="en-US" smtClean="0"/>
+              <a:rPr lang="en-US"/>
               <a:t>Click to edit Master text styles</a:t>
             </a:r>
           </a:p>
@@ -2003,38 +1943,37 @@
           <a:p>
             <a:pPr lvl="0"/>
             <a:r>
-              <a:rPr lang="en-US" smtClean="0"/>
+              <a:rPr lang="en-US"/>
               <a:t>Click to edit Master text styles</a:t>
             </a:r>
           </a:p>
           <a:p>
             <a:pPr lvl="1"/>
             <a:r>
-              <a:rPr lang="en-US" smtClean="0"/>
+              <a:rPr lang="en-US"/>
               <a:t>Second level</a:t>
             </a:r>
           </a:p>
           <a:p>
             <a:pPr lvl="2"/>
             <a:r>
-              <a:rPr lang="en-US" smtClean="0"/>
+              <a:rPr lang="en-US"/>
               <a:t>Third level</a:t>
             </a:r>
           </a:p>
           <a:p>
             <a:pPr lvl="3"/>
             <a:r>
-              <a:rPr lang="en-US" smtClean="0"/>
+              <a:rPr lang="en-US"/>
               <a:t>Fourth level</a:t>
             </a:r>
           </a:p>
           <a:p>
             <a:pPr lvl="4"/>
             <a:r>
-              <a:rPr lang="en-US" smtClean="0"/>
+              <a:rPr lang="en-US"/>
               <a:t>Fifth level</a:t>
             </a:r>
-            <a:endParaRPr lang="en-US"/>
           </a:p>
         </p:txBody>
       </p:sp>
@@ -2097,7 +2036,7 @@
           <a:p>
             <a:pPr lvl="0"/>
             <a:r>
-              <a:rPr lang="en-US" smtClean="0"/>
+              <a:rPr lang="en-US"/>
               <a:t>Click to edit Master text styles</a:t>
             </a:r>
           </a:p>
@@ -2153,38 +2092,37 @@
           <a:p>
             <a:pPr lvl="0"/>
             <a:r>
-              <a:rPr lang="en-US" smtClean="0"/>
+              <a:rPr lang="en-US"/>
               <a:t>Click to edit Master text styles</a:t>
             </a:r>
           </a:p>
           <a:p>
             <a:pPr lvl="1"/>
             <a:r>
-              <a:rPr lang="en-US" smtClean="0"/>
+              <a:rPr lang="en-US"/>
               <a:t>Second level</a:t>
             </a:r>
           </a:p>
           <a:p>
             <a:pPr lvl="2"/>
             <a:r>
-              <a:rPr lang="en-US" smtClean="0"/>
+              <a:rPr lang="en-US"/>
               <a:t>Third level</a:t>
             </a:r>
           </a:p>
           <a:p>
             <a:pPr lvl="3"/>
             <a:r>
-              <a:rPr lang="en-US" smtClean="0"/>
+              <a:rPr lang="en-US"/>
               <a:t>Fourth level</a:t>
             </a:r>
           </a:p>
           <a:p>
             <a:pPr lvl="4"/>
             <a:r>
-              <a:rPr lang="en-US" smtClean="0"/>
+              <a:rPr lang="en-US"/>
               <a:t>Fifth level</a:t>
             </a:r>
-            <a:endParaRPr lang="en-US"/>
           </a:p>
         </p:txBody>
       </p:sp>
@@ -2205,7 +2143,7 @@
           <a:p>
             <a:fld id="{5DC0F521-E06D-40A8-BBC9-7E6ABFC6426B}" type="datetimeFigureOut">
               <a:rPr lang="en-US" smtClean="0"/>
-              <a:t>2017-03-14</a:t>
+              <a:t>2021-12-07</a:t>
             </a:fld>
             <a:endParaRPr lang="en-US"/>
           </a:p>
@@ -2299,10 +2237,9 @@
           <a:lstStyle/>
           <a:p>
             <a:r>
-              <a:rPr lang="en-US" smtClean="0"/>
+              <a:rPr lang="en-US"/>
               <a:t>Click to edit Master title style</a:t>
             </a:r>
-            <a:endParaRPr lang="en-US"/>
           </a:p>
         </p:txBody>
       </p:sp>
@@ -2323,7 +2260,7 @@
           <a:p>
             <a:fld id="{5DC0F521-E06D-40A8-BBC9-7E6ABFC6426B}" type="datetimeFigureOut">
               <a:rPr lang="en-US" smtClean="0"/>
-              <a:t>2017-03-14</a:t>
+              <a:t>2021-12-07</a:t>
             </a:fld>
             <a:endParaRPr lang="en-US"/>
           </a:p>
@@ -2418,7 +2355,7 @@
           <a:p>
             <a:fld id="{5DC0F521-E06D-40A8-BBC9-7E6ABFC6426B}" type="datetimeFigureOut">
               <a:rPr lang="en-US" smtClean="0"/>
-              <a:t>2017-03-14</a:t>
+              <a:t>2021-12-07</a:t>
             </a:fld>
             <a:endParaRPr lang="en-US"/>
           </a:p>
@@ -2521,10 +2458,9 @@
           </a:lstStyle>
           <a:p>
             <a:r>
-              <a:rPr lang="en-US" smtClean="0"/>
+              <a:rPr lang="en-US"/>
               <a:t>Click to edit Master title style</a:t>
             </a:r>
-            <a:endParaRPr lang="en-US"/>
           </a:p>
         </p:txBody>
       </p:sp>
@@ -2578,38 +2514,37 @@
           <a:p>
             <a:pPr lvl="0"/>
             <a:r>
-              <a:rPr lang="en-US" smtClean="0"/>
+              <a:rPr lang="en-US"/>
               <a:t>Click to edit Master text styles</a:t>
             </a:r>
           </a:p>
           <a:p>
             <a:pPr lvl="1"/>
             <a:r>
-              <a:rPr lang="en-US" smtClean="0"/>
+              <a:rPr lang="en-US"/>
               <a:t>Second level</a:t>
             </a:r>
           </a:p>
           <a:p>
             <a:pPr lvl="2"/>
             <a:r>
-              <a:rPr lang="en-US" smtClean="0"/>
+              <a:rPr lang="en-US"/>
               <a:t>Third level</a:t>
             </a:r>
           </a:p>
           <a:p>
             <a:pPr lvl="3"/>
             <a:r>
-              <a:rPr lang="en-US" smtClean="0"/>
+              <a:rPr lang="en-US"/>
               <a:t>Fourth level</a:t>
             </a:r>
           </a:p>
           <a:p>
             <a:pPr lvl="4"/>
             <a:r>
-              <a:rPr lang="en-US" smtClean="0"/>
+              <a:rPr lang="en-US"/>
               <a:t>Fifth level</a:t>
             </a:r>
-            <a:endParaRPr lang="en-US"/>
           </a:p>
         </p:txBody>
       </p:sp>
@@ -2672,7 +2607,7 @@
           <a:p>
             <a:pPr lvl="0"/>
             <a:r>
-              <a:rPr lang="en-US" smtClean="0"/>
+              <a:rPr lang="en-US"/>
               <a:t>Click to edit Master text styles</a:t>
             </a:r>
           </a:p>
@@ -2695,7 +2630,7 @@
           <a:p>
             <a:fld id="{5DC0F521-E06D-40A8-BBC9-7E6ABFC6426B}" type="datetimeFigureOut">
               <a:rPr lang="en-US" smtClean="0"/>
-              <a:t>2017-03-14</a:t>
+              <a:t>2021-12-07</a:t>
             </a:fld>
             <a:endParaRPr lang="en-US"/>
           </a:p>
@@ -2798,10 +2733,9 @@
           </a:lstStyle>
           <a:p>
             <a:r>
-              <a:rPr lang="en-US" smtClean="0"/>
+              <a:rPr lang="en-US"/>
               <a:t>Click to edit Master title style</a:t>
             </a:r>
-            <a:endParaRPr lang="en-US"/>
           </a:p>
         </p:txBody>
       </p:sp>
@@ -2925,7 +2859,7 @@
           <a:p>
             <a:pPr lvl="0"/>
             <a:r>
-              <a:rPr lang="en-US" smtClean="0"/>
+              <a:rPr lang="en-US"/>
               <a:t>Click to edit Master text styles</a:t>
             </a:r>
           </a:p>
@@ -2948,7 +2882,7 @@
           <a:p>
             <a:fld id="{5DC0F521-E06D-40A8-BBC9-7E6ABFC6426B}" type="datetimeFigureOut">
               <a:rPr lang="en-US" smtClean="0"/>
-              <a:t>2017-03-14</a:t>
+              <a:t>2021-12-07</a:t>
             </a:fld>
             <a:endParaRPr lang="en-US"/>
           </a:p>
@@ -3057,10 +2991,9 @@
           <a:lstStyle/>
           <a:p>
             <a:r>
-              <a:rPr lang="en-US" smtClean="0"/>
+              <a:rPr lang="en-US"/>
               <a:t>Click to edit Master title style</a:t>
             </a:r>
-            <a:endParaRPr lang="en-US"/>
           </a:p>
         </p:txBody>
       </p:sp>
@@ -3091,38 +3024,37 @@
           <a:p>
             <a:pPr lvl="0"/>
             <a:r>
-              <a:rPr lang="en-US" smtClean="0"/>
+              <a:rPr lang="en-US"/>
               <a:t>Click to edit Master text styles</a:t>
             </a:r>
           </a:p>
           <a:p>
             <a:pPr lvl="1"/>
             <a:r>
-              <a:rPr lang="en-US" smtClean="0"/>
+              <a:rPr lang="en-US"/>
               <a:t>Second level</a:t>
             </a:r>
           </a:p>
           <a:p>
             <a:pPr lvl="2"/>
             <a:r>
-              <a:rPr lang="en-US" smtClean="0"/>
+              <a:rPr lang="en-US"/>
               <a:t>Third level</a:t>
             </a:r>
           </a:p>
           <a:p>
             <a:pPr lvl="3"/>
             <a:r>
-              <a:rPr lang="en-US" smtClean="0"/>
+              <a:rPr lang="en-US"/>
               <a:t>Fourth level</a:t>
             </a:r>
           </a:p>
           <a:p>
             <a:pPr lvl="4"/>
             <a:r>
-              <a:rPr lang="en-US" smtClean="0"/>
+              <a:rPr lang="en-US"/>
               <a:t>Fifth level</a:t>
             </a:r>
-            <a:endParaRPr lang="en-US"/>
           </a:p>
         </p:txBody>
       </p:sp>
@@ -3161,7 +3093,7 @@
           <a:p>
             <a:fld id="{5DC0F521-E06D-40A8-BBC9-7E6ABFC6426B}" type="datetimeFigureOut">
               <a:rPr lang="en-US" smtClean="0"/>
-              <a:t>2017-03-14</a:t>
+              <a:t>2021-12-07</a:t>
             </a:fld>
             <a:endParaRPr lang="en-US"/>
           </a:p>
@@ -3538,7 +3470,1251 @@
       </p:grpSpPr>
       <p:pic>
         <p:nvPicPr>
-          <p:cNvPr id="2" name="Picture 3"/>
+          <p:cNvPr id="4" name="Picture 3"/>
+          <p:cNvPicPr>
+            <a:picLocks noChangeAspect="1"/>
+          </p:cNvPicPr>
+          <p:nvPr/>
+        </p:nvPicPr>
+        <p:blipFill>
+          <a:blip r:embed="rId2"/>
+          <a:stretch>
+            <a:fillRect/>
+          </a:stretch>
+        </p:blipFill>
+        <p:spPr>
+          <a:xfrm>
+            <a:off x="1629594" y="1188318"/>
+            <a:ext cx="3744416" cy="1323180"/>
+          </a:xfrm>
+          <a:prstGeom prst="rect">
+            <a:avLst/>
+          </a:prstGeom>
+        </p:spPr>
+      </p:pic>
+    </p:spTree>
+    <p:extLst>
+      <p:ext uri="{BB962C8B-B14F-4D97-AF65-F5344CB8AC3E}">
+        <p14:creationId xmlns:p14="http://schemas.microsoft.com/office/powerpoint/2010/main" val="4054372393"/>
+      </p:ext>
+    </p:extLst>
+  </p:cSld>
+  <p:clrMapOvr>
+    <a:masterClrMapping/>
+  </p:clrMapOvr>
+</p:sld>
+</file>
+
+<file path=ppt/slides/slide10.xml><?xml version="1.0" encoding="utf-8"?>
+<p:sld xmlns:a="http://schemas.openxmlformats.org/drawingml/2006/main" xmlns:r="http://schemas.openxmlformats.org/officeDocument/2006/relationships" xmlns:p="http://schemas.openxmlformats.org/presentationml/2006/main">
+  <p:cSld>
+    <p:spTree>
+      <p:nvGrpSpPr>
+        <p:cNvPr id="1" name=""/>
+        <p:cNvGrpSpPr/>
+        <p:nvPr/>
+      </p:nvGrpSpPr>
+      <p:grpSpPr>
+        <a:xfrm>
+          <a:off x="0" y="0"/>
+          <a:ext cx="0" cy="0"/>
+          <a:chOff x="0" y="0"/>
+          <a:chExt cx="0" cy="0"/>
+        </a:xfrm>
+      </p:grpSpPr>
+      <p:pic>
+        <p:nvPicPr>
+          <p:cNvPr id="2" name="Picture 1"/>
+          <p:cNvPicPr>
+            <a:picLocks noChangeAspect="1"/>
+          </p:cNvPicPr>
+          <p:nvPr/>
+        </p:nvPicPr>
+        <p:blipFill rotWithShape="1">
+          <a:blip r:embed="rId2"/>
+          <a:srcRect r="40515"/>
+          <a:stretch/>
+        </p:blipFill>
+        <p:spPr>
+          <a:xfrm>
+            <a:off x="1053530" y="148941"/>
+            <a:ext cx="2304256" cy="3530618"/>
+          </a:xfrm>
+          <a:prstGeom prst="rect">
+            <a:avLst/>
+          </a:prstGeom>
+        </p:spPr>
+      </p:pic>
+      <p:pic>
+        <p:nvPicPr>
+          <p:cNvPr id="3" name="Picture 2"/>
+          <p:cNvPicPr>
+            <a:picLocks noChangeAspect="1"/>
+          </p:cNvPicPr>
+          <p:nvPr/>
+        </p:nvPicPr>
+        <p:blipFill>
+          <a:blip r:embed="rId3"/>
+          <a:stretch>
+            <a:fillRect/>
+          </a:stretch>
+        </p:blipFill>
+        <p:spPr>
+          <a:xfrm>
+            <a:off x="4509914" y="148941"/>
+            <a:ext cx="1080120" cy="2633551"/>
+          </a:xfrm>
+          <a:prstGeom prst="rect">
+            <a:avLst/>
+          </a:prstGeom>
+        </p:spPr>
+      </p:pic>
+      <p:pic>
+        <p:nvPicPr>
+          <p:cNvPr id="4" name="Picture 3"/>
+          <p:cNvPicPr>
+            <a:picLocks noChangeAspect="1"/>
+          </p:cNvPicPr>
+          <p:nvPr/>
+        </p:nvPicPr>
+        <p:blipFill>
+          <a:blip r:embed="rId4"/>
+          <a:stretch>
+            <a:fillRect/>
+          </a:stretch>
+        </p:blipFill>
+        <p:spPr>
+          <a:xfrm>
+            <a:off x="4509914" y="2761152"/>
+            <a:ext cx="1008112" cy="439333"/>
+          </a:xfrm>
+          <a:prstGeom prst="rect">
+            <a:avLst/>
+          </a:prstGeom>
+        </p:spPr>
+      </p:pic>
+      <p:sp>
+        <p:nvSpPr>
+          <p:cNvPr id="6" name="Right Arrow 5"/>
+          <p:cNvSpPr/>
+          <p:nvPr/>
+        </p:nvSpPr>
+        <p:spPr>
+          <a:xfrm>
+            <a:off x="3645818" y="1413677"/>
+            <a:ext cx="360040" cy="45719"/>
+          </a:xfrm>
+          <a:prstGeom prst="rightArrow">
+            <a:avLst/>
+          </a:prstGeom>
+          <a:solidFill>
+            <a:srgbClr val="C00000"/>
+          </a:solidFill>
+          <a:ln>
+            <a:solidFill>
+              <a:srgbClr val="C00000"/>
+            </a:solidFill>
+          </a:ln>
+        </p:spPr>
+        <p:style>
+          <a:lnRef idx="2">
+            <a:schemeClr val="accent1">
+              <a:shade val="50000"/>
+            </a:schemeClr>
+          </a:lnRef>
+          <a:fillRef idx="1">
+            <a:schemeClr val="accent1"/>
+          </a:fillRef>
+          <a:effectRef idx="0">
+            <a:schemeClr val="accent1"/>
+          </a:effectRef>
+          <a:fontRef idx="minor">
+            <a:schemeClr val="lt1"/>
+          </a:fontRef>
+        </p:style>
+        <p:txBody>
+          <a:bodyPr rtlCol="0" anchor="ctr"/>
+          <a:lstStyle/>
+          <a:p>
+            <a:pPr algn="ctr"/>
+            <a:endParaRPr lang="en-US"/>
+          </a:p>
+        </p:txBody>
+      </p:sp>
+      <p:sp>
+        <p:nvSpPr>
+          <p:cNvPr id="7" name="Right Arrow 6"/>
+          <p:cNvSpPr/>
+          <p:nvPr/>
+        </p:nvSpPr>
+        <p:spPr>
+          <a:xfrm>
+            <a:off x="4257886" y="3029261"/>
+            <a:ext cx="360040" cy="45719"/>
+          </a:xfrm>
+          <a:prstGeom prst="rightArrow">
+            <a:avLst/>
+          </a:prstGeom>
+          <a:solidFill>
+            <a:srgbClr val="C00000"/>
+          </a:solidFill>
+          <a:ln>
+            <a:solidFill>
+              <a:srgbClr val="C00000"/>
+            </a:solidFill>
+          </a:ln>
+        </p:spPr>
+        <p:style>
+          <a:lnRef idx="2">
+            <a:schemeClr val="accent1">
+              <a:shade val="50000"/>
+            </a:schemeClr>
+          </a:lnRef>
+          <a:fillRef idx="1">
+            <a:schemeClr val="accent1"/>
+          </a:fillRef>
+          <a:effectRef idx="0">
+            <a:schemeClr val="accent1"/>
+          </a:effectRef>
+          <a:fontRef idx="minor">
+            <a:schemeClr val="lt1"/>
+          </a:fontRef>
+        </p:style>
+        <p:txBody>
+          <a:bodyPr rtlCol="0" anchor="ctr"/>
+          <a:lstStyle/>
+          <a:p>
+            <a:pPr algn="ctr"/>
+            <a:endParaRPr lang="en-US"/>
+          </a:p>
+        </p:txBody>
+      </p:sp>
+    </p:spTree>
+    <p:extLst>
+      <p:ext uri="{BB962C8B-B14F-4D97-AF65-F5344CB8AC3E}">
+        <p14:creationId xmlns:p14="http://schemas.microsoft.com/office/powerpoint/2010/main" val="3442582249"/>
+      </p:ext>
+    </p:extLst>
+  </p:cSld>
+  <p:clrMapOvr>
+    <a:masterClrMapping/>
+  </p:clrMapOvr>
+  <p:timing>
+    <p:tnLst>
+      <p:par>
+        <p:cTn id="1" dur="indefinite" restart="never" nodeType="tmRoot"/>
+      </p:par>
+    </p:tnLst>
+  </p:timing>
+</p:sld>
+</file>
+
+<file path=ppt/slides/slide11.xml><?xml version="1.0" encoding="utf-8"?>
+<p:sld xmlns:a="http://schemas.openxmlformats.org/drawingml/2006/main" xmlns:r="http://schemas.openxmlformats.org/officeDocument/2006/relationships" xmlns:p="http://schemas.openxmlformats.org/presentationml/2006/main">
+  <p:cSld>
+    <p:spTree>
+      <p:nvGrpSpPr>
+        <p:cNvPr id="1" name=""/>
+        <p:cNvGrpSpPr/>
+        <p:nvPr/>
+      </p:nvGrpSpPr>
+      <p:grpSpPr>
+        <a:xfrm>
+          <a:off x="0" y="0"/>
+          <a:ext cx="0" cy="0"/>
+          <a:chOff x="0" y="0"/>
+          <a:chExt cx="0" cy="0"/>
+        </a:xfrm>
+      </p:grpSpPr>
+      <p:pic>
+        <p:nvPicPr>
+          <p:cNvPr id="3" name="Picture 2"/>
+          <p:cNvPicPr>
+            <a:picLocks noChangeAspect="1"/>
+          </p:cNvPicPr>
+          <p:nvPr/>
+        </p:nvPicPr>
+        <p:blipFill>
+          <a:blip r:embed="rId2"/>
+          <a:stretch>
+            <a:fillRect/>
+          </a:stretch>
+        </p:blipFill>
+        <p:spPr>
+          <a:xfrm>
+            <a:off x="1701602" y="180206"/>
+            <a:ext cx="3732080" cy="3528392"/>
+          </a:xfrm>
+          <a:prstGeom prst="rect">
+            <a:avLst/>
+          </a:prstGeom>
+        </p:spPr>
+      </p:pic>
+    </p:spTree>
+    <p:extLst>
+      <p:ext uri="{BB962C8B-B14F-4D97-AF65-F5344CB8AC3E}">
+        <p14:creationId xmlns:p14="http://schemas.microsoft.com/office/powerpoint/2010/main" val="728648246"/>
+      </p:ext>
+    </p:extLst>
+  </p:cSld>
+  <p:clrMapOvr>
+    <a:masterClrMapping/>
+  </p:clrMapOvr>
+  <p:timing>
+    <p:tnLst>
+      <p:par>
+        <p:cTn id="1" dur="indefinite" restart="never" nodeType="tmRoot"/>
+      </p:par>
+    </p:tnLst>
+  </p:timing>
+</p:sld>
+</file>
+
+<file path=ppt/slides/slide12.xml><?xml version="1.0" encoding="utf-8"?>
+<p:sld xmlns:a="http://schemas.openxmlformats.org/drawingml/2006/main" xmlns:r="http://schemas.openxmlformats.org/officeDocument/2006/relationships" xmlns:p="http://schemas.openxmlformats.org/presentationml/2006/main">
+  <p:cSld>
+    <p:spTree>
+      <p:nvGrpSpPr>
+        <p:cNvPr id="1" name=""/>
+        <p:cNvGrpSpPr/>
+        <p:nvPr/>
+      </p:nvGrpSpPr>
+      <p:grpSpPr>
+        <a:xfrm>
+          <a:off x="0" y="0"/>
+          <a:ext cx="0" cy="0"/>
+          <a:chOff x="0" y="0"/>
+          <a:chExt cx="0" cy="0"/>
+        </a:xfrm>
+      </p:grpSpPr>
+      <p:pic>
+        <p:nvPicPr>
+          <p:cNvPr id="2" name="Picture 1"/>
+          <p:cNvPicPr>
+            <a:picLocks noChangeAspect="1"/>
+          </p:cNvPicPr>
+          <p:nvPr/>
+        </p:nvPicPr>
+        <p:blipFill>
+          <a:blip r:embed="rId2"/>
+          <a:stretch>
+            <a:fillRect/>
+          </a:stretch>
+        </p:blipFill>
+        <p:spPr>
+          <a:xfrm>
+            <a:off x="1341562" y="108198"/>
+            <a:ext cx="4514461" cy="3456384"/>
+          </a:xfrm>
+          <a:prstGeom prst="rect">
+            <a:avLst/>
+          </a:prstGeom>
+        </p:spPr>
+      </p:pic>
+    </p:spTree>
+    <p:extLst>
+      <p:ext uri="{BB962C8B-B14F-4D97-AF65-F5344CB8AC3E}">
+        <p14:creationId xmlns:p14="http://schemas.microsoft.com/office/powerpoint/2010/main" val="3987892859"/>
+      </p:ext>
+    </p:extLst>
+  </p:cSld>
+  <p:clrMapOvr>
+    <a:masterClrMapping/>
+  </p:clrMapOvr>
+  <p:timing>
+    <p:tnLst>
+      <p:par>
+        <p:cTn id="1" dur="indefinite" restart="never" nodeType="tmRoot"/>
+      </p:par>
+    </p:tnLst>
+  </p:timing>
+</p:sld>
+</file>
+
+<file path=ppt/slides/slide13.xml><?xml version="1.0" encoding="utf-8"?>
+<p:sld xmlns:a="http://schemas.openxmlformats.org/drawingml/2006/main" xmlns:r="http://schemas.openxmlformats.org/officeDocument/2006/relationships" xmlns:p="http://schemas.openxmlformats.org/presentationml/2006/main">
+  <p:cSld>
+    <p:spTree>
+      <p:nvGrpSpPr>
+        <p:cNvPr id="1" name=""/>
+        <p:cNvGrpSpPr/>
+        <p:nvPr/>
+      </p:nvGrpSpPr>
+      <p:grpSpPr>
+        <a:xfrm>
+          <a:off x="0" y="0"/>
+          <a:ext cx="0" cy="0"/>
+          <a:chOff x="0" y="0"/>
+          <a:chExt cx="0" cy="0"/>
+        </a:xfrm>
+      </p:grpSpPr>
+      <p:pic>
+        <p:nvPicPr>
+          <p:cNvPr id="2" name="Picture 1"/>
+          <p:cNvPicPr>
+            <a:picLocks noChangeAspect="1"/>
+          </p:cNvPicPr>
+          <p:nvPr/>
+        </p:nvPicPr>
+        <p:blipFill>
+          <a:blip r:embed="rId2"/>
+          <a:stretch>
+            <a:fillRect/>
+          </a:stretch>
+        </p:blipFill>
+        <p:spPr>
+          <a:xfrm>
+            <a:off x="189435" y="1044302"/>
+            <a:ext cx="1296144" cy="1532531"/>
+          </a:xfrm>
+          <a:prstGeom prst="rect">
+            <a:avLst/>
+          </a:prstGeom>
+        </p:spPr>
+      </p:pic>
+      <p:pic>
+        <p:nvPicPr>
+          <p:cNvPr id="4" name="Picture 3"/>
+          <p:cNvPicPr>
+            <a:picLocks noChangeAspect="1"/>
+          </p:cNvPicPr>
+          <p:nvPr/>
+        </p:nvPicPr>
+        <p:blipFill>
+          <a:blip r:embed="rId3"/>
+          <a:stretch>
+            <a:fillRect/>
+          </a:stretch>
+        </p:blipFill>
+        <p:spPr>
+          <a:xfrm>
+            <a:off x="1989634" y="1044302"/>
+            <a:ext cx="4585143" cy="1698833"/>
+          </a:xfrm>
+          <a:prstGeom prst="rect">
+            <a:avLst/>
+          </a:prstGeom>
+        </p:spPr>
+      </p:pic>
+    </p:spTree>
+    <p:extLst>
+      <p:ext uri="{BB962C8B-B14F-4D97-AF65-F5344CB8AC3E}">
+        <p14:creationId xmlns:p14="http://schemas.microsoft.com/office/powerpoint/2010/main" val="1774858293"/>
+      </p:ext>
+    </p:extLst>
+  </p:cSld>
+  <p:clrMapOvr>
+    <a:masterClrMapping/>
+  </p:clrMapOvr>
+</p:sld>
+</file>
+
+<file path=ppt/slides/slide14.xml><?xml version="1.0" encoding="utf-8"?>
+<p:sld xmlns:a="http://schemas.openxmlformats.org/drawingml/2006/main" xmlns:r="http://schemas.openxmlformats.org/officeDocument/2006/relationships" xmlns:p="http://schemas.openxmlformats.org/presentationml/2006/main">
+  <p:cSld>
+    <p:spTree>
+      <p:nvGrpSpPr>
+        <p:cNvPr id="1" name=""/>
+        <p:cNvGrpSpPr/>
+        <p:nvPr/>
+      </p:nvGrpSpPr>
+      <p:grpSpPr>
+        <a:xfrm>
+          <a:off x="0" y="0"/>
+          <a:ext cx="0" cy="0"/>
+          <a:chOff x="0" y="0"/>
+          <a:chExt cx="0" cy="0"/>
+        </a:xfrm>
+      </p:grpSpPr>
+      <p:pic>
+        <p:nvPicPr>
+          <p:cNvPr id="2" name="Picture 1"/>
+          <p:cNvPicPr>
+            <a:picLocks noChangeAspect="1"/>
+          </p:cNvPicPr>
+          <p:nvPr/>
+        </p:nvPicPr>
+        <p:blipFill>
+          <a:blip r:embed="rId2"/>
+          <a:stretch>
+            <a:fillRect/>
+          </a:stretch>
+        </p:blipFill>
+        <p:spPr>
+          <a:xfrm>
+            <a:off x="2133650" y="540246"/>
+            <a:ext cx="2540386" cy="2960165"/>
+          </a:xfrm>
+          <a:prstGeom prst="rect">
+            <a:avLst/>
+          </a:prstGeom>
+        </p:spPr>
+      </p:pic>
+    </p:spTree>
+    <p:extLst>
+      <p:ext uri="{BB962C8B-B14F-4D97-AF65-F5344CB8AC3E}">
+        <p14:creationId xmlns:p14="http://schemas.microsoft.com/office/powerpoint/2010/main" val="3228565497"/>
+      </p:ext>
+    </p:extLst>
+  </p:cSld>
+  <p:clrMapOvr>
+    <a:masterClrMapping/>
+  </p:clrMapOvr>
+</p:sld>
+</file>
+
+<file path=ppt/slides/slide15.xml><?xml version="1.0" encoding="utf-8"?>
+<p:sld xmlns:a="http://schemas.openxmlformats.org/drawingml/2006/main" xmlns:r="http://schemas.openxmlformats.org/officeDocument/2006/relationships" xmlns:p="http://schemas.openxmlformats.org/presentationml/2006/main">
+  <p:cSld>
+    <p:spTree>
+      <p:nvGrpSpPr>
+        <p:cNvPr id="1" name=""/>
+        <p:cNvGrpSpPr/>
+        <p:nvPr/>
+      </p:nvGrpSpPr>
+      <p:grpSpPr>
+        <a:xfrm>
+          <a:off x="0" y="0"/>
+          <a:ext cx="0" cy="0"/>
+          <a:chOff x="0" y="0"/>
+          <a:chExt cx="0" cy="0"/>
+        </a:xfrm>
+      </p:grpSpPr>
+      <p:pic>
+        <p:nvPicPr>
+          <p:cNvPr id="3" name="Picture 2"/>
+          <p:cNvPicPr>
+            <a:picLocks noChangeAspect="1"/>
+          </p:cNvPicPr>
+          <p:nvPr/>
+        </p:nvPicPr>
+        <p:blipFill>
+          <a:blip r:embed="rId2"/>
+          <a:stretch>
+            <a:fillRect/>
+          </a:stretch>
+        </p:blipFill>
+        <p:spPr>
+          <a:xfrm>
+            <a:off x="117426" y="612254"/>
+            <a:ext cx="6363638" cy="2672414"/>
+          </a:xfrm>
+          <a:prstGeom prst="rect">
+            <a:avLst/>
+          </a:prstGeom>
+        </p:spPr>
+      </p:pic>
+    </p:spTree>
+    <p:extLst>
+      <p:ext uri="{BB962C8B-B14F-4D97-AF65-F5344CB8AC3E}">
+        <p14:creationId xmlns:p14="http://schemas.microsoft.com/office/powerpoint/2010/main" val="167023902"/>
+      </p:ext>
+    </p:extLst>
+  </p:cSld>
+  <p:clrMapOvr>
+    <a:masterClrMapping/>
+  </p:clrMapOvr>
+</p:sld>
+</file>
+
+<file path=ppt/slides/slide16.xml><?xml version="1.0" encoding="utf-8"?>
+<p:sld xmlns:a="http://schemas.openxmlformats.org/drawingml/2006/main" xmlns:r="http://schemas.openxmlformats.org/officeDocument/2006/relationships" xmlns:p="http://schemas.openxmlformats.org/presentationml/2006/main">
+  <p:cSld>
+    <p:spTree>
+      <p:nvGrpSpPr>
+        <p:cNvPr id="1" name=""/>
+        <p:cNvGrpSpPr/>
+        <p:nvPr/>
+      </p:nvGrpSpPr>
+      <p:grpSpPr>
+        <a:xfrm>
+          <a:off x="0" y="0"/>
+          <a:ext cx="0" cy="0"/>
+          <a:chOff x="0" y="0"/>
+          <a:chExt cx="0" cy="0"/>
+        </a:xfrm>
+      </p:grpSpPr>
+      <p:pic>
+        <p:nvPicPr>
+          <p:cNvPr id="2" name="Picture 1"/>
+          <p:cNvPicPr>
+            <a:picLocks noChangeAspect="1"/>
+          </p:cNvPicPr>
+          <p:nvPr/>
+        </p:nvPicPr>
+        <p:blipFill>
+          <a:blip r:embed="rId2"/>
+          <a:stretch>
+            <a:fillRect/>
+          </a:stretch>
+        </p:blipFill>
+        <p:spPr>
+          <a:xfrm>
+            <a:off x="333450" y="828278"/>
+            <a:ext cx="6256905" cy="2088232"/>
+          </a:xfrm>
+          <a:prstGeom prst="rect">
+            <a:avLst/>
+          </a:prstGeom>
+        </p:spPr>
+      </p:pic>
+    </p:spTree>
+    <p:extLst>
+      <p:ext uri="{BB962C8B-B14F-4D97-AF65-F5344CB8AC3E}">
+        <p14:creationId xmlns:p14="http://schemas.microsoft.com/office/powerpoint/2010/main" val="4152256885"/>
+      </p:ext>
+    </p:extLst>
+  </p:cSld>
+  <p:clrMapOvr>
+    <a:masterClrMapping/>
+  </p:clrMapOvr>
+</p:sld>
+</file>
+
+<file path=ppt/slides/slide17.xml><?xml version="1.0" encoding="utf-8"?>
+<p:sld xmlns:a="http://schemas.openxmlformats.org/drawingml/2006/main" xmlns:r="http://schemas.openxmlformats.org/officeDocument/2006/relationships" xmlns:p="http://schemas.openxmlformats.org/presentationml/2006/main">
+  <p:cSld>
+    <p:spTree>
+      <p:nvGrpSpPr>
+        <p:cNvPr id="1" name=""/>
+        <p:cNvGrpSpPr/>
+        <p:nvPr/>
+      </p:nvGrpSpPr>
+      <p:grpSpPr>
+        <a:xfrm>
+          <a:off x="0" y="0"/>
+          <a:ext cx="0" cy="0"/>
+          <a:chOff x="0" y="0"/>
+          <a:chExt cx="0" cy="0"/>
+        </a:xfrm>
+      </p:grpSpPr>
+      <p:pic>
+        <p:nvPicPr>
+          <p:cNvPr id="3" name="Picture 2"/>
+          <p:cNvPicPr>
+            <a:picLocks noChangeAspect="1"/>
+          </p:cNvPicPr>
+          <p:nvPr/>
+        </p:nvPicPr>
+        <p:blipFill>
+          <a:blip r:embed="rId2"/>
+          <a:stretch>
+            <a:fillRect/>
+          </a:stretch>
+        </p:blipFill>
+        <p:spPr>
+          <a:xfrm>
+            <a:off x="1031129" y="684262"/>
+            <a:ext cx="4777961" cy="400315"/>
+          </a:xfrm>
+          <a:prstGeom prst="rect">
+            <a:avLst/>
+          </a:prstGeom>
+        </p:spPr>
+      </p:pic>
+      <p:pic>
+        <p:nvPicPr>
+          <p:cNvPr id="4" name="Picture 3"/>
+          <p:cNvPicPr>
+            <a:picLocks noChangeAspect="1"/>
+          </p:cNvPicPr>
+          <p:nvPr/>
+        </p:nvPicPr>
+        <p:blipFill>
+          <a:blip r:embed="rId3"/>
+          <a:stretch>
+            <a:fillRect/>
+          </a:stretch>
+        </p:blipFill>
+        <p:spPr>
+          <a:xfrm>
+            <a:off x="621482" y="1548358"/>
+            <a:ext cx="5597255" cy="1442186"/>
+          </a:xfrm>
+          <a:prstGeom prst="rect">
+            <a:avLst/>
+          </a:prstGeom>
+        </p:spPr>
+      </p:pic>
+      <p:sp>
+        <p:nvSpPr>
+          <p:cNvPr id="7" name="Right Arrow 6"/>
+          <p:cNvSpPr/>
+          <p:nvPr/>
+        </p:nvSpPr>
+        <p:spPr>
+          <a:xfrm rot="7416647" flipV="1">
+            <a:off x="4268158" y="660258"/>
+            <a:ext cx="267490" cy="81596"/>
+          </a:xfrm>
+          <a:prstGeom prst="rightArrow">
+            <a:avLst/>
+          </a:prstGeom>
+          <a:solidFill>
+            <a:srgbClr val="C00000"/>
+          </a:solidFill>
+          <a:ln>
+            <a:solidFill>
+              <a:srgbClr val="C00000"/>
+            </a:solidFill>
+          </a:ln>
+        </p:spPr>
+        <p:style>
+          <a:lnRef idx="2">
+            <a:schemeClr val="accent1">
+              <a:shade val="50000"/>
+            </a:schemeClr>
+          </a:lnRef>
+          <a:fillRef idx="1">
+            <a:schemeClr val="accent1"/>
+          </a:fillRef>
+          <a:effectRef idx="0">
+            <a:schemeClr val="accent1"/>
+          </a:effectRef>
+          <a:fontRef idx="minor">
+            <a:schemeClr val="lt1"/>
+          </a:fontRef>
+        </p:style>
+        <p:txBody>
+          <a:bodyPr rtlCol="0" anchor="ctr"/>
+          <a:lstStyle/>
+          <a:p>
+            <a:pPr algn="ctr"/>
+            <a:endParaRPr lang="en-US"/>
+          </a:p>
+        </p:txBody>
+      </p:sp>
+    </p:spTree>
+    <p:extLst>
+      <p:ext uri="{BB962C8B-B14F-4D97-AF65-F5344CB8AC3E}">
+        <p14:creationId xmlns:p14="http://schemas.microsoft.com/office/powerpoint/2010/main" val="1344574741"/>
+      </p:ext>
+    </p:extLst>
+  </p:cSld>
+  <p:clrMapOvr>
+    <a:masterClrMapping/>
+  </p:clrMapOvr>
+</p:sld>
+</file>
+
+<file path=ppt/slides/slide18.xml><?xml version="1.0" encoding="utf-8"?>
+<p:sld xmlns:a="http://schemas.openxmlformats.org/drawingml/2006/main" xmlns:r="http://schemas.openxmlformats.org/officeDocument/2006/relationships" xmlns:p="http://schemas.openxmlformats.org/presentationml/2006/main">
+  <p:cSld>
+    <p:spTree>
+      <p:nvGrpSpPr>
+        <p:cNvPr id="1" name=""/>
+        <p:cNvGrpSpPr/>
+        <p:nvPr/>
+      </p:nvGrpSpPr>
+      <p:grpSpPr>
+        <a:xfrm>
+          <a:off x="0" y="0"/>
+          <a:ext cx="0" cy="0"/>
+          <a:chOff x="0" y="0"/>
+          <a:chExt cx="0" cy="0"/>
+        </a:xfrm>
+      </p:grpSpPr>
+      <p:pic>
+        <p:nvPicPr>
+          <p:cNvPr id="2" name="Picture 1"/>
+          <p:cNvPicPr>
+            <a:picLocks noChangeAspect="1"/>
+          </p:cNvPicPr>
+          <p:nvPr/>
+        </p:nvPicPr>
+        <p:blipFill>
+          <a:blip r:embed="rId2"/>
+          <a:stretch>
+            <a:fillRect/>
+          </a:stretch>
+        </p:blipFill>
+        <p:spPr>
+          <a:xfrm>
+            <a:off x="1197546" y="252214"/>
+            <a:ext cx="4703254" cy="3642416"/>
+          </a:xfrm>
+          <a:prstGeom prst="rect">
+            <a:avLst/>
+          </a:prstGeom>
+        </p:spPr>
+      </p:pic>
+    </p:spTree>
+    <p:extLst>
+      <p:ext uri="{BB962C8B-B14F-4D97-AF65-F5344CB8AC3E}">
+        <p14:creationId xmlns:p14="http://schemas.microsoft.com/office/powerpoint/2010/main" val="1774625395"/>
+      </p:ext>
+    </p:extLst>
+  </p:cSld>
+  <p:clrMapOvr>
+    <a:masterClrMapping/>
+  </p:clrMapOvr>
+</p:sld>
+</file>
+
+<file path=ppt/slides/slide19.xml><?xml version="1.0" encoding="utf-8"?>
+<p:sld xmlns:a="http://schemas.openxmlformats.org/drawingml/2006/main" xmlns:r="http://schemas.openxmlformats.org/officeDocument/2006/relationships" xmlns:p="http://schemas.openxmlformats.org/presentationml/2006/main">
+  <p:cSld>
+    <p:spTree>
+      <p:nvGrpSpPr>
+        <p:cNvPr id="1" name=""/>
+        <p:cNvGrpSpPr/>
+        <p:nvPr/>
+      </p:nvGrpSpPr>
+      <p:grpSpPr>
+        <a:xfrm>
+          <a:off x="0" y="0"/>
+          <a:ext cx="0" cy="0"/>
+          <a:chOff x="0" y="0"/>
+          <a:chExt cx="0" cy="0"/>
+        </a:xfrm>
+      </p:grpSpPr>
+      <p:pic>
+        <p:nvPicPr>
+          <p:cNvPr id="2" name="Picture 1"/>
+          <p:cNvPicPr>
+            <a:picLocks noChangeAspect="1"/>
+          </p:cNvPicPr>
+          <p:nvPr/>
+        </p:nvPicPr>
+        <p:blipFill>
+          <a:blip r:embed="rId2"/>
+          <a:stretch>
+            <a:fillRect/>
+          </a:stretch>
+        </p:blipFill>
+        <p:spPr>
+          <a:xfrm>
+            <a:off x="5157986" y="1204112"/>
+            <a:ext cx="1086002" cy="1086002"/>
+          </a:xfrm>
+          <a:prstGeom prst="rect">
+            <a:avLst/>
+          </a:prstGeom>
+        </p:spPr>
+      </p:pic>
+      <p:pic>
+        <p:nvPicPr>
+          <p:cNvPr id="3" name="Picture 2"/>
+          <p:cNvPicPr>
+            <a:picLocks noChangeAspect="1"/>
+          </p:cNvPicPr>
+          <p:nvPr/>
+        </p:nvPicPr>
+        <p:blipFill>
+          <a:blip r:embed="rId3"/>
+          <a:stretch>
+            <a:fillRect/>
+          </a:stretch>
+        </p:blipFill>
+        <p:spPr>
+          <a:xfrm>
+            <a:off x="261442" y="396230"/>
+            <a:ext cx="4209297" cy="2764314"/>
+          </a:xfrm>
+          <a:prstGeom prst="rect">
+            <a:avLst/>
+          </a:prstGeom>
+        </p:spPr>
+      </p:pic>
+      <p:sp>
+        <p:nvSpPr>
+          <p:cNvPr id="4" name="Right Arrow 3"/>
+          <p:cNvSpPr/>
+          <p:nvPr/>
+        </p:nvSpPr>
+        <p:spPr>
+          <a:xfrm>
+            <a:off x="4470739" y="1747113"/>
+            <a:ext cx="471223" cy="161285"/>
+          </a:xfrm>
+          <a:prstGeom prst="rightArrow">
+            <a:avLst>
+              <a:gd name="adj1" fmla="val 52796"/>
+              <a:gd name="adj2" fmla="val 50000"/>
+            </a:avLst>
+          </a:prstGeom>
+          <a:solidFill>
+            <a:srgbClr val="C00000"/>
+          </a:solidFill>
+          <a:ln>
+            <a:solidFill>
+              <a:srgbClr val="C00000"/>
+            </a:solidFill>
+          </a:ln>
+        </p:spPr>
+        <p:style>
+          <a:lnRef idx="2">
+            <a:schemeClr val="accent1">
+              <a:shade val="50000"/>
+            </a:schemeClr>
+          </a:lnRef>
+          <a:fillRef idx="1">
+            <a:schemeClr val="accent1"/>
+          </a:fillRef>
+          <a:effectRef idx="0">
+            <a:schemeClr val="accent1"/>
+          </a:effectRef>
+          <a:fontRef idx="minor">
+            <a:schemeClr val="lt1"/>
+          </a:fontRef>
+        </p:style>
+        <p:txBody>
+          <a:bodyPr rtlCol="0" anchor="ctr"/>
+          <a:lstStyle/>
+          <a:p>
+            <a:pPr algn="ctr"/>
+            <a:endParaRPr lang="en-US"/>
+          </a:p>
+        </p:txBody>
+      </p:sp>
+    </p:spTree>
+    <p:extLst>
+      <p:ext uri="{BB962C8B-B14F-4D97-AF65-F5344CB8AC3E}">
+        <p14:creationId xmlns:p14="http://schemas.microsoft.com/office/powerpoint/2010/main" val="2218629875"/>
+      </p:ext>
+    </p:extLst>
+  </p:cSld>
+  <p:clrMapOvr>
+    <a:masterClrMapping/>
+  </p:clrMapOvr>
+</p:sld>
+</file>
+
+<file path=ppt/slides/slide2.xml><?xml version="1.0" encoding="utf-8"?>
+<p:sld xmlns:a="http://schemas.openxmlformats.org/drawingml/2006/main" xmlns:r="http://schemas.openxmlformats.org/officeDocument/2006/relationships" xmlns:p="http://schemas.openxmlformats.org/presentationml/2006/main">
+  <p:cSld>
+    <p:spTree>
+      <p:nvGrpSpPr>
+        <p:cNvPr id="1" name=""/>
+        <p:cNvGrpSpPr/>
+        <p:nvPr/>
+      </p:nvGrpSpPr>
+      <p:grpSpPr>
+        <a:xfrm>
+          <a:off x="0" y="0"/>
+          <a:ext cx="0" cy="0"/>
+          <a:chOff x="0" y="0"/>
+          <a:chExt cx="0" cy="0"/>
+        </a:xfrm>
+      </p:grpSpPr>
+      <p:pic>
+        <p:nvPicPr>
+          <p:cNvPr id="4" name="Picture 3"/>
+          <p:cNvPicPr>
+            <a:picLocks noChangeAspect="1"/>
+          </p:cNvPicPr>
+          <p:nvPr/>
+        </p:nvPicPr>
+        <p:blipFill>
+          <a:blip r:embed="rId2"/>
+          <a:stretch>
+            <a:fillRect/>
+          </a:stretch>
+        </p:blipFill>
+        <p:spPr>
+          <a:xfrm>
+            <a:off x="261442" y="540246"/>
+            <a:ext cx="3260772" cy="2592288"/>
+          </a:xfrm>
+          <a:prstGeom prst="rect">
+            <a:avLst/>
+          </a:prstGeom>
+        </p:spPr>
+      </p:pic>
+      <p:pic>
+        <p:nvPicPr>
+          <p:cNvPr id="1026" name="Picture 2" descr="https://hgserver1.amc.nl/r2/graph/xgv-MYCN-DBH-YYplot-1624280359.png"/>
+          <p:cNvPicPr>
+            <a:picLocks noChangeAspect="1" noChangeArrowheads="1"/>
+          </p:cNvPicPr>
+          <p:nvPr/>
+        </p:nvPicPr>
+        <p:blipFill>
+          <a:blip r:embed="rId3" cstate="print">
+            <a:extLst>
+              <a:ext uri="{28A0092B-C50C-407E-A947-70E740481C1C}">
+                <a14:useLocalDpi xmlns:a14="http://schemas.microsoft.com/office/drawing/2010/main" val="0"/>
+              </a:ext>
+            </a:extLst>
+          </a:blip>
+          <a:srcRect/>
+          <a:stretch>
+            <a:fillRect/>
+          </a:stretch>
+        </p:blipFill>
+        <p:spPr bwMode="auto">
+          <a:xfrm>
+            <a:off x="4509913" y="756270"/>
+            <a:ext cx="1521632" cy="1023417"/>
+          </a:xfrm>
+          <a:prstGeom prst="rect">
+            <a:avLst/>
+          </a:prstGeom>
+          <a:noFill/>
+          <a:extLst>
+            <a:ext uri="{909E8E84-426E-40DD-AFC4-6F175D3DCCD1}">
+              <a14:hiddenFill xmlns:a14="http://schemas.microsoft.com/office/drawing/2010/main">
+                <a:solidFill>
+                  <a:srgbClr val="FFFFFF"/>
+                </a:solidFill>
+              </a14:hiddenFill>
+            </a:ext>
+          </a:extLst>
+        </p:spPr>
+      </p:pic>
+      <p:pic>
+        <p:nvPicPr>
+          <p:cNvPr id="5" name="Picture 4"/>
+          <p:cNvPicPr>
+            <a:picLocks noChangeAspect="1"/>
+          </p:cNvPicPr>
+          <p:nvPr/>
+        </p:nvPicPr>
+        <p:blipFill>
+          <a:blip r:embed="rId4"/>
+          <a:stretch>
+            <a:fillRect/>
+          </a:stretch>
+        </p:blipFill>
+        <p:spPr>
+          <a:xfrm>
+            <a:off x="4275067" y="2124422"/>
+            <a:ext cx="2611111" cy="421147"/>
+          </a:xfrm>
+          <a:prstGeom prst="rect">
+            <a:avLst/>
+          </a:prstGeom>
+        </p:spPr>
+      </p:pic>
+    </p:spTree>
+    <p:extLst>
+      <p:ext uri="{BB962C8B-B14F-4D97-AF65-F5344CB8AC3E}">
+        <p14:creationId xmlns:p14="http://schemas.microsoft.com/office/powerpoint/2010/main" val="1802479454"/>
+      </p:ext>
+    </p:extLst>
+  </p:cSld>
+  <p:clrMapOvr>
+    <a:masterClrMapping/>
+  </p:clrMapOvr>
+</p:sld>
+</file>
+
+<file path=ppt/slides/slide20.xml><?xml version="1.0" encoding="utf-8"?>
+<p:sld xmlns:a="http://schemas.openxmlformats.org/drawingml/2006/main" xmlns:r="http://schemas.openxmlformats.org/officeDocument/2006/relationships" xmlns:p="http://schemas.openxmlformats.org/presentationml/2006/main">
+  <p:cSld>
+    <p:spTree>
+      <p:nvGrpSpPr>
+        <p:cNvPr id="1" name=""/>
+        <p:cNvGrpSpPr/>
+        <p:nvPr/>
+      </p:nvGrpSpPr>
+      <p:grpSpPr>
+        <a:xfrm>
+          <a:off x="0" y="0"/>
+          <a:ext cx="0" cy="0"/>
+          <a:chOff x="0" y="0"/>
+          <a:chExt cx="0" cy="0"/>
+        </a:xfrm>
+      </p:grpSpPr>
+      <p:pic>
+        <p:nvPicPr>
+          <p:cNvPr id="2" name="Picture 1"/>
+          <p:cNvPicPr>
+            <a:picLocks noChangeAspect="1"/>
+          </p:cNvPicPr>
+          <p:nvPr/>
+        </p:nvPicPr>
+        <p:blipFill>
+          <a:blip r:embed="rId2"/>
+          <a:stretch>
+            <a:fillRect/>
+          </a:stretch>
+        </p:blipFill>
+        <p:spPr>
+          <a:xfrm>
+            <a:off x="3141762" y="710738"/>
+            <a:ext cx="3539230" cy="2539336"/>
+          </a:xfrm>
+          <a:prstGeom prst="rect">
+            <a:avLst/>
+          </a:prstGeom>
+        </p:spPr>
+      </p:pic>
+      <p:pic>
+        <p:nvPicPr>
+          <p:cNvPr id="3" name="Picture 2"/>
+          <p:cNvPicPr>
+            <a:picLocks noChangeAspect="1"/>
+          </p:cNvPicPr>
+          <p:nvPr/>
+        </p:nvPicPr>
+        <p:blipFill>
+          <a:blip r:embed="rId3"/>
+          <a:stretch>
+            <a:fillRect/>
+          </a:stretch>
+        </p:blipFill>
+        <p:spPr>
+          <a:xfrm>
+            <a:off x="189434" y="1188318"/>
+            <a:ext cx="2520280" cy="1813933"/>
+          </a:xfrm>
+          <a:prstGeom prst="rect">
+            <a:avLst/>
+          </a:prstGeom>
+        </p:spPr>
+      </p:pic>
+      <p:sp>
+        <p:nvSpPr>
+          <p:cNvPr id="4" name="Right Arrow 3"/>
+          <p:cNvSpPr/>
+          <p:nvPr/>
+        </p:nvSpPr>
+        <p:spPr>
+          <a:xfrm>
+            <a:off x="2819121" y="2095284"/>
+            <a:ext cx="239519" cy="45719"/>
+          </a:xfrm>
+          <a:prstGeom prst="rightArrow">
+            <a:avLst/>
+          </a:prstGeom>
+          <a:solidFill>
+            <a:srgbClr val="C00000"/>
+          </a:solidFill>
+          <a:ln>
+            <a:solidFill>
+              <a:srgbClr val="C00000"/>
+            </a:solidFill>
+          </a:ln>
+        </p:spPr>
+        <p:style>
+          <a:lnRef idx="2">
+            <a:schemeClr val="accent1">
+              <a:shade val="50000"/>
+            </a:schemeClr>
+          </a:lnRef>
+          <a:fillRef idx="1">
+            <a:schemeClr val="accent1"/>
+          </a:fillRef>
+          <a:effectRef idx="0">
+            <a:schemeClr val="accent1"/>
+          </a:effectRef>
+          <a:fontRef idx="minor">
+            <a:schemeClr val="lt1"/>
+          </a:fontRef>
+        </p:style>
+        <p:txBody>
+          <a:bodyPr rtlCol="0" anchor="ctr"/>
+          <a:lstStyle/>
+          <a:p>
+            <a:pPr algn="ctr"/>
+            <a:endParaRPr lang="en-US"/>
+          </a:p>
+        </p:txBody>
+      </p:sp>
+      <p:sp>
+        <p:nvSpPr>
+          <p:cNvPr id="7" name="Rectangle 6"/>
+          <p:cNvSpPr/>
+          <p:nvPr/>
+        </p:nvSpPr>
+        <p:spPr>
+          <a:xfrm>
+            <a:off x="1197546" y="1188318"/>
+            <a:ext cx="504056" cy="216024"/>
+          </a:xfrm>
+          <a:prstGeom prst="rect">
+            <a:avLst/>
+          </a:prstGeom>
+          <a:noFill/>
+          <a:ln>
+            <a:solidFill>
+              <a:srgbClr val="C00000"/>
+            </a:solidFill>
+          </a:ln>
+        </p:spPr>
+        <p:style>
+          <a:lnRef idx="2">
+            <a:schemeClr val="accent1">
+              <a:shade val="50000"/>
+            </a:schemeClr>
+          </a:lnRef>
+          <a:fillRef idx="1">
+            <a:schemeClr val="accent1"/>
+          </a:fillRef>
+          <a:effectRef idx="0">
+            <a:schemeClr val="accent1"/>
+          </a:effectRef>
+          <a:fontRef idx="minor">
+            <a:schemeClr val="lt1"/>
+          </a:fontRef>
+        </p:style>
+        <p:txBody>
+          <a:bodyPr rtlCol="0" anchor="ctr"/>
+          <a:lstStyle/>
+          <a:p>
+            <a:pPr algn="ctr"/>
+            <a:endParaRPr lang="en-US"/>
+          </a:p>
+        </p:txBody>
+      </p:sp>
+    </p:spTree>
+    <p:extLst>
+      <p:ext uri="{BB962C8B-B14F-4D97-AF65-F5344CB8AC3E}">
+        <p14:creationId xmlns:p14="http://schemas.microsoft.com/office/powerpoint/2010/main" val="840258521"/>
+      </p:ext>
+    </p:extLst>
+  </p:cSld>
+  <p:clrMapOvr>
+    <a:masterClrMapping/>
+  </p:clrMapOvr>
+</p:sld>
+</file>
+
+<file path=ppt/slides/slide21.xml><?xml version="1.0" encoding="utf-8"?>
+<p:sld xmlns:a="http://schemas.openxmlformats.org/drawingml/2006/main" xmlns:r="http://schemas.openxmlformats.org/officeDocument/2006/relationships" xmlns:p="http://schemas.openxmlformats.org/presentationml/2006/main">
+  <p:cSld>
+    <p:spTree>
+      <p:nvGrpSpPr>
+        <p:cNvPr id="1" name=""/>
+        <p:cNvGrpSpPr/>
+        <p:nvPr/>
+      </p:nvGrpSpPr>
+      <p:grpSpPr>
+        <a:xfrm>
+          <a:off x="0" y="0"/>
+          <a:ext cx="0" cy="0"/>
+          <a:chOff x="0" y="0"/>
+          <a:chExt cx="0" cy="0"/>
+        </a:xfrm>
+      </p:grpSpPr>
+      <p:pic>
+        <p:nvPicPr>
+          <p:cNvPr id="2" name="Picture 1"/>
+          <p:cNvPicPr>
+            <a:picLocks noChangeAspect="1"/>
+          </p:cNvPicPr>
+          <p:nvPr/>
+        </p:nvPicPr>
+        <p:blipFill>
+          <a:blip r:embed="rId2"/>
+          <a:stretch>
+            <a:fillRect/>
+          </a:stretch>
+        </p:blipFill>
+        <p:spPr>
+          <a:xfrm>
+            <a:off x="0" y="883556"/>
+            <a:ext cx="2937926" cy="2016224"/>
+          </a:xfrm>
+          <a:prstGeom prst="rect">
+            <a:avLst/>
+          </a:prstGeom>
+        </p:spPr>
+      </p:pic>
+      <p:pic>
+        <p:nvPicPr>
+          <p:cNvPr id="1028" name="Picture 4" descr="https://hgserver2.amc.nl/r2/graph/xgv-MYCN-DBH-YYplot-1635779801.png"/>
           <p:cNvPicPr>
             <a:picLocks noChangeAspect="1" noChangeArrowheads="1"/>
           </p:cNvPicPr>
@@ -3559,30 +4735,112 @@
         </p:blipFill>
         <p:spPr bwMode="auto">
           <a:xfrm>
-            <a:off x="2421682" y="344363"/>
-            <a:ext cx="2047997" cy="3292227"/>
+            <a:off x="3013829" y="540246"/>
+            <a:ext cx="3863508" cy="2702844"/>
           </a:xfrm>
           <a:prstGeom prst="rect">
             <a:avLst/>
           </a:prstGeom>
           <a:noFill/>
-          <a:ln w="28575">
-            <a:noFill/>
-          </a:ln>
-          <a:effectLst/>
-          <a:extLst/>
+          <a:extLst>
+            <a:ext uri="{909E8E84-426E-40DD-AFC4-6F175D3DCCD1}">
+              <a14:hiddenFill xmlns:a14="http://schemas.microsoft.com/office/drawing/2010/main">
+                <a:solidFill>
+                  <a:srgbClr val="FFFFFF"/>
+                </a:solidFill>
+              </a14:hiddenFill>
+            </a:ext>
+          </a:extLst>
         </p:spPr>
       </p:pic>
-      <p:sp>
-        <p:nvSpPr>
-          <p:cNvPr id="3" name="Rectangle 2"/>
+    </p:spTree>
+    <p:extLst>
+      <p:ext uri="{BB962C8B-B14F-4D97-AF65-F5344CB8AC3E}">
+        <p14:creationId xmlns:p14="http://schemas.microsoft.com/office/powerpoint/2010/main" val="2432468697"/>
+      </p:ext>
+    </p:extLst>
+  </p:cSld>
+  <p:clrMapOvr>
+    <a:masterClrMapping/>
+  </p:clrMapOvr>
+</p:sld>
+</file>
+
+<file path=ppt/slides/slide22.xml><?xml version="1.0" encoding="utf-8"?>
+<p:sld xmlns:a="http://schemas.openxmlformats.org/drawingml/2006/main" xmlns:r="http://schemas.openxmlformats.org/officeDocument/2006/relationships" xmlns:p="http://schemas.openxmlformats.org/presentationml/2006/main">
+  <p:cSld>
+    <p:spTree>
+      <p:nvGrpSpPr>
+        <p:cNvPr id="1" name=""/>
+        <p:cNvGrpSpPr/>
+        <p:nvPr/>
+      </p:nvGrpSpPr>
+      <p:grpSpPr>
+        <a:xfrm>
+          <a:off x="0" y="0"/>
+          <a:ext cx="0" cy="0"/>
+          <a:chOff x="0" y="0"/>
+          <a:chExt cx="0" cy="0"/>
+        </a:xfrm>
+      </p:grpSpPr>
+      <p:pic>
+        <p:nvPicPr>
+          <p:cNvPr id="3" name="Picture 2"/>
+          <p:cNvPicPr>
+            <a:picLocks noChangeAspect="1"/>
+          </p:cNvPicPr>
+          <p:nvPr/>
+        </p:nvPicPr>
+        <p:blipFill>
+          <a:blip r:embed="rId2"/>
+          <a:stretch>
+            <a:fillRect/>
+          </a:stretch>
+        </p:blipFill>
+        <p:spPr>
+          <a:xfrm>
+            <a:off x="20080" y="1044302"/>
+            <a:ext cx="3038542" cy="2165564"/>
+          </a:xfrm>
+          <a:prstGeom prst="rect">
+            <a:avLst/>
+          </a:prstGeom>
+        </p:spPr>
+      </p:pic>
+      <p:pic>
+        <p:nvPicPr>
+          <p:cNvPr id="2" name="Picture 1"/>
+          <p:cNvPicPr>
+            <a:picLocks noChangeAspect="1"/>
+          </p:cNvPicPr>
+          <p:nvPr/>
+        </p:nvPicPr>
+        <p:blipFill>
+          <a:blip r:embed="rId3"/>
+          <a:stretch>
+            <a:fillRect/>
+          </a:stretch>
+        </p:blipFill>
+        <p:spPr>
+          <a:xfrm>
+            <a:off x="2997746" y="771171"/>
+            <a:ext cx="3830118" cy="2543806"/>
+          </a:xfrm>
+          <a:prstGeom prst="rect">
+            <a:avLst/>
+          </a:prstGeom>
+        </p:spPr>
+      </p:pic>
+      <p:sp>
+        <p:nvSpPr>
+          <p:cNvPr id="4" name="Rectangle 3"/>
           <p:cNvSpPr/>
           <p:nvPr/>
         </p:nvSpPr>
         <p:spPr>
           <a:xfrm>
-            <a:off x="3305076" y="2357826"/>
-            <a:ext cx="988814" cy="144016"/>
+            <a:off x="765498" y="2268438"/>
+            <a:ext cx="1080120" cy="144016"/>
           </a:xfrm>
           <a:prstGeom prst="rect">
             <a:avLst/>
@@ -3621,14 +4879,14 @@
       </p:sp>
       <p:sp>
         <p:nvSpPr>
-          <p:cNvPr id="4" name="Rectangle 3"/>
+          <p:cNvPr id="5" name="Rectangle 4"/>
           <p:cNvSpPr/>
           <p:nvPr/>
         </p:nvSpPr>
         <p:spPr>
           <a:xfrm>
-            <a:off x="2421682" y="1352475"/>
-            <a:ext cx="988814" cy="144016"/>
+            <a:off x="1228002" y="1044302"/>
+            <a:ext cx="576064" cy="288032"/>
           </a:xfrm>
           <a:prstGeom prst="rect">
             <a:avLst/>
@@ -3668,13 +4926,1291 @@
     </p:spTree>
     <p:extLst>
       <p:ext uri="{BB962C8B-B14F-4D97-AF65-F5344CB8AC3E}">
-        <p14:creationId xmlns:p14="http://schemas.microsoft.com/office/powerpoint/2010/main" val="89248705"/>
+        <p14:creationId xmlns:p14="http://schemas.microsoft.com/office/powerpoint/2010/main" val="884450257"/>
       </p:ext>
     </p:extLst>
   </p:cSld>
   <p:clrMapOvr>
     <a:masterClrMapping/>
   </p:clrMapOvr>
+</p:sld>
+</file>
+
+<file path=ppt/slides/slide23.xml><?xml version="1.0" encoding="utf-8"?>
+<p:sld xmlns:a="http://schemas.openxmlformats.org/drawingml/2006/main" xmlns:r="http://schemas.openxmlformats.org/officeDocument/2006/relationships" xmlns:p="http://schemas.openxmlformats.org/presentationml/2006/main">
+  <p:cSld>
+    <p:spTree>
+      <p:nvGrpSpPr>
+        <p:cNvPr id="1" name=""/>
+        <p:cNvGrpSpPr/>
+        <p:nvPr/>
+      </p:nvGrpSpPr>
+      <p:grpSpPr>
+        <a:xfrm>
+          <a:off x="0" y="0"/>
+          <a:ext cx="0" cy="0"/>
+          <a:chOff x="0" y="0"/>
+          <a:chExt cx="0" cy="0"/>
+        </a:xfrm>
+      </p:grpSpPr>
+      <p:pic>
+        <p:nvPicPr>
+          <p:cNvPr id="1026" name="Picture 2" descr="https://hgserver2.amc.nl/r2/graph/NG_agegroup-alive-XYplot-1635942174484.png"/>
+          <p:cNvPicPr>
+            <a:picLocks noChangeAspect="1" noChangeArrowheads="1"/>
+          </p:cNvPicPr>
+          <p:nvPr/>
+        </p:nvPicPr>
+        <p:blipFill>
+          <a:blip r:embed="rId2" cstate="print">
+            <a:extLst>
+              <a:ext uri="{28A0092B-C50C-407E-A947-70E740481C1C}">
+                <a14:useLocalDpi xmlns:a14="http://schemas.microsoft.com/office/drawing/2010/main" val="0"/>
+              </a:ext>
+            </a:extLst>
+          </a:blip>
+          <a:srcRect/>
+          <a:stretch>
+            <a:fillRect/>
+          </a:stretch>
+        </p:blipFill>
+        <p:spPr bwMode="auto">
+          <a:xfrm>
+            <a:off x="189434" y="684262"/>
+            <a:ext cx="1659753" cy="1944216"/>
+          </a:xfrm>
+          <a:prstGeom prst="rect">
+            <a:avLst/>
+          </a:prstGeom>
+          <a:noFill/>
+          <a:extLst>
+            <a:ext uri="{909E8E84-426E-40DD-AFC4-6F175D3DCCD1}">
+              <a14:hiddenFill xmlns:a14="http://schemas.microsoft.com/office/drawing/2010/main">
+                <a:solidFill>
+                  <a:srgbClr val="FFFFFF"/>
+                </a:solidFill>
+              </a14:hiddenFill>
+            </a:ext>
+          </a:extLst>
+        </p:spPr>
+      </p:pic>
+      <p:sp>
+        <p:nvSpPr>
+          <p:cNvPr id="2" name="TextBox 1"/>
+          <p:cNvSpPr txBox="1"/>
+          <p:nvPr/>
+        </p:nvSpPr>
+        <p:spPr>
+          <a:xfrm>
+            <a:off x="189434" y="252214"/>
+            <a:ext cx="1070678" cy="276999"/>
+          </a:xfrm>
+          <a:prstGeom prst="rect">
+            <a:avLst/>
+          </a:prstGeom>
+          <a:noFill/>
+        </p:spPr>
+        <p:txBody>
+          <a:bodyPr wrap="none" rtlCol="0">
+            <a:spAutoFit/>
+          </a:bodyPr>
+          <a:lstStyle/>
+          <a:p>
+            <a:r>
+              <a:rPr lang="nl-NL" sz="1200" dirty="0" smtClean="0"/>
+              <a:t>Track </a:t>
+            </a:r>
+            <a:r>
+              <a:rPr lang="nl-NL" sz="1200" dirty="0" err="1" smtClean="0"/>
+              <a:t>vs</a:t>
+            </a:r>
+            <a:r>
+              <a:rPr lang="nl-NL" sz="1200" dirty="0" smtClean="0"/>
+              <a:t> Track </a:t>
+            </a:r>
+            <a:endParaRPr lang="en-US" sz="1200" dirty="0"/>
+          </a:p>
+        </p:txBody>
+      </p:sp>
+      <p:pic>
+        <p:nvPicPr>
+          <p:cNvPr id="4" name="Picture 3"/>
+          <p:cNvPicPr>
+            <a:picLocks noChangeAspect="1"/>
+          </p:cNvPicPr>
+          <p:nvPr/>
+        </p:nvPicPr>
+        <p:blipFill>
+          <a:blip r:embed="rId3"/>
+          <a:stretch>
+            <a:fillRect/>
+          </a:stretch>
+        </p:blipFill>
+        <p:spPr>
+          <a:xfrm>
+            <a:off x="3573810" y="1764382"/>
+            <a:ext cx="2088232" cy="1909792"/>
+          </a:xfrm>
+          <a:prstGeom prst="rect">
+            <a:avLst/>
+          </a:prstGeom>
+        </p:spPr>
+      </p:pic>
+      <p:pic>
+        <p:nvPicPr>
+          <p:cNvPr id="6" name="Picture 5"/>
+          <p:cNvPicPr>
+            <a:picLocks noChangeAspect="1"/>
+          </p:cNvPicPr>
+          <p:nvPr/>
+        </p:nvPicPr>
+        <p:blipFill>
+          <a:blip r:embed="rId4"/>
+          <a:stretch>
+            <a:fillRect/>
+          </a:stretch>
+        </p:blipFill>
+        <p:spPr>
+          <a:xfrm>
+            <a:off x="4221882" y="468238"/>
+            <a:ext cx="792088" cy="799224"/>
+          </a:xfrm>
+          <a:prstGeom prst="rect">
+            <a:avLst/>
+          </a:prstGeom>
+        </p:spPr>
+      </p:pic>
+      <p:sp>
+        <p:nvSpPr>
+          <p:cNvPr id="7" name="Down Arrow 6"/>
+          <p:cNvSpPr/>
+          <p:nvPr/>
+        </p:nvSpPr>
+        <p:spPr>
+          <a:xfrm>
+            <a:off x="4581922" y="1404342"/>
+            <a:ext cx="72008" cy="252028"/>
+          </a:xfrm>
+          <a:prstGeom prst="downArrow">
+            <a:avLst/>
+          </a:prstGeom>
+          <a:solidFill>
+            <a:srgbClr val="C00000"/>
+          </a:solidFill>
+          <a:ln>
+            <a:solidFill>
+              <a:srgbClr val="C00000"/>
+            </a:solidFill>
+          </a:ln>
+        </p:spPr>
+        <p:style>
+          <a:lnRef idx="2">
+            <a:schemeClr val="accent1">
+              <a:shade val="50000"/>
+            </a:schemeClr>
+          </a:lnRef>
+          <a:fillRef idx="1">
+            <a:schemeClr val="accent1"/>
+          </a:fillRef>
+          <a:effectRef idx="0">
+            <a:schemeClr val="accent1"/>
+          </a:effectRef>
+          <a:fontRef idx="minor">
+            <a:schemeClr val="lt1"/>
+          </a:fontRef>
+        </p:style>
+        <p:txBody>
+          <a:bodyPr rtlCol="0" anchor="ctr"/>
+          <a:lstStyle/>
+          <a:p>
+            <a:pPr algn="ctr"/>
+            <a:endParaRPr lang="en-US"/>
+          </a:p>
+        </p:txBody>
+      </p:sp>
+    </p:spTree>
+    <p:extLst>
+      <p:ext uri="{BB962C8B-B14F-4D97-AF65-F5344CB8AC3E}">
+        <p14:creationId xmlns:p14="http://schemas.microsoft.com/office/powerpoint/2010/main" val="161795916"/>
+      </p:ext>
+    </p:extLst>
+  </p:cSld>
+  <p:clrMapOvr>
+    <a:masterClrMapping/>
+  </p:clrMapOvr>
+</p:sld>
+</file>
+
+<file path=ppt/slides/slide24.xml><?xml version="1.0" encoding="utf-8"?>
+<p:sld xmlns:a="http://schemas.openxmlformats.org/drawingml/2006/main" xmlns:r="http://schemas.openxmlformats.org/officeDocument/2006/relationships" xmlns:p="http://schemas.openxmlformats.org/presentationml/2006/main">
+  <p:cSld>
+    <p:spTree>
+      <p:nvGrpSpPr>
+        <p:cNvPr id="1" name=""/>
+        <p:cNvGrpSpPr/>
+        <p:nvPr/>
+      </p:nvGrpSpPr>
+      <p:grpSpPr>
+        <a:xfrm>
+          <a:off x="0" y="0"/>
+          <a:ext cx="0" cy="0"/>
+          <a:chOff x="0" y="0"/>
+          <a:chExt cx="0" cy="0"/>
+        </a:xfrm>
+      </p:grpSpPr>
+      <p:pic>
+        <p:nvPicPr>
+          <p:cNvPr id="2" name="Picture 1"/>
+          <p:cNvPicPr>
+            <a:picLocks noChangeAspect="1"/>
+          </p:cNvPicPr>
+          <p:nvPr/>
+        </p:nvPicPr>
+        <p:blipFill>
+          <a:blip r:embed="rId2"/>
+          <a:stretch>
+            <a:fillRect/>
+          </a:stretch>
+        </p:blipFill>
+        <p:spPr>
+          <a:xfrm>
+            <a:off x="2413373" y="2484462"/>
+            <a:ext cx="1872208" cy="457877"/>
+          </a:xfrm>
+          <a:prstGeom prst="rect">
+            <a:avLst/>
+          </a:prstGeom>
+        </p:spPr>
+      </p:pic>
+      <p:pic>
+        <p:nvPicPr>
+          <p:cNvPr id="3" name="Picture 2"/>
+          <p:cNvPicPr>
+            <a:picLocks noChangeAspect="1"/>
+          </p:cNvPicPr>
+          <p:nvPr/>
+        </p:nvPicPr>
+        <p:blipFill>
+          <a:blip r:embed="rId3"/>
+          <a:stretch>
+            <a:fillRect/>
+          </a:stretch>
+        </p:blipFill>
+        <p:spPr>
+          <a:xfrm>
+            <a:off x="1269554" y="324222"/>
+            <a:ext cx="4159847" cy="1872208"/>
+          </a:xfrm>
+          <a:prstGeom prst="rect">
+            <a:avLst/>
+          </a:prstGeom>
+        </p:spPr>
+      </p:pic>
+    </p:spTree>
+    <p:extLst>
+      <p:ext uri="{BB962C8B-B14F-4D97-AF65-F5344CB8AC3E}">
+        <p14:creationId xmlns:p14="http://schemas.microsoft.com/office/powerpoint/2010/main" val="1092212748"/>
+      </p:ext>
+    </p:extLst>
+  </p:cSld>
+  <p:clrMapOvr>
+    <a:masterClrMapping/>
+  </p:clrMapOvr>
+</p:sld>
+</file>
+
+<file path=ppt/slides/slide25.xml><?xml version="1.0" encoding="utf-8"?>
+<p:sld xmlns:a="http://schemas.openxmlformats.org/drawingml/2006/main" xmlns:r="http://schemas.openxmlformats.org/officeDocument/2006/relationships" xmlns:p="http://schemas.openxmlformats.org/presentationml/2006/main">
+  <p:cSld>
+    <p:spTree>
+      <p:nvGrpSpPr>
+        <p:cNvPr id="1" name=""/>
+        <p:cNvGrpSpPr/>
+        <p:nvPr/>
+      </p:nvGrpSpPr>
+      <p:grpSpPr>
+        <a:xfrm>
+          <a:off x="0" y="0"/>
+          <a:ext cx="0" cy="0"/>
+          <a:chOff x="0" y="0"/>
+          <a:chExt cx="0" cy="0"/>
+        </a:xfrm>
+      </p:grpSpPr>
+      <p:pic>
+        <p:nvPicPr>
+          <p:cNvPr id="3" name="Picture 2"/>
+          <p:cNvPicPr>
+            <a:picLocks noChangeAspect="1"/>
+          </p:cNvPicPr>
+          <p:nvPr/>
+        </p:nvPicPr>
+        <p:blipFill>
+          <a:blip r:embed="rId2"/>
+          <a:stretch>
+            <a:fillRect/>
+          </a:stretch>
+        </p:blipFill>
+        <p:spPr>
+          <a:xfrm>
+            <a:off x="1269554" y="396230"/>
+            <a:ext cx="4353449" cy="1692375"/>
+          </a:xfrm>
+          <a:prstGeom prst="rect">
+            <a:avLst/>
+          </a:prstGeom>
+        </p:spPr>
+      </p:pic>
+      <p:pic>
+        <p:nvPicPr>
+          <p:cNvPr id="4" name="Picture 3"/>
+          <p:cNvPicPr>
+            <a:picLocks noChangeAspect="1"/>
+          </p:cNvPicPr>
+          <p:nvPr/>
+        </p:nvPicPr>
+        <p:blipFill>
+          <a:blip r:embed="rId3"/>
+          <a:stretch>
+            <a:fillRect/>
+          </a:stretch>
+        </p:blipFill>
+        <p:spPr>
+          <a:xfrm>
+            <a:off x="1773610" y="2268438"/>
+            <a:ext cx="3095215" cy="1054923"/>
+          </a:xfrm>
+          <a:prstGeom prst="rect">
+            <a:avLst/>
+          </a:prstGeom>
+        </p:spPr>
+      </p:pic>
+    </p:spTree>
+    <p:extLst>
+      <p:ext uri="{BB962C8B-B14F-4D97-AF65-F5344CB8AC3E}">
+        <p14:creationId xmlns:p14="http://schemas.microsoft.com/office/powerpoint/2010/main" val="1391973602"/>
+      </p:ext>
+    </p:extLst>
+  </p:cSld>
+  <p:clrMapOvr>
+    <a:masterClrMapping/>
+  </p:clrMapOvr>
+</p:sld>
+</file>
+
+<file path=ppt/slides/slide26.xml><?xml version="1.0" encoding="utf-8"?>
+<p:sld xmlns:a="http://schemas.openxmlformats.org/drawingml/2006/main" xmlns:r="http://schemas.openxmlformats.org/officeDocument/2006/relationships" xmlns:p="http://schemas.openxmlformats.org/presentationml/2006/main">
+  <p:cSld>
+    <p:spTree>
+      <p:nvGrpSpPr>
+        <p:cNvPr id="1" name=""/>
+        <p:cNvGrpSpPr/>
+        <p:nvPr/>
+      </p:nvGrpSpPr>
+      <p:grpSpPr>
+        <a:xfrm>
+          <a:off x="0" y="0"/>
+          <a:ext cx="0" cy="0"/>
+          <a:chOff x="0" y="0"/>
+          <a:chExt cx="0" cy="0"/>
+        </a:xfrm>
+      </p:grpSpPr>
+      <p:pic>
+        <p:nvPicPr>
+          <p:cNvPr id="1026" name="Picture 2" descr="https://hgserver1.amc.nl/r2/graph/16391314723468.png"/>
+          <p:cNvPicPr>
+            <a:picLocks noChangeAspect="1" noChangeArrowheads="1"/>
+          </p:cNvPicPr>
+          <p:nvPr/>
+        </p:nvPicPr>
+        <p:blipFill>
+          <a:blip r:embed="rId2">
+            <a:extLst>
+              <a:ext uri="{28A0092B-C50C-407E-A947-70E740481C1C}">
+                <a14:useLocalDpi xmlns:a14="http://schemas.microsoft.com/office/drawing/2010/main" val="0"/>
+              </a:ext>
+            </a:extLst>
+          </a:blip>
+          <a:srcRect/>
+          <a:stretch>
+            <a:fillRect/>
+          </a:stretch>
+        </p:blipFill>
+        <p:spPr bwMode="auto">
+          <a:xfrm>
+            <a:off x="511305" y="1104904"/>
+            <a:ext cx="1728192" cy="1879094"/>
+          </a:xfrm>
+          <a:prstGeom prst="rect">
+            <a:avLst/>
+          </a:prstGeom>
+          <a:noFill/>
+          <a:extLst>
+            <a:ext uri="{909E8E84-426E-40DD-AFC4-6F175D3DCCD1}">
+              <a14:hiddenFill xmlns:a14="http://schemas.microsoft.com/office/drawing/2010/main">
+                <a:solidFill>
+                  <a:srgbClr val="FFFFFF"/>
+                </a:solidFill>
+              </a14:hiddenFill>
+            </a:ext>
+          </a:extLst>
+        </p:spPr>
+      </p:pic>
+      <p:pic>
+        <p:nvPicPr>
+          <p:cNvPr id="1028" name="Picture 4" descr="https://hgserver1.amc.nl/r2/graph/NG_alive-MYCN-Boxplot-16391315379349.png"/>
+          <p:cNvPicPr>
+            <a:picLocks noChangeAspect="1" noChangeArrowheads="1"/>
+          </p:cNvPicPr>
+          <p:nvPr/>
+        </p:nvPicPr>
+        <p:blipFill>
+          <a:blip r:embed="rId3">
+            <a:extLst>
+              <a:ext uri="{28A0092B-C50C-407E-A947-70E740481C1C}">
+                <a14:useLocalDpi xmlns:a14="http://schemas.microsoft.com/office/drawing/2010/main" val="0"/>
+              </a:ext>
+            </a:extLst>
+          </a:blip>
+          <a:srcRect/>
+          <a:stretch>
+            <a:fillRect/>
+          </a:stretch>
+        </p:blipFill>
+        <p:spPr bwMode="auto">
+          <a:xfrm>
+            <a:off x="2311505" y="1116311"/>
+            <a:ext cx="1872208" cy="1998116"/>
+          </a:xfrm>
+          <a:prstGeom prst="rect">
+            <a:avLst/>
+          </a:prstGeom>
+          <a:noFill/>
+          <a:extLst>
+            <a:ext uri="{909E8E84-426E-40DD-AFC4-6F175D3DCCD1}">
+              <a14:hiddenFill xmlns:a14="http://schemas.microsoft.com/office/drawing/2010/main">
+                <a:solidFill>
+                  <a:srgbClr val="FFFFFF"/>
+                </a:solidFill>
+              </a14:hiddenFill>
+            </a:ext>
+          </a:extLst>
+        </p:spPr>
+      </p:pic>
+      <p:pic>
+        <p:nvPicPr>
+          <p:cNvPr id="1030" name="Picture 6" descr="https://hgserver1.amc.nl/r2/graph/NG_alive-MYCN-Barplot-16391315765398.png"/>
+          <p:cNvPicPr>
+            <a:picLocks noChangeAspect="1" noChangeArrowheads="1"/>
+          </p:cNvPicPr>
+          <p:nvPr/>
+        </p:nvPicPr>
+        <p:blipFill>
+          <a:blip r:embed="rId4">
+            <a:extLst>
+              <a:ext uri="{28A0092B-C50C-407E-A947-70E740481C1C}">
+                <a14:useLocalDpi xmlns:a14="http://schemas.microsoft.com/office/drawing/2010/main" val="0"/>
+              </a:ext>
+            </a:extLst>
+          </a:blip>
+          <a:srcRect/>
+          <a:stretch>
+            <a:fillRect/>
+          </a:stretch>
+        </p:blipFill>
+        <p:spPr bwMode="auto">
+          <a:xfrm>
+            <a:off x="4319304" y="1116311"/>
+            <a:ext cx="1774786" cy="1911440"/>
+          </a:xfrm>
+          <a:prstGeom prst="rect">
+            <a:avLst/>
+          </a:prstGeom>
+          <a:noFill/>
+          <a:extLst>
+            <a:ext uri="{909E8E84-426E-40DD-AFC4-6F175D3DCCD1}">
+              <a14:hiddenFill xmlns:a14="http://schemas.microsoft.com/office/drawing/2010/main">
+                <a:solidFill>
+                  <a:srgbClr val="FFFFFF"/>
+                </a:solidFill>
+              </a14:hiddenFill>
+            </a:ext>
+          </a:extLst>
+        </p:spPr>
+      </p:pic>
+    </p:spTree>
+    <p:extLst>
+      <p:ext uri="{BB962C8B-B14F-4D97-AF65-F5344CB8AC3E}">
+        <p14:creationId xmlns:p14="http://schemas.microsoft.com/office/powerpoint/2010/main" val="3991602566"/>
+      </p:ext>
+    </p:extLst>
+  </p:cSld>
+  <p:clrMapOvr>
+    <a:masterClrMapping/>
+  </p:clrMapOvr>
+</p:sld>
+</file>
+
+<file path=ppt/slides/slide27.xml><?xml version="1.0" encoding="utf-8"?>
+<p:sld xmlns:a="http://schemas.openxmlformats.org/drawingml/2006/main" xmlns:r="http://schemas.openxmlformats.org/officeDocument/2006/relationships" xmlns:p="http://schemas.openxmlformats.org/presentationml/2006/main">
+  <p:cSld>
+    <p:spTree>
+      <p:nvGrpSpPr>
+        <p:cNvPr id="1" name=""/>
+        <p:cNvGrpSpPr/>
+        <p:nvPr/>
+      </p:nvGrpSpPr>
+      <p:grpSpPr>
+        <a:xfrm>
+          <a:off x="0" y="0"/>
+          <a:ext cx="0" cy="0"/>
+          <a:chOff x="0" y="0"/>
+          <a:chExt cx="0" cy="0"/>
+        </a:xfrm>
+      </p:grpSpPr>
+      <p:pic>
+        <p:nvPicPr>
+          <p:cNvPr id="2" name="Picture 1"/>
+          <p:cNvPicPr>
+            <a:picLocks noChangeAspect="1"/>
+          </p:cNvPicPr>
+          <p:nvPr/>
+        </p:nvPicPr>
+        <p:blipFill>
+          <a:blip r:embed="rId2"/>
+          <a:stretch>
+            <a:fillRect/>
+          </a:stretch>
+        </p:blipFill>
+        <p:spPr>
+          <a:xfrm>
+            <a:off x="765498" y="252214"/>
+            <a:ext cx="2304256" cy="1437726"/>
+          </a:xfrm>
+          <a:prstGeom prst="rect">
+            <a:avLst/>
+          </a:prstGeom>
+        </p:spPr>
+      </p:pic>
+      <p:pic>
+        <p:nvPicPr>
+          <p:cNvPr id="3" name="Picture 2"/>
+          <p:cNvPicPr>
+            <a:picLocks noChangeAspect="1"/>
+          </p:cNvPicPr>
+          <p:nvPr/>
+        </p:nvPicPr>
+        <p:blipFill>
+          <a:blip r:embed="rId3"/>
+          <a:stretch>
+            <a:fillRect/>
+          </a:stretch>
+        </p:blipFill>
+        <p:spPr>
+          <a:xfrm>
+            <a:off x="3357786" y="468238"/>
+            <a:ext cx="1924319" cy="657317"/>
+          </a:xfrm>
+          <a:prstGeom prst="rect">
+            <a:avLst/>
+          </a:prstGeom>
+        </p:spPr>
+      </p:pic>
+      <p:pic>
+        <p:nvPicPr>
+          <p:cNvPr id="4" name="Picture 3"/>
+          <p:cNvPicPr>
+            <a:picLocks noChangeAspect="1"/>
+          </p:cNvPicPr>
+          <p:nvPr/>
+        </p:nvPicPr>
+        <p:blipFill>
+          <a:blip r:embed="rId4"/>
+          <a:stretch>
+            <a:fillRect/>
+          </a:stretch>
+        </p:blipFill>
+        <p:spPr>
+          <a:xfrm>
+            <a:off x="693490" y="2052414"/>
+            <a:ext cx="6004768" cy="1296144"/>
+          </a:xfrm>
+          <a:prstGeom prst="rect">
+            <a:avLst/>
+          </a:prstGeom>
+        </p:spPr>
+      </p:pic>
+      <p:sp>
+        <p:nvSpPr>
+          <p:cNvPr id="6" name="Right Arrow 5"/>
+          <p:cNvSpPr/>
+          <p:nvPr/>
+        </p:nvSpPr>
+        <p:spPr>
+          <a:xfrm>
+            <a:off x="2997746" y="796896"/>
+            <a:ext cx="216024" cy="45719"/>
+          </a:xfrm>
+          <a:prstGeom prst="rightArrow">
+            <a:avLst/>
+          </a:prstGeom>
+          <a:solidFill>
+            <a:srgbClr val="C00000"/>
+          </a:solidFill>
+          <a:ln>
+            <a:solidFill>
+              <a:srgbClr val="C00000"/>
+            </a:solidFill>
+          </a:ln>
+        </p:spPr>
+        <p:style>
+          <a:lnRef idx="2">
+            <a:schemeClr val="accent1">
+              <a:shade val="50000"/>
+            </a:schemeClr>
+          </a:lnRef>
+          <a:fillRef idx="1">
+            <a:schemeClr val="accent1"/>
+          </a:fillRef>
+          <a:effectRef idx="0">
+            <a:schemeClr val="accent1"/>
+          </a:effectRef>
+          <a:fontRef idx="minor">
+            <a:schemeClr val="lt1"/>
+          </a:fontRef>
+        </p:style>
+        <p:txBody>
+          <a:bodyPr rtlCol="0" anchor="ctr"/>
+          <a:lstStyle/>
+          <a:p>
+            <a:pPr algn="ctr"/>
+            <a:endParaRPr lang="en-US"/>
+          </a:p>
+        </p:txBody>
+      </p:sp>
+      <p:sp>
+        <p:nvSpPr>
+          <p:cNvPr id="7" name="Down Arrow 6"/>
+          <p:cNvSpPr/>
+          <p:nvPr/>
+        </p:nvSpPr>
+        <p:spPr>
+          <a:xfrm rot="2359432">
+            <a:off x="3412305" y="1364714"/>
+            <a:ext cx="78921" cy="648072"/>
+          </a:xfrm>
+          <a:prstGeom prst="downArrow">
+            <a:avLst/>
+          </a:prstGeom>
+          <a:solidFill>
+            <a:srgbClr val="C00000"/>
+          </a:solidFill>
+          <a:ln>
+            <a:solidFill>
+              <a:srgbClr val="C00000"/>
+            </a:solidFill>
+          </a:ln>
+        </p:spPr>
+        <p:style>
+          <a:lnRef idx="2">
+            <a:schemeClr val="accent1">
+              <a:shade val="50000"/>
+            </a:schemeClr>
+          </a:lnRef>
+          <a:fillRef idx="1">
+            <a:schemeClr val="accent1"/>
+          </a:fillRef>
+          <a:effectRef idx="0">
+            <a:schemeClr val="accent1"/>
+          </a:effectRef>
+          <a:fontRef idx="minor">
+            <a:schemeClr val="lt1"/>
+          </a:fontRef>
+        </p:style>
+        <p:txBody>
+          <a:bodyPr rtlCol="0" anchor="ctr"/>
+          <a:lstStyle/>
+          <a:p>
+            <a:pPr algn="ctr"/>
+            <a:endParaRPr lang="en-US"/>
+          </a:p>
+        </p:txBody>
+      </p:sp>
+    </p:spTree>
+    <p:extLst>
+      <p:ext uri="{BB962C8B-B14F-4D97-AF65-F5344CB8AC3E}">
+        <p14:creationId xmlns:p14="http://schemas.microsoft.com/office/powerpoint/2010/main" val="1076205338"/>
+      </p:ext>
+    </p:extLst>
+  </p:cSld>
+  <p:clrMapOvr>
+    <a:masterClrMapping/>
+  </p:clrMapOvr>
+</p:sld>
+</file>
+
+<file path=ppt/slides/slide3.xml><?xml version="1.0" encoding="utf-8"?>
+<p:sld xmlns:a="http://schemas.openxmlformats.org/drawingml/2006/main" xmlns:r="http://schemas.openxmlformats.org/officeDocument/2006/relationships" xmlns:p="http://schemas.openxmlformats.org/presentationml/2006/main">
+  <p:cSld>
+    <p:spTree>
+      <p:nvGrpSpPr>
+        <p:cNvPr id="1" name=""/>
+        <p:cNvGrpSpPr/>
+        <p:nvPr/>
+      </p:nvGrpSpPr>
+      <p:grpSpPr>
+        <a:xfrm>
+          <a:off x="0" y="0"/>
+          <a:ext cx="0" cy="0"/>
+          <a:chOff x="0" y="0"/>
+          <a:chExt cx="0" cy="0"/>
+        </a:xfrm>
+      </p:grpSpPr>
+      <p:pic>
+        <p:nvPicPr>
+          <p:cNvPr id="2" name="Picture 1"/>
+          <p:cNvPicPr>
+            <a:picLocks noChangeAspect="1"/>
+          </p:cNvPicPr>
+          <p:nvPr/>
+        </p:nvPicPr>
+        <p:blipFill>
+          <a:blip r:embed="rId2"/>
+          <a:stretch>
+            <a:fillRect/>
+          </a:stretch>
+        </p:blipFill>
+        <p:spPr>
+          <a:xfrm>
+            <a:off x="261442" y="540246"/>
+            <a:ext cx="3960440" cy="2830209"/>
+          </a:xfrm>
+          <a:prstGeom prst="rect">
+            <a:avLst/>
+          </a:prstGeom>
+        </p:spPr>
+      </p:pic>
+      <p:pic>
+        <p:nvPicPr>
+          <p:cNvPr id="3" name="Picture 2"/>
+          <p:cNvPicPr>
+            <a:picLocks noChangeAspect="1"/>
+          </p:cNvPicPr>
+          <p:nvPr/>
+        </p:nvPicPr>
+        <p:blipFill>
+          <a:blip r:embed="rId3"/>
+          <a:stretch>
+            <a:fillRect/>
+          </a:stretch>
+        </p:blipFill>
+        <p:spPr>
+          <a:xfrm>
+            <a:off x="4653931" y="540246"/>
+            <a:ext cx="1368152" cy="1157666"/>
+          </a:xfrm>
+          <a:prstGeom prst="rect">
+            <a:avLst/>
+          </a:prstGeom>
+          <a:ln>
+            <a:noFill/>
+          </a:ln>
+        </p:spPr>
+      </p:pic>
+      <p:sp>
+        <p:nvSpPr>
+          <p:cNvPr id="4" name="Right Arrow 3"/>
+          <p:cNvSpPr/>
+          <p:nvPr/>
+        </p:nvSpPr>
+        <p:spPr>
+          <a:xfrm>
+            <a:off x="3933850" y="1116310"/>
+            <a:ext cx="360040" cy="45719"/>
+          </a:xfrm>
+          <a:prstGeom prst="rightArrow">
+            <a:avLst/>
+          </a:prstGeom>
+          <a:solidFill>
+            <a:srgbClr val="C00000"/>
+          </a:solidFill>
+          <a:ln>
+            <a:solidFill>
+              <a:srgbClr val="C00000"/>
+            </a:solidFill>
+          </a:ln>
+        </p:spPr>
+        <p:style>
+          <a:lnRef idx="2">
+            <a:schemeClr val="accent1">
+              <a:shade val="50000"/>
+            </a:schemeClr>
+          </a:lnRef>
+          <a:fillRef idx="1">
+            <a:schemeClr val="accent1"/>
+          </a:fillRef>
+          <a:effectRef idx="0">
+            <a:schemeClr val="accent1"/>
+          </a:effectRef>
+          <a:fontRef idx="minor">
+            <a:schemeClr val="lt1"/>
+          </a:fontRef>
+        </p:style>
+        <p:txBody>
+          <a:bodyPr rtlCol="0" anchor="ctr"/>
+          <a:lstStyle/>
+          <a:p>
+            <a:pPr algn="ctr"/>
+            <a:endParaRPr lang="en-US"/>
+          </a:p>
+        </p:txBody>
+      </p:sp>
+    </p:spTree>
+    <p:extLst>
+      <p:ext uri="{BB962C8B-B14F-4D97-AF65-F5344CB8AC3E}">
+        <p14:creationId xmlns:p14="http://schemas.microsoft.com/office/powerpoint/2010/main" val="1702670934"/>
+      </p:ext>
+    </p:extLst>
+  </p:cSld>
+  <p:clrMapOvr>
+    <a:masterClrMapping/>
+  </p:clrMapOvr>
+  <p:timing>
+    <p:tnLst>
+      <p:par>
+        <p:cTn id="1" dur="indefinite" restart="never" nodeType="tmRoot"/>
+      </p:par>
+    </p:tnLst>
+  </p:timing>
+</p:sld>
+</file>
+
+<file path=ppt/slides/slide4.xml><?xml version="1.0" encoding="utf-8"?>
+<p:sld xmlns:a="http://schemas.openxmlformats.org/drawingml/2006/main" xmlns:r="http://schemas.openxmlformats.org/officeDocument/2006/relationships" xmlns:p="http://schemas.openxmlformats.org/presentationml/2006/main">
+  <p:cSld>
+    <p:spTree>
+      <p:nvGrpSpPr>
+        <p:cNvPr id="1" name=""/>
+        <p:cNvGrpSpPr/>
+        <p:nvPr/>
+      </p:nvGrpSpPr>
+      <p:grpSpPr>
+        <a:xfrm>
+          <a:off x="0" y="0"/>
+          <a:ext cx="0" cy="0"/>
+          <a:chOff x="0" y="0"/>
+          <a:chExt cx="0" cy="0"/>
+        </a:xfrm>
+      </p:grpSpPr>
+      <p:pic>
+        <p:nvPicPr>
+          <p:cNvPr id="2050" name="Picture 2" descr="https://hgserver1.amc.nl/r2/graph/xgv-NG_inss-MYCN-YYplot-1624285137.png"/>
+          <p:cNvPicPr>
+            <a:picLocks noChangeAspect="1" noChangeArrowheads="1"/>
+          </p:cNvPicPr>
+          <p:nvPr/>
+        </p:nvPicPr>
+        <p:blipFill>
+          <a:blip r:embed="rId2">
+            <a:extLst>
+              <a:ext uri="{28A0092B-C50C-407E-A947-70E740481C1C}">
+                <a14:useLocalDpi xmlns:a14="http://schemas.microsoft.com/office/drawing/2010/main" val="0"/>
+              </a:ext>
+            </a:extLst>
+          </a:blip>
+          <a:srcRect/>
+          <a:stretch>
+            <a:fillRect/>
+          </a:stretch>
+        </p:blipFill>
+        <p:spPr bwMode="auto">
+          <a:xfrm>
+            <a:off x="189434" y="1476350"/>
+            <a:ext cx="3274246" cy="2088232"/>
+          </a:xfrm>
+          <a:prstGeom prst="rect">
+            <a:avLst/>
+          </a:prstGeom>
+          <a:noFill/>
+          <a:extLst>
+            <a:ext uri="{909E8E84-426E-40DD-AFC4-6F175D3DCCD1}">
+              <a14:hiddenFill xmlns:a14="http://schemas.microsoft.com/office/drawing/2010/main">
+                <a:solidFill>
+                  <a:srgbClr val="FFFFFF"/>
+                </a:solidFill>
+              </a14:hiddenFill>
+            </a:ext>
+          </a:extLst>
+        </p:spPr>
+      </p:pic>
+      <p:pic>
+        <p:nvPicPr>
+          <p:cNvPr id="2052" name="Picture 4" descr="https://hgserver1.amc.nl/r2/graph/xgv-NG_inss-MYCN-YYplot-1624285243.png"/>
+          <p:cNvPicPr>
+            <a:picLocks noChangeAspect="1" noChangeArrowheads="1"/>
+          </p:cNvPicPr>
+          <p:nvPr/>
+        </p:nvPicPr>
+        <p:blipFill>
+          <a:blip r:embed="rId3" cstate="print">
+            <a:extLst>
+              <a:ext uri="{28A0092B-C50C-407E-A947-70E740481C1C}">
+                <a14:useLocalDpi xmlns:a14="http://schemas.microsoft.com/office/drawing/2010/main" val="0"/>
+              </a:ext>
+            </a:extLst>
+          </a:blip>
+          <a:srcRect/>
+          <a:stretch>
+            <a:fillRect/>
+          </a:stretch>
+        </p:blipFill>
+        <p:spPr bwMode="auto">
+          <a:xfrm>
+            <a:off x="3713685" y="1558204"/>
+            <a:ext cx="3145903" cy="2006378"/>
+          </a:xfrm>
+          <a:prstGeom prst="rect">
+            <a:avLst/>
+          </a:prstGeom>
+          <a:noFill/>
+          <a:extLst>
+            <a:ext uri="{909E8E84-426E-40DD-AFC4-6F175D3DCCD1}">
+              <a14:hiddenFill xmlns:a14="http://schemas.microsoft.com/office/drawing/2010/main">
+                <a:solidFill>
+                  <a:srgbClr val="FFFFFF"/>
+                </a:solidFill>
+              </a14:hiddenFill>
+            </a:ext>
+          </a:extLst>
+        </p:spPr>
+      </p:pic>
+      <p:pic>
+        <p:nvPicPr>
+          <p:cNvPr id="2" name="Picture 1"/>
+          <p:cNvPicPr>
+            <a:picLocks noChangeAspect="1"/>
+          </p:cNvPicPr>
+          <p:nvPr/>
+        </p:nvPicPr>
+        <p:blipFill>
+          <a:blip r:embed="rId4"/>
+          <a:stretch>
+            <a:fillRect/>
+          </a:stretch>
+        </p:blipFill>
+        <p:spPr>
+          <a:xfrm>
+            <a:off x="2421682" y="180206"/>
+            <a:ext cx="2261660" cy="1242829"/>
+          </a:xfrm>
+          <a:prstGeom prst="rect">
+            <a:avLst/>
+          </a:prstGeom>
+        </p:spPr>
+      </p:pic>
+    </p:spTree>
+    <p:extLst>
+      <p:ext uri="{BB962C8B-B14F-4D97-AF65-F5344CB8AC3E}">
+        <p14:creationId xmlns:p14="http://schemas.microsoft.com/office/powerpoint/2010/main" val="594644350"/>
+      </p:ext>
+    </p:extLst>
+  </p:cSld>
+  <p:clrMapOvr>
+    <a:masterClrMapping/>
+  </p:clrMapOvr>
+</p:sld>
+</file>
+
+<file path=ppt/slides/slide5.xml><?xml version="1.0" encoding="utf-8"?>
+<p:sld xmlns:a="http://schemas.openxmlformats.org/drawingml/2006/main" xmlns:r="http://schemas.openxmlformats.org/officeDocument/2006/relationships" xmlns:p="http://schemas.openxmlformats.org/presentationml/2006/main">
+  <p:cSld>
+    <p:spTree>
+      <p:nvGrpSpPr>
+        <p:cNvPr id="1" name=""/>
+        <p:cNvGrpSpPr/>
+        <p:nvPr/>
+      </p:nvGrpSpPr>
+      <p:grpSpPr>
+        <a:xfrm>
+          <a:off x="0" y="0"/>
+          <a:ext cx="0" cy="0"/>
+          <a:chOff x="0" y="0"/>
+          <a:chExt cx="0" cy="0"/>
+        </a:xfrm>
+      </p:grpSpPr>
+      <p:pic>
+        <p:nvPicPr>
+          <p:cNvPr id="2" name="Picture 1"/>
+          <p:cNvPicPr>
+            <a:picLocks noChangeAspect="1"/>
+          </p:cNvPicPr>
+          <p:nvPr/>
+        </p:nvPicPr>
+        <p:blipFill>
+          <a:blip r:embed="rId2"/>
+          <a:stretch>
+            <a:fillRect/>
+          </a:stretch>
+        </p:blipFill>
+        <p:spPr>
+          <a:xfrm>
+            <a:off x="765498" y="612254"/>
+            <a:ext cx="5785161" cy="2507388"/>
+          </a:xfrm>
+          <a:prstGeom prst="rect">
+            <a:avLst/>
+          </a:prstGeom>
+        </p:spPr>
+      </p:pic>
+    </p:spTree>
+    <p:extLst>
+      <p:ext uri="{BB962C8B-B14F-4D97-AF65-F5344CB8AC3E}">
+        <p14:creationId xmlns:p14="http://schemas.microsoft.com/office/powerpoint/2010/main" val="4058578462"/>
+      </p:ext>
+    </p:extLst>
+  </p:cSld>
+  <p:clrMapOvr>
+    <a:masterClrMapping/>
+  </p:clrMapOvr>
+</p:sld>
+</file>
+
+<file path=ppt/slides/slide6.xml><?xml version="1.0" encoding="utf-8"?>
+<p:sld xmlns:a="http://schemas.openxmlformats.org/drawingml/2006/main" xmlns:r="http://schemas.openxmlformats.org/officeDocument/2006/relationships" xmlns:p="http://schemas.openxmlformats.org/presentationml/2006/main">
+  <p:cSld>
+    <p:spTree>
+      <p:nvGrpSpPr>
+        <p:cNvPr id="1" name=""/>
+        <p:cNvGrpSpPr/>
+        <p:nvPr/>
+      </p:nvGrpSpPr>
+      <p:grpSpPr>
+        <a:xfrm>
+          <a:off x="0" y="0"/>
+          <a:ext cx="0" cy="0"/>
+          <a:chOff x="0" y="0"/>
+          <a:chExt cx="0" cy="0"/>
+        </a:xfrm>
+      </p:grpSpPr>
+      <p:pic>
+        <p:nvPicPr>
+          <p:cNvPr id="2" name="Picture 1"/>
+          <p:cNvPicPr>
+            <a:picLocks noChangeAspect="1"/>
+          </p:cNvPicPr>
+          <p:nvPr/>
+        </p:nvPicPr>
+        <p:blipFill>
+          <a:blip r:embed="rId2"/>
+          <a:stretch>
+            <a:fillRect/>
+          </a:stretch>
+        </p:blipFill>
+        <p:spPr>
+          <a:xfrm>
+            <a:off x="909514" y="756270"/>
+            <a:ext cx="5090136" cy="2182380"/>
+          </a:xfrm>
+          <a:prstGeom prst="rect">
+            <a:avLst/>
+          </a:prstGeom>
+        </p:spPr>
+      </p:pic>
+    </p:spTree>
+    <p:extLst>
+      <p:ext uri="{BB962C8B-B14F-4D97-AF65-F5344CB8AC3E}">
+        <p14:creationId xmlns:p14="http://schemas.microsoft.com/office/powerpoint/2010/main" val="1654595781"/>
+      </p:ext>
+    </p:extLst>
+  </p:cSld>
+  <p:clrMapOvr>
+    <a:masterClrMapping/>
+  </p:clrMapOvr>
+</p:sld>
+</file>
+
+<file path=ppt/slides/slide7.xml><?xml version="1.0" encoding="utf-8"?>
+<p:sld xmlns:a="http://schemas.openxmlformats.org/drawingml/2006/main" xmlns:r="http://schemas.openxmlformats.org/officeDocument/2006/relationships" xmlns:p="http://schemas.openxmlformats.org/presentationml/2006/main">
+  <p:cSld>
+    <p:spTree>
+      <p:nvGrpSpPr>
+        <p:cNvPr id="1" name=""/>
+        <p:cNvGrpSpPr/>
+        <p:nvPr/>
+      </p:nvGrpSpPr>
+      <p:grpSpPr>
+        <a:xfrm>
+          <a:off x="0" y="0"/>
+          <a:ext cx="0" cy="0"/>
+          <a:chOff x="0" y="0"/>
+          <a:chExt cx="0" cy="0"/>
+        </a:xfrm>
+      </p:grpSpPr>
+      <p:pic>
+        <p:nvPicPr>
+          <p:cNvPr id="2" name="Picture 1"/>
+          <p:cNvPicPr>
+            <a:picLocks noChangeAspect="1"/>
+          </p:cNvPicPr>
+          <p:nvPr/>
+        </p:nvPicPr>
+        <p:blipFill>
+          <a:blip r:embed="rId2"/>
+          <a:stretch>
+            <a:fillRect/>
+          </a:stretch>
+        </p:blipFill>
+        <p:spPr>
+          <a:xfrm>
+            <a:off x="1341562" y="612254"/>
+            <a:ext cx="4715952" cy="2617501"/>
+          </a:xfrm>
+          <a:prstGeom prst="rect">
+            <a:avLst/>
+          </a:prstGeom>
+        </p:spPr>
+      </p:pic>
+    </p:spTree>
+    <p:extLst>
+      <p:ext uri="{BB962C8B-B14F-4D97-AF65-F5344CB8AC3E}">
+        <p14:creationId xmlns:p14="http://schemas.microsoft.com/office/powerpoint/2010/main" val="3590084557"/>
+      </p:ext>
+    </p:extLst>
+  </p:cSld>
+  <p:clrMapOvr>
+    <a:masterClrMapping/>
+  </p:clrMapOvr>
+</p:sld>
+</file>
+
+<file path=ppt/slides/slide8.xml><?xml version="1.0" encoding="utf-8"?>
+<p:sld xmlns:a="http://schemas.openxmlformats.org/drawingml/2006/main" xmlns:r="http://schemas.openxmlformats.org/officeDocument/2006/relationships" xmlns:p="http://schemas.openxmlformats.org/presentationml/2006/main">
+  <p:cSld>
+    <p:spTree>
+      <p:nvGrpSpPr>
+        <p:cNvPr id="1" name=""/>
+        <p:cNvGrpSpPr/>
+        <p:nvPr/>
+      </p:nvGrpSpPr>
+      <p:grpSpPr>
+        <a:xfrm>
+          <a:off x="0" y="0"/>
+          <a:ext cx="0" cy="0"/>
+          <a:chOff x="0" y="0"/>
+          <a:chExt cx="0" cy="0"/>
+        </a:xfrm>
+      </p:grpSpPr>
+      <p:pic>
+        <p:nvPicPr>
+          <p:cNvPr id="1026" name="Picture 2" descr="https://hgserver2.amc.nl/r2/graph/NG_cohort_alive-MYCN-Boxplot-16250633822270.png"/>
+          <p:cNvPicPr>
+            <a:picLocks noChangeAspect="1" noChangeArrowheads="1"/>
+          </p:cNvPicPr>
+          <p:nvPr/>
+        </p:nvPicPr>
+        <p:blipFill>
+          <a:blip r:embed="rId2">
+            <a:extLst>
+              <a:ext uri="{28A0092B-C50C-407E-A947-70E740481C1C}">
+                <a14:useLocalDpi xmlns:a14="http://schemas.microsoft.com/office/drawing/2010/main" val="0"/>
+              </a:ext>
+            </a:extLst>
+          </a:blip>
+          <a:srcRect/>
+          <a:stretch>
+            <a:fillRect/>
+          </a:stretch>
+        </p:blipFill>
+        <p:spPr bwMode="auto">
+          <a:xfrm>
+            <a:off x="909514" y="-323850"/>
+            <a:ext cx="3857625" cy="4171951"/>
+          </a:xfrm>
+          <a:prstGeom prst="rect">
+            <a:avLst/>
+          </a:prstGeom>
+          <a:noFill/>
+          <a:extLst>
+            <a:ext uri="{909E8E84-426E-40DD-AFC4-6F175D3DCCD1}">
+              <a14:hiddenFill xmlns:a14="http://schemas.microsoft.com/office/drawing/2010/main">
+                <a:solidFill>
+                  <a:srgbClr val="FFFFFF"/>
+                </a:solidFill>
+              </a14:hiddenFill>
+            </a:ext>
+          </a:extLst>
+        </p:spPr>
+      </p:pic>
+    </p:spTree>
+    <p:extLst>
+      <p:ext uri="{BB962C8B-B14F-4D97-AF65-F5344CB8AC3E}">
+        <p14:creationId xmlns:p14="http://schemas.microsoft.com/office/powerpoint/2010/main" val="3764165870"/>
+      </p:ext>
+    </p:extLst>
+  </p:cSld>
+  <p:clrMapOvr>
+    <a:masterClrMapping/>
+  </p:clrMapOvr>
+</p:sld>
+</file>
+
+<file path=ppt/slides/slide9.xml><?xml version="1.0" encoding="utf-8"?>
+<p:sld xmlns:a="http://schemas.openxmlformats.org/drawingml/2006/main" xmlns:r="http://schemas.openxmlformats.org/officeDocument/2006/relationships" xmlns:p="http://schemas.openxmlformats.org/presentationml/2006/main">
+  <p:cSld>
+    <p:spTree>
+      <p:nvGrpSpPr>
+        <p:cNvPr id="1" name=""/>
+        <p:cNvGrpSpPr/>
+        <p:nvPr/>
+      </p:nvGrpSpPr>
+      <p:grpSpPr>
+        <a:xfrm>
+          <a:off x="0" y="0"/>
+          <a:ext cx="0" cy="0"/>
+          <a:chOff x="0" y="0"/>
+          <a:chExt cx="0" cy="0"/>
+        </a:xfrm>
+      </p:grpSpPr>
+      <p:pic>
+        <p:nvPicPr>
+          <p:cNvPr id="3" name="Picture 2"/>
+          <p:cNvPicPr>
+            <a:picLocks noChangeAspect="1"/>
+          </p:cNvPicPr>
+          <p:nvPr/>
+        </p:nvPicPr>
+        <p:blipFill>
+          <a:blip r:embed="rId2"/>
+          <a:stretch>
+            <a:fillRect/>
+          </a:stretch>
+        </p:blipFill>
+        <p:spPr>
+          <a:xfrm>
+            <a:off x="1485578" y="180206"/>
+            <a:ext cx="4217584" cy="3048079"/>
+          </a:xfrm>
+          <a:prstGeom prst="rect">
+            <a:avLst/>
+          </a:prstGeom>
+        </p:spPr>
+      </p:pic>
+    </p:spTree>
+    <p:extLst>
+      <p:ext uri="{BB962C8B-B14F-4D97-AF65-F5344CB8AC3E}">
+        <p14:creationId xmlns:p14="http://schemas.microsoft.com/office/powerpoint/2010/main" val="4262588820"/>
+      </p:ext>
+    </p:extLst>
+  </p:cSld>
+  <p:clrMapOvr>
+    <a:masterClrMapping/>
+  </p:clrMapOvr>
+  <p:timing>
+    <p:tnLst>
+      <p:par>
+        <p:cTn id="1" dur="indefinite" restart="never" nodeType="tmRoot"/>
+      </p:par>
+    </p:tnLst>
+  </p:timing>
 </p:sld>
 </file>
 

</xml_diff>

<commit_message>
adding pics / changing text / changing pic  added new chapter for small R2 modules
</commit_message>
<xml_diff>
--- a/docs/_static/images/tutorial_fig_2017_medium.pptx
+++ b/docs/_static/images/tutorial_fig_2017_medium.pptx
@@ -5,7 +5,7 @@
     <p:sldMasterId id="2147483648" r:id="rId1"/>
   </p:sldMasterIdLst>
   <p:notesMasterIdLst>
-    <p:notesMasterId r:id="rId29"/>
+    <p:notesMasterId r:id="rId31"/>
   </p:notesMasterIdLst>
   <p:sldIdLst>
     <p:sldId id="274" r:id="rId2"/>
@@ -35,6 +35,8 @@
     <p:sldId id="298" r:id="rId26"/>
     <p:sldId id="299" r:id="rId27"/>
     <p:sldId id="300" r:id="rId28"/>
+    <p:sldId id="301" r:id="rId29"/>
+    <p:sldId id="302" r:id="rId30"/>
   </p:sldIdLst>
   <p:sldSz cx="6859588" cy="3960813"/>
   <p:notesSz cx="6858000" cy="9144000"/>
@@ -234,7 +236,7 @@
           <a:p>
             <a:fld id="{0BFDEB59-2AE6-43B2-B23B-9934E14E8D33}" type="datetimeFigureOut">
               <a:rPr lang="en-US" smtClean="0"/>
-              <a:t>2021-12-07</a:t>
+              <a:t>2021-12-14</a:t>
             </a:fld>
             <a:endParaRPr lang="en-US"/>
           </a:p>
@@ -680,7 +682,7 @@
           <a:p>
             <a:fld id="{5DC0F521-E06D-40A8-BBC9-7E6ABFC6426B}" type="datetimeFigureOut">
               <a:rPr lang="en-US" smtClean="0"/>
-              <a:t>2021-12-07</a:t>
+              <a:t>2021-12-14</a:t>
             </a:fld>
             <a:endParaRPr lang="en-US"/>
           </a:p>
@@ -848,7 +850,7 @@
           <a:p>
             <a:fld id="{5DC0F521-E06D-40A8-BBC9-7E6ABFC6426B}" type="datetimeFigureOut">
               <a:rPr lang="en-US" smtClean="0"/>
-              <a:t>2021-12-07</a:t>
+              <a:t>2021-12-14</a:t>
             </a:fld>
             <a:endParaRPr lang="en-US"/>
           </a:p>
@@ -1026,7 +1028,7 @@
           <a:p>
             <a:fld id="{5DC0F521-E06D-40A8-BBC9-7E6ABFC6426B}" type="datetimeFigureOut">
               <a:rPr lang="en-US" smtClean="0"/>
-              <a:t>2021-12-07</a:t>
+              <a:t>2021-12-14</a:t>
             </a:fld>
             <a:endParaRPr lang="en-US"/>
           </a:p>
@@ -1194,7 +1196,7 @@
           <a:p>
             <a:fld id="{5DC0F521-E06D-40A8-BBC9-7E6ABFC6426B}" type="datetimeFigureOut">
               <a:rPr lang="en-US" smtClean="0"/>
-              <a:t>2021-12-07</a:t>
+              <a:t>2021-12-14</a:t>
             </a:fld>
             <a:endParaRPr lang="en-US"/>
           </a:p>
@@ -1439,7 +1441,7 @@
           <a:p>
             <a:fld id="{5DC0F521-E06D-40A8-BBC9-7E6ABFC6426B}" type="datetimeFigureOut">
               <a:rPr lang="en-US" smtClean="0"/>
-              <a:t>2021-12-07</a:t>
+              <a:t>2021-12-14</a:t>
             </a:fld>
             <a:endParaRPr lang="en-US"/>
           </a:p>
@@ -1724,7 +1726,7 @@
           <a:p>
             <a:fld id="{5DC0F521-E06D-40A8-BBC9-7E6ABFC6426B}" type="datetimeFigureOut">
               <a:rPr lang="en-US" smtClean="0"/>
-              <a:t>2021-12-07</a:t>
+              <a:t>2021-12-14</a:t>
             </a:fld>
             <a:endParaRPr lang="en-US"/>
           </a:p>
@@ -2143,7 +2145,7 @@
           <a:p>
             <a:fld id="{5DC0F521-E06D-40A8-BBC9-7E6ABFC6426B}" type="datetimeFigureOut">
               <a:rPr lang="en-US" smtClean="0"/>
-              <a:t>2021-12-07</a:t>
+              <a:t>2021-12-14</a:t>
             </a:fld>
             <a:endParaRPr lang="en-US"/>
           </a:p>
@@ -2260,7 +2262,7 @@
           <a:p>
             <a:fld id="{5DC0F521-E06D-40A8-BBC9-7E6ABFC6426B}" type="datetimeFigureOut">
               <a:rPr lang="en-US" smtClean="0"/>
-              <a:t>2021-12-07</a:t>
+              <a:t>2021-12-14</a:t>
             </a:fld>
             <a:endParaRPr lang="en-US"/>
           </a:p>
@@ -2355,7 +2357,7 @@
           <a:p>
             <a:fld id="{5DC0F521-E06D-40A8-BBC9-7E6ABFC6426B}" type="datetimeFigureOut">
               <a:rPr lang="en-US" smtClean="0"/>
-              <a:t>2021-12-07</a:t>
+              <a:t>2021-12-14</a:t>
             </a:fld>
             <a:endParaRPr lang="en-US"/>
           </a:p>
@@ -2630,7 +2632,7 @@
           <a:p>
             <a:fld id="{5DC0F521-E06D-40A8-BBC9-7E6ABFC6426B}" type="datetimeFigureOut">
               <a:rPr lang="en-US" smtClean="0"/>
-              <a:t>2021-12-07</a:t>
+              <a:t>2021-12-14</a:t>
             </a:fld>
             <a:endParaRPr lang="en-US"/>
           </a:p>
@@ -2882,7 +2884,7 @@
           <a:p>
             <a:fld id="{5DC0F521-E06D-40A8-BBC9-7E6ABFC6426B}" type="datetimeFigureOut">
               <a:rPr lang="en-US" smtClean="0"/>
-              <a:t>2021-12-07</a:t>
+              <a:t>2021-12-14</a:t>
             </a:fld>
             <a:endParaRPr lang="en-US"/>
           </a:p>
@@ -3093,7 +3095,7 @@
           <a:p>
             <a:fld id="{5DC0F521-E06D-40A8-BBC9-7E6ABFC6426B}" type="datetimeFigureOut">
               <a:rPr lang="en-US" smtClean="0"/>
-              <a:t>2021-12-07</a:t>
+              <a:t>2021-12-14</a:t>
             </a:fld>
             <a:endParaRPr lang="en-US"/>
           </a:p>
@@ -5639,6 +5641,330 @@
     <p:extLst>
       <p:ext uri="{BB962C8B-B14F-4D97-AF65-F5344CB8AC3E}">
         <p14:creationId xmlns:p14="http://schemas.microsoft.com/office/powerpoint/2010/main" val="1076205338"/>
+      </p:ext>
+    </p:extLst>
+  </p:cSld>
+  <p:clrMapOvr>
+    <a:masterClrMapping/>
+  </p:clrMapOvr>
+</p:sld>
+</file>
+
+<file path=ppt/slides/slide28.xml><?xml version="1.0" encoding="utf-8"?>
+<p:sld xmlns:a="http://schemas.openxmlformats.org/drawingml/2006/main" xmlns:r="http://schemas.openxmlformats.org/officeDocument/2006/relationships" xmlns:p="http://schemas.openxmlformats.org/presentationml/2006/main">
+  <p:cSld>
+    <p:spTree>
+      <p:nvGrpSpPr>
+        <p:cNvPr id="1" name=""/>
+        <p:cNvGrpSpPr/>
+        <p:nvPr/>
+      </p:nvGrpSpPr>
+      <p:grpSpPr>
+        <a:xfrm>
+          <a:off x="0" y="0"/>
+          <a:ext cx="0" cy="0"/>
+          <a:chOff x="0" y="0"/>
+          <a:chExt cx="0" cy="0"/>
+        </a:xfrm>
+      </p:grpSpPr>
+      <p:pic>
+        <p:nvPicPr>
+          <p:cNvPr id="2" name="Picture 1"/>
+          <p:cNvPicPr>
+            <a:picLocks noChangeAspect="1"/>
+          </p:cNvPicPr>
+          <p:nvPr/>
+        </p:nvPicPr>
+        <p:blipFill>
+          <a:blip r:embed="rId2"/>
+          <a:stretch>
+            <a:fillRect/>
+          </a:stretch>
+        </p:blipFill>
+        <p:spPr>
+          <a:xfrm>
+            <a:off x="1828402" y="1587340"/>
+            <a:ext cx="2114403" cy="2004087"/>
+          </a:xfrm>
+          <a:prstGeom prst="rect">
+            <a:avLst/>
+          </a:prstGeom>
+        </p:spPr>
+      </p:pic>
+      <p:pic>
+        <p:nvPicPr>
+          <p:cNvPr id="3" name="Picture 2"/>
+          <p:cNvPicPr>
+            <a:picLocks noChangeAspect="1"/>
+          </p:cNvPicPr>
+          <p:nvPr/>
+        </p:nvPicPr>
+        <p:blipFill>
+          <a:blip r:embed="rId3"/>
+          <a:stretch>
+            <a:fillRect/>
+          </a:stretch>
+        </p:blipFill>
+        <p:spPr>
+          <a:xfrm>
+            <a:off x="117426" y="2556470"/>
+            <a:ext cx="1543407" cy="659164"/>
+          </a:xfrm>
+          <a:prstGeom prst="rect">
+            <a:avLst/>
+          </a:prstGeom>
+        </p:spPr>
+      </p:pic>
+      <p:pic>
+        <p:nvPicPr>
+          <p:cNvPr id="4" name="Picture 3"/>
+          <p:cNvPicPr>
+            <a:picLocks noChangeAspect="1"/>
+          </p:cNvPicPr>
+          <p:nvPr/>
+        </p:nvPicPr>
+        <p:blipFill>
+          <a:blip r:embed="rId4"/>
+          <a:stretch>
+            <a:fillRect/>
+          </a:stretch>
+        </p:blipFill>
+        <p:spPr>
+          <a:xfrm>
+            <a:off x="117426" y="1630585"/>
+            <a:ext cx="1639746" cy="720080"/>
+          </a:xfrm>
+          <a:prstGeom prst="rect">
+            <a:avLst/>
+          </a:prstGeom>
+        </p:spPr>
+      </p:pic>
+      <p:pic>
+        <p:nvPicPr>
+          <p:cNvPr id="5" name="Picture 4"/>
+          <p:cNvPicPr>
+            <a:picLocks noChangeAspect="1"/>
+          </p:cNvPicPr>
+          <p:nvPr/>
+        </p:nvPicPr>
+        <p:blipFill>
+          <a:blip r:embed="rId5"/>
+          <a:stretch>
+            <a:fillRect/>
+          </a:stretch>
+        </p:blipFill>
+        <p:spPr>
+          <a:xfrm>
+            <a:off x="2421682" y="252214"/>
+            <a:ext cx="944388" cy="936104"/>
+          </a:xfrm>
+          <a:prstGeom prst="rect">
+            <a:avLst/>
+          </a:prstGeom>
+        </p:spPr>
+      </p:pic>
+      <p:sp>
+        <p:nvSpPr>
+          <p:cNvPr id="6" name="Down Arrow 5"/>
+          <p:cNvSpPr/>
+          <p:nvPr/>
+        </p:nvSpPr>
+        <p:spPr>
+          <a:xfrm rot="2911873">
+            <a:off x="1814535" y="737494"/>
+            <a:ext cx="45719" cy="648072"/>
+          </a:xfrm>
+          <a:prstGeom prst="downArrow">
+            <a:avLst/>
+          </a:prstGeom>
+          <a:solidFill>
+            <a:srgbClr val="C00000"/>
+          </a:solidFill>
+          <a:ln>
+            <a:solidFill>
+              <a:srgbClr val="C00000"/>
+            </a:solidFill>
+          </a:ln>
+        </p:spPr>
+        <p:style>
+          <a:lnRef idx="2">
+            <a:schemeClr val="accent1">
+              <a:shade val="50000"/>
+            </a:schemeClr>
+          </a:lnRef>
+          <a:fillRef idx="1">
+            <a:schemeClr val="accent1"/>
+          </a:fillRef>
+          <a:effectRef idx="0">
+            <a:schemeClr val="accent1"/>
+          </a:effectRef>
+          <a:fontRef idx="minor">
+            <a:schemeClr val="lt1"/>
+          </a:fontRef>
+        </p:style>
+        <p:txBody>
+          <a:bodyPr rtlCol="0" anchor="ctr"/>
+          <a:lstStyle/>
+          <a:p>
+            <a:pPr algn="ctr"/>
+            <a:endParaRPr lang="en-US"/>
+          </a:p>
+        </p:txBody>
+      </p:sp>
+      <p:sp>
+        <p:nvSpPr>
+          <p:cNvPr id="7" name="Down Arrow 6"/>
+          <p:cNvSpPr/>
+          <p:nvPr/>
+        </p:nvSpPr>
+        <p:spPr>
+          <a:xfrm rot="18977060" flipH="1">
+            <a:off x="4159526" y="791930"/>
+            <a:ext cx="52045" cy="648072"/>
+          </a:xfrm>
+          <a:prstGeom prst="downArrow">
+            <a:avLst/>
+          </a:prstGeom>
+          <a:solidFill>
+            <a:srgbClr val="C00000"/>
+          </a:solidFill>
+          <a:ln>
+            <a:solidFill>
+              <a:srgbClr val="C00000"/>
+            </a:solidFill>
+          </a:ln>
+        </p:spPr>
+        <p:style>
+          <a:lnRef idx="2">
+            <a:schemeClr val="accent1">
+              <a:shade val="50000"/>
+            </a:schemeClr>
+          </a:lnRef>
+          <a:fillRef idx="1">
+            <a:schemeClr val="accent1"/>
+          </a:fillRef>
+          <a:effectRef idx="0">
+            <a:schemeClr val="accent1"/>
+          </a:effectRef>
+          <a:fontRef idx="minor">
+            <a:schemeClr val="lt1"/>
+          </a:fontRef>
+        </p:style>
+        <p:txBody>
+          <a:bodyPr rtlCol="0" anchor="ctr"/>
+          <a:lstStyle/>
+          <a:p>
+            <a:pPr algn="ctr"/>
+            <a:endParaRPr lang="en-US"/>
+          </a:p>
+        </p:txBody>
+      </p:sp>
+      <p:pic>
+        <p:nvPicPr>
+          <p:cNvPr id="8" name="Picture 7"/>
+          <p:cNvPicPr>
+            <a:picLocks noChangeAspect="1"/>
+          </p:cNvPicPr>
+          <p:nvPr/>
+        </p:nvPicPr>
+        <p:blipFill>
+          <a:blip r:embed="rId6"/>
+          <a:stretch>
+            <a:fillRect/>
+          </a:stretch>
+        </p:blipFill>
+        <p:spPr>
+          <a:xfrm>
+            <a:off x="4083138" y="1681110"/>
+            <a:ext cx="2435300" cy="1941124"/>
+          </a:xfrm>
+          <a:prstGeom prst="rect">
+            <a:avLst/>
+          </a:prstGeom>
+        </p:spPr>
+      </p:pic>
+      <p:sp>
+        <p:nvSpPr>
+          <p:cNvPr id="9" name="Down Arrow 8"/>
+          <p:cNvSpPr/>
+          <p:nvPr/>
+        </p:nvSpPr>
+        <p:spPr>
+          <a:xfrm>
+            <a:off x="2853730" y="1260326"/>
+            <a:ext cx="45719" cy="216024"/>
+          </a:xfrm>
+          <a:prstGeom prst="downArrow">
+            <a:avLst/>
+          </a:prstGeom>
+          <a:solidFill>
+            <a:srgbClr val="C00000"/>
+          </a:solidFill>
+          <a:ln>
+            <a:solidFill>
+              <a:srgbClr val="C00000"/>
+            </a:solidFill>
+          </a:ln>
+        </p:spPr>
+        <p:style>
+          <a:lnRef idx="2">
+            <a:schemeClr val="accent1">
+              <a:shade val="50000"/>
+            </a:schemeClr>
+          </a:lnRef>
+          <a:fillRef idx="1">
+            <a:schemeClr val="accent1"/>
+          </a:fillRef>
+          <a:effectRef idx="0">
+            <a:schemeClr val="accent1"/>
+          </a:effectRef>
+          <a:fontRef idx="minor">
+            <a:schemeClr val="lt1"/>
+          </a:fontRef>
+        </p:style>
+        <p:txBody>
+          <a:bodyPr rtlCol="0" anchor="ctr"/>
+          <a:lstStyle/>
+          <a:p>
+            <a:pPr algn="ctr"/>
+            <a:endParaRPr lang="en-US"/>
+          </a:p>
+        </p:txBody>
+      </p:sp>
+    </p:spTree>
+    <p:extLst>
+      <p:ext uri="{BB962C8B-B14F-4D97-AF65-F5344CB8AC3E}">
+        <p14:creationId xmlns:p14="http://schemas.microsoft.com/office/powerpoint/2010/main" val="2195075719"/>
+      </p:ext>
+    </p:extLst>
+  </p:cSld>
+  <p:clrMapOvr>
+    <a:masterClrMapping/>
+  </p:clrMapOvr>
+</p:sld>
+</file>
+
+<file path=ppt/slides/slide29.xml><?xml version="1.0" encoding="utf-8"?>
+<p:sld xmlns:a="http://schemas.openxmlformats.org/drawingml/2006/main" xmlns:r="http://schemas.openxmlformats.org/officeDocument/2006/relationships" xmlns:p="http://schemas.openxmlformats.org/presentationml/2006/main">
+  <p:cSld>
+    <p:spTree>
+      <p:nvGrpSpPr>
+        <p:cNvPr id="1" name=""/>
+        <p:cNvGrpSpPr/>
+        <p:nvPr/>
+      </p:nvGrpSpPr>
+      <p:grpSpPr>
+        <a:xfrm>
+          <a:off x="0" y="0"/>
+          <a:ext cx="0" cy="0"/>
+          <a:chOff x="0" y="0"/>
+          <a:chExt cx="0" cy="0"/>
+        </a:xfrm>
+      </p:grpSpPr>
+    </p:spTree>
+    <p:extLst>
+      <p:ext uri="{BB962C8B-B14F-4D97-AF65-F5344CB8AC3E}">
+        <p14:creationId xmlns:p14="http://schemas.microsoft.com/office/powerpoint/2010/main" val="1715019270"/>
       </p:ext>
     </p:extLst>
   </p:cSld>

</xml_diff>

<commit_message>
adding pics / changing text / changing pic  added new chapter for small R2 modules also adding related text form find diff in Didyouknow chapter
</commit_message>
<xml_diff>
--- a/docs/_static/images/tutorial_fig_2017_medium.pptx
+++ b/docs/_static/images/tutorial_fig_2017_medium.pptx
@@ -5,7 +5,7 @@
     <p:sldMasterId id="2147483648" r:id="rId1"/>
   </p:sldMasterIdLst>
   <p:notesMasterIdLst>
-    <p:notesMasterId r:id="rId31"/>
+    <p:notesMasterId r:id="rId37"/>
   </p:notesMasterIdLst>
   <p:sldIdLst>
     <p:sldId id="274" r:id="rId2"/>
@@ -32,11 +32,17 @@
     <p:sldId id="295" r:id="rId23"/>
     <p:sldId id="296" r:id="rId24"/>
     <p:sldId id="297" r:id="rId25"/>
-    <p:sldId id="298" r:id="rId26"/>
-    <p:sldId id="299" r:id="rId27"/>
-    <p:sldId id="300" r:id="rId28"/>
-    <p:sldId id="301" r:id="rId29"/>
-    <p:sldId id="302" r:id="rId30"/>
+    <p:sldId id="303" r:id="rId26"/>
+    <p:sldId id="298" r:id="rId27"/>
+    <p:sldId id="299" r:id="rId28"/>
+    <p:sldId id="300" r:id="rId29"/>
+    <p:sldId id="301" r:id="rId30"/>
+    <p:sldId id="304" r:id="rId31"/>
+    <p:sldId id="302" r:id="rId32"/>
+    <p:sldId id="305" r:id="rId33"/>
+    <p:sldId id="306" r:id="rId34"/>
+    <p:sldId id="307" r:id="rId35"/>
+    <p:sldId id="308" r:id="rId36"/>
   </p:sldIdLst>
   <p:sldSz cx="6859588" cy="3960813"/>
   <p:notesSz cx="6858000" cy="9144000"/>
@@ -5208,6 +5214,54 @@
           </a:prstGeom>
         </p:spPr>
       </p:pic>
+      <p:sp>
+        <p:nvSpPr>
+          <p:cNvPr id="4" name="Down Arrow 3"/>
+          <p:cNvSpPr/>
+          <p:nvPr/>
+        </p:nvSpPr>
+        <p:spPr>
+          <a:xfrm>
+            <a:off x="3285778" y="1980406"/>
+            <a:ext cx="72008" cy="360040"/>
+          </a:xfrm>
+          <a:prstGeom prst="downArrow">
+            <a:avLst/>
+          </a:prstGeom>
+          <a:solidFill>
+            <a:srgbClr val="C00000"/>
+          </a:solidFill>
+          <a:ln>
+            <a:solidFill>
+              <a:srgbClr val="C00000"/>
+            </a:solidFill>
+          </a:ln>
+        </p:spPr>
+        <p:style>
+          <a:lnRef idx="2">
+            <a:schemeClr val="accent1">
+              <a:shade val="50000"/>
+            </a:schemeClr>
+          </a:lnRef>
+          <a:fillRef idx="1">
+            <a:schemeClr val="accent1"/>
+          </a:fillRef>
+          <a:effectRef idx="0">
+            <a:schemeClr val="accent1"/>
+          </a:effectRef>
+          <a:fontRef idx="minor">
+            <a:schemeClr val="lt1"/>
+          </a:fontRef>
+        </p:style>
+        <p:txBody>
+          <a:bodyPr rtlCol="0" anchor="ctr"/>
+          <a:lstStyle/>
+          <a:p>
+            <a:pPr algn="ctr"/>
+            <a:endParaRPr lang="en-US"/>
+          </a:p>
+        </p:txBody>
+      </p:sp>
     </p:spTree>
     <p:extLst>
       <p:ext uri="{BB962C8B-B14F-4D97-AF65-F5344CB8AC3E}">
@@ -5254,32 +5308,8 @@
         </p:blipFill>
         <p:spPr>
           <a:xfrm>
-            <a:off x="1269554" y="396230"/>
-            <a:ext cx="4353449" cy="1692375"/>
-          </a:xfrm>
-          <a:prstGeom prst="rect">
-            <a:avLst/>
-          </a:prstGeom>
-        </p:spPr>
-      </p:pic>
-      <p:pic>
-        <p:nvPicPr>
-          <p:cNvPr id="4" name="Picture 3"/>
-          <p:cNvPicPr>
-            <a:picLocks noChangeAspect="1"/>
-          </p:cNvPicPr>
-          <p:nvPr/>
-        </p:nvPicPr>
-        <p:blipFill>
-          <a:blip r:embed="rId3"/>
-          <a:stretch>
-            <a:fillRect/>
-          </a:stretch>
-        </p:blipFill>
-        <p:spPr>
-          <a:xfrm>
-            <a:off x="1773610" y="2268438"/>
-            <a:ext cx="3095215" cy="1054923"/>
+            <a:off x="1341562" y="130448"/>
+            <a:ext cx="4123880" cy="3830365"/>
           </a:xfrm>
           <a:prstGeom prst="rect">
             <a:avLst/>
@@ -5289,7 +5319,7 @@
     </p:spTree>
     <p:extLst>
       <p:ext uri="{BB962C8B-B14F-4D97-AF65-F5344CB8AC3E}">
-        <p14:creationId xmlns:p14="http://schemas.microsoft.com/office/powerpoint/2010/main" val="1391973602"/>
+        <p14:creationId xmlns:p14="http://schemas.microsoft.com/office/powerpoint/2010/main" val="3182891325"/>
       </p:ext>
     </p:extLst>
   </p:cSld>
@@ -5318,131 +5348,56 @@
       </p:grpSpPr>
       <p:pic>
         <p:nvPicPr>
-          <p:cNvPr id="1026" name="Picture 2" descr="https://hgserver1.amc.nl/r2/graph/16391314723468.png"/>
+          <p:cNvPr id="3" name="Picture 2"/>
           <p:cNvPicPr>
-            <a:picLocks noChangeAspect="1" noChangeArrowheads="1"/>
+            <a:picLocks noChangeAspect="1"/>
           </p:cNvPicPr>
           <p:nvPr/>
         </p:nvPicPr>
         <p:blipFill>
-          <a:blip r:embed="rId2">
-            <a:extLst>
-              <a:ext uri="{28A0092B-C50C-407E-A947-70E740481C1C}">
-                <a14:useLocalDpi xmlns:a14="http://schemas.microsoft.com/office/drawing/2010/main" val="0"/>
-              </a:ext>
-            </a:extLst>
-          </a:blip>
-          <a:srcRect/>
+          <a:blip r:embed="rId2"/>
           <a:stretch>
             <a:fillRect/>
           </a:stretch>
         </p:blipFill>
-        <p:spPr bwMode="auto">
-          <a:xfrm>
-            <a:off x="511305" y="1104904"/>
-            <a:ext cx="1728192" cy="1879094"/>
-          </a:xfrm>
-          <a:prstGeom prst="rect">
-            <a:avLst/>
-          </a:prstGeom>
-          <a:noFill/>
-          <a:extLst>
-            <a:ext uri="{909E8E84-426E-40DD-AFC4-6F175D3DCCD1}">
-              <a14:hiddenFill xmlns:a14="http://schemas.microsoft.com/office/drawing/2010/main">
-                <a:solidFill>
-                  <a:srgbClr val="FFFFFF"/>
-                </a:solidFill>
-              </a14:hiddenFill>
-            </a:ext>
-          </a:extLst>
+        <p:spPr>
+          <a:xfrm>
+            <a:off x="1269554" y="396230"/>
+            <a:ext cx="4353449" cy="1692375"/>
+          </a:xfrm>
+          <a:prstGeom prst="rect">
+            <a:avLst/>
+          </a:prstGeom>
         </p:spPr>
       </p:pic>
       <p:pic>
         <p:nvPicPr>
-          <p:cNvPr id="1028" name="Picture 4" descr="https://hgserver1.amc.nl/r2/graph/NG_alive-MYCN-Boxplot-16391315379349.png"/>
+          <p:cNvPr id="4" name="Picture 3"/>
           <p:cNvPicPr>
-            <a:picLocks noChangeAspect="1" noChangeArrowheads="1"/>
+            <a:picLocks noChangeAspect="1"/>
           </p:cNvPicPr>
           <p:nvPr/>
         </p:nvPicPr>
         <p:blipFill>
-          <a:blip r:embed="rId3">
-            <a:extLst>
-              <a:ext uri="{28A0092B-C50C-407E-A947-70E740481C1C}">
-                <a14:useLocalDpi xmlns:a14="http://schemas.microsoft.com/office/drawing/2010/main" val="0"/>
-              </a:ext>
-            </a:extLst>
-          </a:blip>
-          <a:srcRect/>
+          <a:blip r:embed="rId3"/>
           <a:stretch>
             <a:fillRect/>
           </a:stretch>
         </p:blipFill>
-        <p:spPr bwMode="auto">
-          <a:xfrm>
-            <a:off x="2311505" y="1116311"/>
-            <a:ext cx="1872208" cy="1998116"/>
-          </a:xfrm>
-          <a:prstGeom prst="rect">
-            <a:avLst/>
-          </a:prstGeom>
-          <a:noFill/>
-          <a:extLst>
-            <a:ext uri="{909E8E84-426E-40DD-AFC4-6F175D3DCCD1}">
-              <a14:hiddenFill xmlns:a14="http://schemas.microsoft.com/office/drawing/2010/main">
-                <a:solidFill>
-                  <a:srgbClr val="FFFFFF"/>
-                </a:solidFill>
-              </a14:hiddenFill>
-            </a:ext>
-          </a:extLst>
-        </p:spPr>
-      </p:pic>
-      <p:pic>
-        <p:nvPicPr>
-          <p:cNvPr id="1030" name="Picture 6" descr="https://hgserver1.amc.nl/r2/graph/NG_alive-MYCN-Barplot-16391315765398.png"/>
-          <p:cNvPicPr>
-            <a:picLocks noChangeAspect="1" noChangeArrowheads="1"/>
-          </p:cNvPicPr>
-          <p:nvPr/>
-        </p:nvPicPr>
-        <p:blipFill>
-          <a:blip r:embed="rId4">
-            <a:extLst>
-              <a:ext uri="{28A0092B-C50C-407E-A947-70E740481C1C}">
-                <a14:useLocalDpi xmlns:a14="http://schemas.microsoft.com/office/drawing/2010/main" val="0"/>
-              </a:ext>
-            </a:extLst>
-          </a:blip>
-          <a:srcRect/>
-          <a:stretch>
-            <a:fillRect/>
-          </a:stretch>
-        </p:blipFill>
-        <p:spPr bwMode="auto">
-          <a:xfrm>
-            <a:off x="4319304" y="1116311"/>
-            <a:ext cx="1774786" cy="1911440"/>
-          </a:xfrm>
-          <a:prstGeom prst="rect">
-            <a:avLst/>
-          </a:prstGeom>
-          <a:noFill/>
-          <a:extLst>
-            <a:ext uri="{909E8E84-426E-40DD-AFC4-6F175D3DCCD1}">
-              <a14:hiddenFill xmlns:a14="http://schemas.microsoft.com/office/drawing/2010/main">
-                <a:solidFill>
-                  <a:srgbClr val="FFFFFF"/>
-                </a:solidFill>
-              </a14:hiddenFill>
-            </a:ext>
-          </a:extLst>
+        <p:spPr>
+          <a:xfrm>
+            <a:off x="1773610" y="2268438"/>
+            <a:ext cx="3095215" cy="1054923"/>
+          </a:xfrm>
+          <a:prstGeom prst="rect">
+            <a:avLst/>
+          </a:prstGeom>
         </p:spPr>
       </p:pic>
     </p:spTree>
     <p:extLst>
       <p:ext uri="{BB962C8B-B14F-4D97-AF65-F5344CB8AC3E}">
-        <p14:creationId xmlns:p14="http://schemas.microsoft.com/office/powerpoint/2010/main" val="3991602566"/>
+        <p14:creationId xmlns:p14="http://schemas.microsoft.com/office/powerpoint/2010/main" val="1391973602"/>
       </p:ext>
     </p:extLst>
   </p:cSld>
@@ -5471,176 +5426,131 @@
       </p:grpSpPr>
       <p:pic>
         <p:nvPicPr>
-          <p:cNvPr id="2" name="Picture 1"/>
+          <p:cNvPr id="1026" name="Picture 2" descr="https://hgserver1.amc.nl/r2/graph/16391314723468.png"/>
           <p:cNvPicPr>
-            <a:picLocks noChangeAspect="1"/>
+            <a:picLocks noChangeAspect="1" noChangeArrowheads="1"/>
           </p:cNvPicPr>
           <p:nvPr/>
         </p:nvPicPr>
         <p:blipFill>
-          <a:blip r:embed="rId2"/>
+          <a:blip r:embed="rId2">
+            <a:extLst>
+              <a:ext uri="{28A0092B-C50C-407E-A947-70E740481C1C}">
+                <a14:useLocalDpi xmlns:a14="http://schemas.microsoft.com/office/drawing/2010/main" val="0"/>
+              </a:ext>
+            </a:extLst>
+          </a:blip>
+          <a:srcRect/>
           <a:stretch>
             <a:fillRect/>
           </a:stretch>
         </p:blipFill>
-        <p:spPr>
-          <a:xfrm>
-            <a:off x="765498" y="252214"/>
-            <a:ext cx="2304256" cy="1437726"/>
-          </a:xfrm>
-          <a:prstGeom prst="rect">
-            <a:avLst/>
-          </a:prstGeom>
+        <p:spPr bwMode="auto">
+          <a:xfrm>
+            <a:off x="511305" y="1104904"/>
+            <a:ext cx="1728192" cy="1879094"/>
+          </a:xfrm>
+          <a:prstGeom prst="rect">
+            <a:avLst/>
+          </a:prstGeom>
+          <a:noFill/>
+          <a:extLst>
+            <a:ext uri="{909E8E84-426E-40DD-AFC4-6F175D3DCCD1}">
+              <a14:hiddenFill xmlns:a14="http://schemas.microsoft.com/office/drawing/2010/main">
+                <a:solidFill>
+                  <a:srgbClr val="FFFFFF"/>
+                </a:solidFill>
+              </a14:hiddenFill>
+            </a:ext>
+          </a:extLst>
         </p:spPr>
       </p:pic>
       <p:pic>
         <p:nvPicPr>
-          <p:cNvPr id="3" name="Picture 2"/>
+          <p:cNvPr id="1028" name="Picture 4" descr="https://hgserver1.amc.nl/r2/graph/NG_alive-MYCN-Boxplot-16391315379349.png"/>
           <p:cNvPicPr>
-            <a:picLocks noChangeAspect="1"/>
+            <a:picLocks noChangeAspect="1" noChangeArrowheads="1"/>
           </p:cNvPicPr>
           <p:nvPr/>
         </p:nvPicPr>
         <p:blipFill>
-          <a:blip r:embed="rId3"/>
+          <a:blip r:embed="rId3">
+            <a:extLst>
+              <a:ext uri="{28A0092B-C50C-407E-A947-70E740481C1C}">
+                <a14:useLocalDpi xmlns:a14="http://schemas.microsoft.com/office/drawing/2010/main" val="0"/>
+              </a:ext>
+            </a:extLst>
+          </a:blip>
+          <a:srcRect/>
           <a:stretch>
             <a:fillRect/>
           </a:stretch>
         </p:blipFill>
-        <p:spPr>
-          <a:xfrm>
-            <a:off x="3357786" y="468238"/>
-            <a:ext cx="1924319" cy="657317"/>
-          </a:xfrm>
-          <a:prstGeom prst="rect">
-            <a:avLst/>
-          </a:prstGeom>
+        <p:spPr bwMode="auto">
+          <a:xfrm>
+            <a:off x="2311505" y="1116311"/>
+            <a:ext cx="1872208" cy="1998116"/>
+          </a:xfrm>
+          <a:prstGeom prst="rect">
+            <a:avLst/>
+          </a:prstGeom>
+          <a:noFill/>
+          <a:extLst>
+            <a:ext uri="{909E8E84-426E-40DD-AFC4-6F175D3DCCD1}">
+              <a14:hiddenFill xmlns:a14="http://schemas.microsoft.com/office/drawing/2010/main">
+                <a:solidFill>
+                  <a:srgbClr val="FFFFFF"/>
+                </a:solidFill>
+              </a14:hiddenFill>
+            </a:ext>
+          </a:extLst>
         </p:spPr>
       </p:pic>
       <p:pic>
         <p:nvPicPr>
-          <p:cNvPr id="4" name="Picture 3"/>
+          <p:cNvPr id="1030" name="Picture 6" descr="https://hgserver1.amc.nl/r2/graph/NG_alive-MYCN-Barplot-16391315765398.png"/>
           <p:cNvPicPr>
-            <a:picLocks noChangeAspect="1"/>
+            <a:picLocks noChangeAspect="1" noChangeArrowheads="1"/>
           </p:cNvPicPr>
           <p:nvPr/>
         </p:nvPicPr>
         <p:blipFill>
-          <a:blip r:embed="rId4"/>
+          <a:blip r:embed="rId4">
+            <a:extLst>
+              <a:ext uri="{28A0092B-C50C-407E-A947-70E740481C1C}">
+                <a14:useLocalDpi xmlns:a14="http://schemas.microsoft.com/office/drawing/2010/main" val="0"/>
+              </a:ext>
+            </a:extLst>
+          </a:blip>
+          <a:srcRect/>
           <a:stretch>
             <a:fillRect/>
           </a:stretch>
         </p:blipFill>
-        <p:spPr>
-          <a:xfrm>
-            <a:off x="693490" y="2052414"/>
-            <a:ext cx="6004768" cy="1296144"/>
-          </a:xfrm>
-          <a:prstGeom prst="rect">
-            <a:avLst/>
-          </a:prstGeom>
+        <p:spPr bwMode="auto">
+          <a:xfrm>
+            <a:off x="4319304" y="1116311"/>
+            <a:ext cx="1774786" cy="1911440"/>
+          </a:xfrm>
+          <a:prstGeom prst="rect">
+            <a:avLst/>
+          </a:prstGeom>
+          <a:noFill/>
+          <a:extLst>
+            <a:ext uri="{909E8E84-426E-40DD-AFC4-6F175D3DCCD1}">
+              <a14:hiddenFill xmlns:a14="http://schemas.microsoft.com/office/drawing/2010/main">
+                <a:solidFill>
+                  <a:srgbClr val="FFFFFF"/>
+                </a:solidFill>
+              </a14:hiddenFill>
+            </a:ext>
+          </a:extLst>
         </p:spPr>
       </p:pic>
-      <p:sp>
-        <p:nvSpPr>
-          <p:cNvPr id="6" name="Right Arrow 5"/>
-          <p:cNvSpPr/>
-          <p:nvPr/>
-        </p:nvSpPr>
-        <p:spPr>
-          <a:xfrm>
-            <a:off x="2997746" y="796896"/>
-            <a:ext cx="216024" cy="45719"/>
-          </a:xfrm>
-          <a:prstGeom prst="rightArrow">
-            <a:avLst/>
-          </a:prstGeom>
-          <a:solidFill>
-            <a:srgbClr val="C00000"/>
-          </a:solidFill>
-          <a:ln>
-            <a:solidFill>
-              <a:srgbClr val="C00000"/>
-            </a:solidFill>
-          </a:ln>
-        </p:spPr>
-        <p:style>
-          <a:lnRef idx="2">
-            <a:schemeClr val="accent1">
-              <a:shade val="50000"/>
-            </a:schemeClr>
-          </a:lnRef>
-          <a:fillRef idx="1">
-            <a:schemeClr val="accent1"/>
-          </a:fillRef>
-          <a:effectRef idx="0">
-            <a:schemeClr val="accent1"/>
-          </a:effectRef>
-          <a:fontRef idx="minor">
-            <a:schemeClr val="lt1"/>
-          </a:fontRef>
-        </p:style>
-        <p:txBody>
-          <a:bodyPr rtlCol="0" anchor="ctr"/>
-          <a:lstStyle/>
-          <a:p>
-            <a:pPr algn="ctr"/>
-            <a:endParaRPr lang="en-US"/>
-          </a:p>
-        </p:txBody>
-      </p:sp>
-      <p:sp>
-        <p:nvSpPr>
-          <p:cNvPr id="7" name="Down Arrow 6"/>
-          <p:cNvSpPr/>
-          <p:nvPr/>
-        </p:nvSpPr>
-        <p:spPr>
-          <a:xfrm rot="2359432">
-            <a:off x="3412305" y="1364714"/>
-            <a:ext cx="78921" cy="648072"/>
-          </a:xfrm>
-          <a:prstGeom prst="downArrow">
-            <a:avLst/>
-          </a:prstGeom>
-          <a:solidFill>
-            <a:srgbClr val="C00000"/>
-          </a:solidFill>
-          <a:ln>
-            <a:solidFill>
-              <a:srgbClr val="C00000"/>
-            </a:solidFill>
-          </a:ln>
-        </p:spPr>
-        <p:style>
-          <a:lnRef idx="2">
-            <a:schemeClr val="accent1">
-              <a:shade val="50000"/>
-            </a:schemeClr>
-          </a:lnRef>
-          <a:fillRef idx="1">
-            <a:schemeClr val="accent1"/>
-          </a:fillRef>
-          <a:effectRef idx="0">
-            <a:schemeClr val="accent1"/>
-          </a:effectRef>
-          <a:fontRef idx="minor">
-            <a:schemeClr val="lt1"/>
-          </a:fontRef>
-        </p:style>
-        <p:txBody>
-          <a:bodyPr rtlCol="0" anchor="ctr"/>
-          <a:lstStyle/>
-          <a:p>
-            <a:pPr algn="ctr"/>
-            <a:endParaRPr lang="en-US"/>
-          </a:p>
-        </p:txBody>
-      </p:sp>
     </p:spTree>
     <p:extLst>
       <p:ext uri="{BB962C8B-B14F-4D97-AF65-F5344CB8AC3E}">
-        <p14:creationId xmlns:p14="http://schemas.microsoft.com/office/powerpoint/2010/main" val="1076205338"/>
+        <p14:creationId xmlns:p14="http://schemas.microsoft.com/office/powerpoint/2010/main" val="3991602566"/>
       </p:ext>
     </p:extLst>
   </p:cSld>
@@ -5683,8 +5593,8 @@
         </p:blipFill>
         <p:spPr>
           <a:xfrm>
-            <a:off x="1828402" y="1587340"/>
-            <a:ext cx="2114403" cy="2004087"/>
+            <a:off x="765498" y="252214"/>
+            <a:ext cx="2304256" cy="1437726"/>
           </a:xfrm>
           <a:prstGeom prst="rect">
             <a:avLst/>
@@ -5707,8 +5617,8 @@
         </p:blipFill>
         <p:spPr>
           <a:xfrm>
-            <a:off x="117426" y="2556470"/>
-            <a:ext cx="1543407" cy="659164"/>
+            <a:off x="3357786" y="468238"/>
+            <a:ext cx="1924319" cy="657317"/>
           </a:xfrm>
           <a:prstGeom prst="rect">
             <a:avLst/>
@@ -5731,50 +5641,26 @@
         </p:blipFill>
         <p:spPr>
           <a:xfrm>
-            <a:off x="117426" y="1630585"/>
-            <a:ext cx="1639746" cy="720080"/>
+            <a:off x="693490" y="2052414"/>
+            <a:ext cx="6004768" cy="1296144"/>
           </a:xfrm>
           <a:prstGeom prst="rect">
             <a:avLst/>
           </a:prstGeom>
         </p:spPr>
       </p:pic>
-      <p:pic>
-        <p:nvPicPr>
-          <p:cNvPr id="5" name="Picture 4"/>
-          <p:cNvPicPr>
-            <a:picLocks noChangeAspect="1"/>
-          </p:cNvPicPr>
-          <p:nvPr/>
-        </p:nvPicPr>
-        <p:blipFill>
-          <a:blip r:embed="rId5"/>
-          <a:stretch>
-            <a:fillRect/>
-          </a:stretch>
-        </p:blipFill>
-        <p:spPr>
-          <a:xfrm>
-            <a:off x="2421682" y="252214"/>
-            <a:ext cx="944388" cy="936104"/>
-          </a:xfrm>
-          <a:prstGeom prst="rect">
-            <a:avLst/>
-          </a:prstGeom>
-        </p:spPr>
-      </p:pic>
-      <p:sp>
-        <p:nvSpPr>
-          <p:cNvPr id="6" name="Down Arrow 5"/>
+      <p:sp>
+        <p:nvSpPr>
+          <p:cNvPr id="6" name="Right Arrow 5"/>
           <p:cNvSpPr/>
           <p:nvPr/>
         </p:nvSpPr>
         <p:spPr>
-          <a:xfrm rot="2911873">
-            <a:off x="1814535" y="737494"/>
-            <a:ext cx="45719" cy="648072"/>
-          </a:xfrm>
-          <a:prstGeom prst="downArrow">
+          <a:xfrm>
+            <a:off x="2997746" y="796896"/>
+            <a:ext cx="216024" cy="45719"/>
+          </a:xfrm>
+          <a:prstGeom prst="rightArrow">
             <a:avLst/>
           </a:prstGeom>
           <a:solidFill>
@@ -5818,9 +5704,9 @@
           <p:nvPr/>
         </p:nvSpPr>
         <p:spPr>
-          <a:xfrm rot="18977060" flipH="1">
-            <a:off x="4159526" y="791930"/>
-            <a:ext cx="52045" cy="648072"/>
+          <a:xfrm rot="2359432">
+            <a:off x="3412305" y="1364714"/>
+            <a:ext cx="78921" cy="648072"/>
           </a:xfrm>
           <a:prstGeom prst="downArrow">
             <a:avLst/>
@@ -5859,82 +5745,10 @@
           </a:p>
         </p:txBody>
       </p:sp>
-      <p:pic>
-        <p:nvPicPr>
-          <p:cNvPr id="8" name="Picture 7"/>
-          <p:cNvPicPr>
-            <a:picLocks noChangeAspect="1"/>
-          </p:cNvPicPr>
-          <p:nvPr/>
-        </p:nvPicPr>
-        <p:blipFill>
-          <a:blip r:embed="rId6"/>
-          <a:stretch>
-            <a:fillRect/>
-          </a:stretch>
-        </p:blipFill>
-        <p:spPr>
-          <a:xfrm>
-            <a:off x="4083138" y="1681110"/>
-            <a:ext cx="2435300" cy="1941124"/>
-          </a:xfrm>
-          <a:prstGeom prst="rect">
-            <a:avLst/>
-          </a:prstGeom>
-        </p:spPr>
-      </p:pic>
-      <p:sp>
-        <p:nvSpPr>
-          <p:cNvPr id="9" name="Down Arrow 8"/>
-          <p:cNvSpPr/>
-          <p:nvPr/>
-        </p:nvSpPr>
-        <p:spPr>
-          <a:xfrm>
-            <a:off x="2853730" y="1260326"/>
-            <a:ext cx="45719" cy="216024"/>
-          </a:xfrm>
-          <a:prstGeom prst="downArrow">
-            <a:avLst/>
-          </a:prstGeom>
-          <a:solidFill>
-            <a:srgbClr val="C00000"/>
-          </a:solidFill>
-          <a:ln>
-            <a:solidFill>
-              <a:srgbClr val="C00000"/>
-            </a:solidFill>
-          </a:ln>
-        </p:spPr>
-        <p:style>
-          <a:lnRef idx="2">
-            <a:schemeClr val="accent1">
-              <a:shade val="50000"/>
-            </a:schemeClr>
-          </a:lnRef>
-          <a:fillRef idx="1">
-            <a:schemeClr val="accent1"/>
-          </a:fillRef>
-          <a:effectRef idx="0">
-            <a:schemeClr val="accent1"/>
-          </a:effectRef>
-          <a:fontRef idx="minor">
-            <a:schemeClr val="lt1"/>
-          </a:fontRef>
-        </p:style>
-        <p:txBody>
-          <a:bodyPr rtlCol="0" anchor="ctr"/>
-          <a:lstStyle/>
-          <a:p>
-            <a:pPr algn="ctr"/>
-            <a:endParaRPr lang="en-US"/>
-          </a:p>
-        </p:txBody>
-      </p:sp>
     </p:spTree>
     <p:extLst>
       <p:ext uri="{BB962C8B-B14F-4D97-AF65-F5344CB8AC3E}">
-        <p14:creationId xmlns:p14="http://schemas.microsoft.com/office/powerpoint/2010/main" val="2195075719"/>
+        <p14:creationId xmlns:p14="http://schemas.microsoft.com/office/powerpoint/2010/main" val="1076205338"/>
       </p:ext>
     </p:extLst>
   </p:cSld>
@@ -5961,10 +5775,274 @@
           <a:chExt cx="0" cy="0"/>
         </a:xfrm>
       </p:grpSpPr>
+      <p:pic>
+        <p:nvPicPr>
+          <p:cNvPr id="2" name="Picture 1"/>
+          <p:cNvPicPr>
+            <a:picLocks noChangeAspect="1"/>
+          </p:cNvPicPr>
+          <p:nvPr/>
+        </p:nvPicPr>
+        <p:blipFill>
+          <a:blip r:embed="rId2"/>
+          <a:stretch>
+            <a:fillRect/>
+          </a:stretch>
+        </p:blipFill>
+        <p:spPr>
+          <a:xfrm>
+            <a:off x="1828402" y="1587340"/>
+            <a:ext cx="2114403" cy="2004087"/>
+          </a:xfrm>
+          <a:prstGeom prst="rect">
+            <a:avLst/>
+          </a:prstGeom>
+        </p:spPr>
+      </p:pic>
+      <p:pic>
+        <p:nvPicPr>
+          <p:cNvPr id="3" name="Picture 2"/>
+          <p:cNvPicPr>
+            <a:picLocks noChangeAspect="1"/>
+          </p:cNvPicPr>
+          <p:nvPr/>
+        </p:nvPicPr>
+        <p:blipFill>
+          <a:blip r:embed="rId3"/>
+          <a:stretch>
+            <a:fillRect/>
+          </a:stretch>
+        </p:blipFill>
+        <p:spPr>
+          <a:xfrm>
+            <a:off x="117426" y="2556470"/>
+            <a:ext cx="1543407" cy="659164"/>
+          </a:xfrm>
+          <a:prstGeom prst="rect">
+            <a:avLst/>
+          </a:prstGeom>
+        </p:spPr>
+      </p:pic>
+      <p:pic>
+        <p:nvPicPr>
+          <p:cNvPr id="4" name="Picture 3"/>
+          <p:cNvPicPr>
+            <a:picLocks noChangeAspect="1"/>
+          </p:cNvPicPr>
+          <p:nvPr/>
+        </p:nvPicPr>
+        <p:blipFill>
+          <a:blip r:embed="rId4"/>
+          <a:stretch>
+            <a:fillRect/>
+          </a:stretch>
+        </p:blipFill>
+        <p:spPr>
+          <a:xfrm>
+            <a:off x="117426" y="1630585"/>
+            <a:ext cx="1639746" cy="720080"/>
+          </a:xfrm>
+          <a:prstGeom prst="rect">
+            <a:avLst/>
+          </a:prstGeom>
+        </p:spPr>
+      </p:pic>
+      <p:pic>
+        <p:nvPicPr>
+          <p:cNvPr id="5" name="Picture 4"/>
+          <p:cNvPicPr>
+            <a:picLocks noChangeAspect="1"/>
+          </p:cNvPicPr>
+          <p:nvPr/>
+        </p:nvPicPr>
+        <p:blipFill>
+          <a:blip r:embed="rId5"/>
+          <a:stretch>
+            <a:fillRect/>
+          </a:stretch>
+        </p:blipFill>
+        <p:spPr>
+          <a:xfrm>
+            <a:off x="2421682" y="252214"/>
+            <a:ext cx="944388" cy="936104"/>
+          </a:xfrm>
+          <a:prstGeom prst="rect">
+            <a:avLst/>
+          </a:prstGeom>
+        </p:spPr>
+      </p:pic>
+      <p:sp>
+        <p:nvSpPr>
+          <p:cNvPr id="6" name="Down Arrow 5"/>
+          <p:cNvSpPr/>
+          <p:nvPr/>
+        </p:nvSpPr>
+        <p:spPr>
+          <a:xfrm rot="2911873">
+            <a:off x="1814535" y="737494"/>
+            <a:ext cx="45719" cy="648072"/>
+          </a:xfrm>
+          <a:prstGeom prst="downArrow">
+            <a:avLst/>
+          </a:prstGeom>
+          <a:solidFill>
+            <a:srgbClr val="C00000"/>
+          </a:solidFill>
+          <a:ln>
+            <a:solidFill>
+              <a:srgbClr val="C00000"/>
+            </a:solidFill>
+          </a:ln>
+        </p:spPr>
+        <p:style>
+          <a:lnRef idx="2">
+            <a:schemeClr val="accent1">
+              <a:shade val="50000"/>
+            </a:schemeClr>
+          </a:lnRef>
+          <a:fillRef idx="1">
+            <a:schemeClr val="accent1"/>
+          </a:fillRef>
+          <a:effectRef idx="0">
+            <a:schemeClr val="accent1"/>
+          </a:effectRef>
+          <a:fontRef idx="minor">
+            <a:schemeClr val="lt1"/>
+          </a:fontRef>
+        </p:style>
+        <p:txBody>
+          <a:bodyPr rtlCol="0" anchor="ctr"/>
+          <a:lstStyle/>
+          <a:p>
+            <a:pPr algn="ctr"/>
+            <a:endParaRPr lang="en-US"/>
+          </a:p>
+        </p:txBody>
+      </p:sp>
+      <p:sp>
+        <p:nvSpPr>
+          <p:cNvPr id="7" name="Down Arrow 6"/>
+          <p:cNvSpPr/>
+          <p:nvPr/>
+        </p:nvSpPr>
+        <p:spPr>
+          <a:xfrm rot="18977060" flipH="1">
+            <a:off x="4159526" y="791930"/>
+            <a:ext cx="52045" cy="648072"/>
+          </a:xfrm>
+          <a:prstGeom prst="downArrow">
+            <a:avLst/>
+          </a:prstGeom>
+          <a:solidFill>
+            <a:srgbClr val="C00000"/>
+          </a:solidFill>
+          <a:ln>
+            <a:solidFill>
+              <a:srgbClr val="C00000"/>
+            </a:solidFill>
+          </a:ln>
+        </p:spPr>
+        <p:style>
+          <a:lnRef idx="2">
+            <a:schemeClr val="accent1">
+              <a:shade val="50000"/>
+            </a:schemeClr>
+          </a:lnRef>
+          <a:fillRef idx="1">
+            <a:schemeClr val="accent1"/>
+          </a:fillRef>
+          <a:effectRef idx="0">
+            <a:schemeClr val="accent1"/>
+          </a:effectRef>
+          <a:fontRef idx="minor">
+            <a:schemeClr val="lt1"/>
+          </a:fontRef>
+        </p:style>
+        <p:txBody>
+          <a:bodyPr rtlCol="0" anchor="ctr"/>
+          <a:lstStyle/>
+          <a:p>
+            <a:pPr algn="ctr"/>
+            <a:endParaRPr lang="en-US"/>
+          </a:p>
+        </p:txBody>
+      </p:sp>
+      <p:pic>
+        <p:nvPicPr>
+          <p:cNvPr id="8" name="Picture 7"/>
+          <p:cNvPicPr>
+            <a:picLocks noChangeAspect="1"/>
+          </p:cNvPicPr>
+          <p:nvPr/>
+        </p:nvPicPr>
+        <p:blipFill>
+          <a:blip r:embed="rId6"/>
+          <a:stretch>
+            <a:fillRect/>
+          </a:stretch>
+        </p:blipFill>
+        <p:spPr>
+          <a:xfrm>
+            <a:off x="4083138" y="1681110"/>
+            <a:ext cx="2435300" cy="1941124"/>
+          </a:xfrm>
+          <a:prstGeom prst="rect">
+            <a:avLst/>
+          </a:prstGeom>
+        </p:spPr>
+      </p:pic>
+      <p:sp>
+        <p:nvSpPr>
+          <p:cNvPr id="9" name="Down Arrow 8"/>
+          <p:cNvSpPr/>
+          <p:nvPr/>
+        </p:nvSpPr>
+        <p:spPr>
+          <a:xfrm>
+            <a:off x="2853730" y="1260326"/>
+            <a:ext cx="45719" cy="216024"/>
+          </a:xfrm>
+          <a:prstGeom prst="downArrow">
+            <a:avLst/>
+          </a:prstGeom>
+          <a:solidFill>
+            <a:srgbClr val="C00000"/>
+          </a:solidFill>
+          <a:ln>
+            <a:solidFill>
+              <a:srgbClr val="C00000"/>
+            </a:solidFill>
+          </a:ln>
+        </p:spPr>
+        <p:style>
+          <a:lnRef idx="2">
+            <a:schemeClr val="accent1">
+              <a:shade val="50000"/>
+            </a:schemeClr>
+          </a:lnRef>
+          <a:fillRef idx="1">
+            <a:schemeClr val="accent1"/>
+          </a:fillRef>
+          <a:effectRef idx="0">
+            <a:schemeClr val="accent1"/>
+          </a:effectRef>
+          <a:fontRef idx="minor">
+            <a:schemeClr val="lt1"/>
+          </a:fontRef>
+        </p:style>
+        <p:txBody>
+          <a:bodyPr rtlCol="0" anchor="ctr"/>
+          <a:lstStyle/>
+          <a:p>
+            <a:pPr algn="ctr"/>
+            <a:endParaRPr lang="en-US"/>
+          </a:p>
+        </p:txBody>
+      </p:sp>
     </p:spTree>
     <p:extLst>
       <p:ext uri="{BB962C8B-B14F-4D97-AF65-F5344CB8AC3E}">
-        <p14:creationId xmlns:p14="http://schemas.microsoft.com/office/powerpoint/2010/main" val="1715019270"/>
+        <p14:creationId xmlns:p14="http://schemas.microsoft.com/office/powerpoint/2010/main" val="2195075719"/>
       </p:ext>
     </p:extLst>
   </p:cSld>
@@ -6107,6 +6185,664 @@
       </p:par>
     </p:tnLst>
   </p:timing>
+</p:sld>
+</file>
+
+<file path=ppt/slides/slide30.xml><?xml version="1.0" encoding="utf-8"?>
+<p:sld xmlns:a="http://schemas.openxmlformats.org/drawingml/2006/main" xmlns:r="http://schemas.openxmlformats.org/officeDocument/2006/relationships" xmlns:p="http://schemas.openxmlformats.org/presentationml/2006/main">
+  <p:cSld>
+    <p:spTree>
+      <p:nvGrpSpPr>
+        <p:cNvPr id="1" name=""/>
+        <p:cNvGrpSpPr/>
+        <p:nvPr/>
+      </p:nvGrpSpPr>
+      <p:grpSpPr>
+        <a:xfrm>
+          <a:off x="0" y="0"/>
+          <a:ext cx="0" cy="0"/>
+          <a:chOff x="0" y="0"/>
+          <a:chExt cx="0" cy="0"/>
+        </a:xfrm>
+      </p:grpSpPr>
+      <p:pic>
+        <p:nvPicPr>
+          <p:cNvPr id="2" name="Picture 1"/>
+          <p:cNvPicPr>
+            <a:picLocks noChangeAspect="1"/>
+          </p:cNvPicPr>
+          <p:nvPr/>
+        </p:nvPicPr>
+        <p:blipFill>
+          <a:blip r:embed="rId2"/>
+          <a:stretch>
+            <a:fillRect/>
+          </a:stretch>
+        </p:blipFill>
+        <p:spPr>
+          <a:xfrm>
+            <a:off x="333450" y="108198"/>
+            <a:ext cx="3786860" cy="3456384"/>
+          </a:xfrm>
+          <a:prstGeom prst="rect">
+            <a:avLst/>
+          </a:prstGeom>
+        </p:spPr>
+      </p:pic>
+      <p:pic>
+        <p:nvPicPr>
+          <p:cNvPr id="4" name="Picture 3"/>
+          <p:cNvPicPr>
+            <a:picLocks noChangeAspect="1"/>
+          </p:cNvPicPr>
+          <p:nvPr/>
+        </p:nvPicPr>
+        <p:blipFill>
+          <a:blip r:embed="rId3"/>
+          <a:stretch>
+            <a:fillRect/>
+          </a:stretch>
+        </p:blipFill>
+        <p:spPr>
+          <a:xfrm>
+            <a:off x="4509914" y="99872"/>
+            <a:ext cx="1018942" cy="3228857"/>
+          </a:xfrm>
+          <a:prstGeom prst="rect">
+            <a:avLst/>
+          </a:prstGeom>
+        </p:spPr>
+      </p:pic>
+      <p:sp>
+        <p:nvSpPr>
+          <p:cNvPr id="5" name="Rectangle 4"/>
+          <p:cNvSpPr/>
+          <p:nvPr/>
+        </p:nvSpPr>
+        <p:spPr>
+          <a:xfrm>
+            <a:off x="693490" y="684262"/>
+            <a:ext cx="2376264" cy="216024"/>
+          </a:xfrm>
+          <a:prstGeom prst="rect">
+            <a:avLst/>
+          </a:prstGeom>
+          <a:noFill/>
+          <a:ln w="19050">
+            <a:solidFill>
+              <a:srgbClr val="C00000"/>
+            </a:solidFill>
+          </a:ln>
+        </p:spPr>
+        <p:style>
+          <a:lnRef idx="2">
+            <a:schemeClr val="accent1">
+              <a:shade val="50000"/>
+            </a:schemeClr>
+          </a:lnRef>
+          <a:fillRef idx="1">
+            <a:schemeClr val="accent1"/>
+          </a:fillRef>
+          <a:effectRef idx="0">
+            <a:schemeClr val="accent1"/>
+          </a:effectRef>
+          <a:fontRef idx="minor">
+            <a:schemeClr val="lt1"/>
+          </a:fontRef>
+        </p:style>
+        <p:txBody>
+          <a:bodyPr rtlCol="0" anchor="ctr"/>
+          <a:lstStyle/>
+          <a:p>
+            <a:pPr algn="ctr"/>
+            <a:endParaRPr lang="en-US"/>
+          </a:p>
+        </p:txBody>
+      </p:sp>
+      <p:sp>
+        <p:nvSpPr>
+          <p:cNvPr id="7" name="Rectangle 6"/>
+          <p:cNvSpPr/>
+          <p:nvPr/>
+        </p:nvSpPr>
+        <p:spPr>
+          <a:xfrm>
+            <a:off x="4437906" y="1620366"/>
+            <a:ext cx="1090950" cy="216024"/>
+          </a:xfrm>
+          <a:prstGeom prst="rect">
+            <a:avLst/>
+          </a:prstGeom>
+          <a:noFill/>
+          <a:ln w="19050">
+            <a:solidFill>
+              <a:srgbClr val="C00000"/>
+            </a:solidFill>
+          </a:ln>
+        </p:spPr>
+        <p:style>
+          <a:lnRef idx="2">
+            <a:schemeClr val="accent1">
+              <a:shade val="50000"/>
+            </a:schemeClr>
+          </a:lnRef>
+          <a:fillRef idx="1">
+            <a:schemeClr val="accent1"/>
+          </a:fillRef>
+          <a:effectRef idx="0">
+            <a:schemeClr val="accent1"/>
+          </a:effectRef>
+          <a:fontRef idx="minor">
+            <a:schemeClr val="lt1"/>
+          </a:fontRef>
+        </p:style>
+        <p:txBody>
+          <a:bodyPr rtlCol="0" anchor="ctr"/>
+          <a:lstStyle/>
+          <a:p>
+            <a:pPr algn="ctr"/>
+            <a:endParaRPr lang="en-US"/>
+          </a:p>
+        </p:txBody>
+      </p:sp>
+    </p:spTree>
+    <p:extLst>
+      <p:ext uri="{BB962C8B-B14F-4D97-AF65-F5344CB8AC3E}">
+        <p14:creationId xmlns:p14="http://schemas.microsoft.com/office/powerpoint/2010/main" val="2648858707"/>
+      </p:ext>
+    </p:extLst>
+  </p:cSld>
+  <p:clrMapOvr>
+    <a:masterClrMapping/>
+  </p:clrMapOvr>
+</p:sld>
+</file>
+
+<file path=ppt/slides/slide31.xml><?xml version="1.0" encoding="utf-8"?>
+<p:sld xmlns:a="http://schemas.openxmlformats.org/drawingml/2006/main" xmlns:r="http://schemas.openxmlformats.org/officeDocument/2006/relationships" xmlns:p="http://schemas.openxmlformats.org/presentationml/2006/main">
+  <p:cSld>
+    <p:spTree>
+      <p:nvGrpSpPr>
+        <p:cNvPr id="1" name=""/>
+        <p:cNvGrpSpPr/>
+        <p:nvPr/>
+      </p:nvGrpSpPr>
+      <p:grpSpPr>
+        <a:xfrm>
+          <a:off x="0" y="0"/>
+          <a:ext cx="0" cy="0"/>
+          <a:chOff x="0" y="0"/>
+          <a:chExt cx="0" cy="0"/>
+        </a:xfrm>
+      </p:grpSpPr>
+      <p:pic>
+        <p:nvPicPr>
+          <p:cNvPr id="2" name="Picture 1"/>
+          <p:cNvPicPr>
+            <a:picLocks noChangeAspect="1"/>
+          </p:cNvPicPr>
+          <p:nvPr/>
+        </p:nvPicPr>
+        <p:blipFill>
+          <a:blip r:embed="rId2"/>
+          <a:stretch>
+            <a:fillRect/>
+          </a:stretch>
+        </p:blipFill>
+        <p:spPr>
+          <a:xfrm>
+            <a:off x="621482" y="396230"/>
+            <a:ext cx="4253634" cy="3348944"/>
+          </a:xfrm>
+          <a:prstGeom prst="rect">
+            <a:avLst/>
+          </a:prstGeom>
+        </p:spPr>
+      </p:pic>
+      <p:pic>
+        <p:nvPicPr>
+          <p:cNvPr id="3" name="Picture 2"/>
+          <p:cNvPicPr>
+            <a:picLocks noChangeAspect="1"/>
+          </p:cNvPicPr>
+          <p:nvPr/>
+        </p:nvPicPr>
+        <p:blipFill>
+          <a:blip r:embed="rId3"/>
+          <a:stretch>
+            <a:fillRect/>
+          </a:stretch>
+        </p:blipFill>
+        <p:spPr>
+          <a:xfrm>
+            <a:off x="4653930" y="540246"/>
+            <a:ext cx="1368152" cy="583967"/>
+          </a:xfrm>
+          <a:prstGeom prst="rect">
+            <a:avLst/>
+          </a:prstGeom>
+        </p:spPr>
+      </p:pic>
+      <p:sp>
+        <p:nvSpPr>
+          <p:cNvPr id="4" name="Right Arrow 3"/>
+          <p:cNvSpPr/>
+          <p:nvPr/>
+        </p:nvSpPr>
+        <p:spPr>
+          <a:xfrm>
+            <a:off x="4005858" y="756270"/>
+            <a:ext cx="576064" cy="72008"/>
+          </a:xfrm>
+          <a:prstGeom prst="rightArrow">
+            <a:avLst/>
+          </a:prstGeom>
+          <a:solidFill>
+            <a:srgbClr val="C00000"/>
+          </a:solidFill>
+          <a:ln>
+            <a:solidFill>
+              <a:srgbClr val="C00000"/>
+            </a:solidFill>
+          </a:ln>
+        </p:spPr>
+        <p:style>
+          <a:lnRef idx="2">
+            <a:schemeClr val="accent1">
+              <a:shade val="50000"/>
+            </a:schemeClr>
+          </a:lnRef>
+          <a:fillRef idx="1">
+            <a:schemeClr val="accent1"/>
+          </a:fillRef>
+          <a:effectRef idx="0">
+            <a:schemeClr val="accent1"/>
+          </a:effectRef>
+          <a:fontRef idx="minor">
+            <a:schemeClr val="lt1"/>
+          </a:fontRef>
+        </p:style>
+        <p:txBody>
+          <a:bodyPr rtlCol="0" anchor="ctr"/>
+          <a:lstStyle/>
+          <a:p>
+            <a:pPr algn="ctr"/>
+            <a:endParaRPr lang="en-US"/>
+          </a:p>
+        </p:txBody>
+      </p:sp>
+    </p:spTree>
+    <p:extLst>
+      <p:ext uri="{BB962C8B-B14F-4D97-AF65-F5344CB8AC3E}">
+        <p14:creationId xmlns:p14="http://schemas.microsoft.com/office/powerpoint/2010/main" val="1715019270"/>
+      </p:ext>
+    </p:extLst>
+  </p:cSld>
+  <p:clrMapOvr>
+    <a:masterClrMapping/>
+  </p:clrMapOvr>
+</p:sld>
+</file>
+
+<file path=ppt/slides/slide32.xml><?xml version="1.0" encoding="utf-8"?>
+<p:sld xmlns:a="http://schemas.openxmlformats.org/drawingml/2006/main" xmlns:r="http://schemas.openxmlformats.org/officeDocument/2006/relationships" xmlns:p="http://schemas.openxmlformats.org/presentationml/2006/main">
+  <p:cSld>
+    <p:spTree>
+      <p:nvGrpSpPr>
+        <p:cNvPr id="1" name=""/>
+        <p:cNvGrpSpPr/>
+        <p:nvPr/>
+      </p:nvGrpSpPr>
+      <p:grpSpPr>
+        <a:xfrm>
+          <a:off x="0" y="0"/>
+          <a:ext cx="0" cy="0"/>
+          <a:chOff x="0" y="0"/>
+          <a:chExt cx="0" cy="0"/>
+        </a:xfrm>
+      </p:grpSpPr>
+      <p:pic>
+        <p:nvPicPr>
+          <p:cNvPr id="2" name="Picture 1"/>
+          <p:cNvPicPr>
+            <a:picLocks noChangeAspect="1"/>
+          </p:cNvPicPr>
+          <p:nvPr/>
+        </p:nvPicPr>
+        <p:blipFill>
+          <a:blip r:embed="rId2"/>
+          <a:stretch>
+            <a:fillRect/>
+          </a:stretch>
+        </p:blipFill>
+        <p:spPr>
+          <a:xfrm>
+            <a:off x="2349674" y="612254"/>
+            <a:ext cx="1742688" cy="3092417"/>
+          </a:xfrm>
+          <a:prstGeom prst="rect">
+            <a:avLst/>
+          </a:prstGeom>
+        </p:spPr>
+      </p:pic>
+    </p:spTree>
+    <p:extLst>
+      <p:ext uri="{BB962C8B-B14F-4D97-AF65-F5344CB8AC3E}">
+        <p14:creationId xmlns:p14="http://schemas.microsoft.com/office/powerpoint/2010/main" val="660699296"/>
+      </p:ext>
+    </p:extLst>
+  </p:cSld>
+  <p:clrMapOvr>
+    <a:masterClrMapping/>
+  </p:clrMapOvr>
+</p:sld>
+</file>
+
+<file path=ppt/slides/slide33.xml><?xml version="1.0" encoding="utf-8"?>
+<p:sld xmlns:a="http://schemas.openxmlformats.org/drawingml/2006/main" xmlns:r="http://schemas.openxmlformats.org/officeDocument/2006/relationships" xmlns:p="http://schemas.openxmlformats.org/presentationml/2006/main">
+  <p:cSld>
+    <p:spTree>
+      <p:nvGrpSpPr>
+        <p:cNvPr id="1" name=""/>
+        <p:cNvGrpSpPr/>
+        <p:nvPr/>
+      </p:nvGrpSpPr>
+      <p:grpSpPr>
+        <a:xfrm>
+          <a:off x="0" y="0"/>
+          <a:ext cx="0" cy="0"/>
+          <a:chOff x="0" y="0"/>
+          <a:chExt cx="0" cy="0"/>
+        </a:xfrm>
+      </p:grpSpPr>
+      <p:pic>
+        <p:nvPicPr>
+          <p:cNvPr id="2" name="Picture 1"/>
+          <p:cNvPicPr>
+            <a:picLocks noChangeAspect="1"/>
+          </p:cNvPicPr>
+          <p:nvPr/>
+        </p:nvPicPr>
+        <p:blipFill>
+          <a:blip r:embed="rId2"/>
+          <a:stretch>
+            <a:fillRect/>
+          </a:stretch>
+        </p:blipFill>
+        <p:spPr>
+          <a:xfrm>
+            <a:off x="1701602" y="252214"/>
+            <a:ext cx="3054407" cy="3096344"/>
+          </a:xfrm>
+          <a:prstGeom prst="rect">
+            <a:avLst/>
+          </a:prstGeom>
+        </p:spPr>
+      </p:pic>
+    </p:spTree>
+    <p:extLst>
+      <p:ext uri="{BB962C8B-B14F-4D97-AF65-F5344CB8AC3E}">
+        <p14:creationId xmlns:p14="http://schemas.microsoft.com/office/powerpoint/2010/main" val="1423171061"/>
+      </p:ext>
+    </p:extLst>
+  </p:cSld>
+  <p:clrMapOvr>
+    <a:masterClrMapping/>
+  </p:clrMapOvr>
+</p:sld>
+</file>
+
+<file path=ppt/slides/slide34.xml><?xml version="1.0" encoding="utf-8"?>
+<p:sld xmlns:a="http://schemas.openxmlformats.org/drawingml/2006/main" xmlns:r="http://schemas.openxmlformats.org/officeDocument/2006/relationships" xmlns:p="http://schemas.openxmlformats.org/presentationml/2006/main">
+  <p:cSld>
+    <p:spTree>
+      <p:nvGrpSpPr>
+        <p:cNvPr id="1" name=""/>
+        <p:cNvGrpSpPr/>
+        <p:nvPr/>
+      </p:nvGrpSpPr>
+      <p:grpSpPr>
+        <a:xfrm>
+          <a:off x="0" y="0"/>
+          <a:ext cx="0" cy="0"/>
+          <a:chOff x="0" y="0"/>
+          <a:chExt cx="0" cy="0"/>
+        </a:xfrm>
+      </p:grpSpPr>
+      <p:pic>
+        <p:nvPicPr>
+          <p:cNvPr id="2" name="Picture 1"/>
+          <p:cNvPicPr>
+            <a:picLocks noChangeAspect="1"/>
+          </p:cNvPicPr>
+          <p:nvPr/>
+        </p:nvPicPr>
+        <p:blipFill>
+          <a:blip r:embed="rId2"/>
+          <a:stretch>
+            <a:fillRect/>
+          </a:stretch>
+        </p:blipFill>
+        <p:spPr>
+          <a:xfrm>
+            <a:off x="45419" y="180207"/>
+            <a:ext cx="6408712" cy="1161640"/>
+          </a:xfrm>
+          <a:prstGeom prst="rect">
+            <a:avLst/>
+          </a:prstGeom>
+        </p:spPr>
+      </p:pic>
+      <p:pic>
+        <p:nvPicPr>
+          <p:cNvPr id="3" name="Picture 2"/>
+          <p:cNvPicPr>
+            <a:picLocks noChangeAspect="1"/>
+          </p:cNvPicPr>
+          <p:nvPr/>
+        </p:nvPicPr>
+        <p:blipFill>
+          <a:blip r:embed="rId3"/>
+          <a:stretch>
+            <a:fillRect/>
+          </a:stretch>
+        </p:blipFill>
+        <p:spPr>
+          <a:xfrm>
+            <a:off x="35733" y="1404342"/>
+            <a:ext cx="3165769" cy="1277925"/>
+          </a:xfrm>
+          <a:prstGeom prst="rect">
+            <a:avLst/>
+          </a:prstGeom>
+        </p:spPr>
+      </p:pic>
+      <p:pic>
+        <p:nvPicPr>
+          <p:cNvPr id="4" name="Picture 3"/>
+          <p:cNvPicPr>
+            <a:picLocks noChangeAspect="1"/>
+          </p:cNvPicPr>
+          <p:nvPr/>
+        </p:nvPicPr>
+        <p:blipFill>
+          <a:blip r:embed="rId4"/>
+          <a:stretch>
+            <a:fillRect/>
+          </a:stretch>
+        </p:blipFill>
+        <p:spPr>
+          <a:xfrm>
+            <a:off x="117426" y="2844502"/>
+            <a:ext cx="4668730" cy="874559"/>
+          </a:xfrm>
+          <a:prstGeom prst="rect">
+            <a:avLst/>
+          </a:prstGeom>
+        </p:spPr>
+      </p:pic>
+      <p:pic>
+        <p:nvPicPr>
+          <p:cNvPr id="5" name="Picture 4"/>
+          <p:cNvPicPr>
+            <a:picLocks noChangeAspect="1"/>
+          </p:cNvPicPr>
+          <p:nvPr/>
+        </p:nvPicPr>
+        <p:blipFill>
+          <a:blip r:embed="rId5"/>
+          <a:stretch>
+            <a:fillRect/>
+          </a:stretch>
+        </p:blipFill>
+        <p:spPr>
+          <a:xfrm>
+            <a:off x="-1666793" y="-682203"/>
+            <a:ext cx="10193173" cy="5325218"/>
+          </a:xfrm>
+          <a:prstGeom prst="rect">
+            <a:avLst/>
+          </a:prstGeom>
+        </p:spPr>
+      </p:pic>
+    </p:spTree>
+    <p:extLst>
+      <p:ext uri="{BB962C8B-B14F-4D97-AF65-F5344CB8AC3E}">
+        <p14:creationId xmlns:p14="http://schemas.microsoft.com/office/powerpoint/2010/main" val="487888566"/>
+      </p:ext>
+    </p:extLst>
+  </p:cSld>
+  <p:clrMapOvr>
+    <a:masterClrMapping/>
+  </p:clrMapOvr>
+</p:sld>
+</file>
+
+<file path=ppt/slides/slide35.xml><?xml version="1.0" encoding="utf-8"?>
+<p:sld xmlns:a="http://schemas.openxmlformats.org/drawingml/2006/main" xmlns:r="http://schemas.openxmlformats.org/officeDocument/2006/relationships" xmlns:p="http://schemas.openxmlformats.org/presentationml/2006/main">
+  <p:cSld>
+    <p:spTree>
+      <p:nvGrpSpPr>
+        <p:cNvPr id="1" name=""/>
+        <p:cNvGrpSpPr/>
+        <p:nvPr/>
+      </p:nvGrpSpPr>
+      <p:grpSpPr>
+        <a:xfrm>
+          <a:off x="0" y="0"/>
+          <a:ext cx="0" cy="0"/>
+          <a:chOff x="0" y="0"/>
+          <a:chExt cx="0" cy="0"/>
+        </a:xfrm>
+      </p:grpSpPr>
+      <p:pic>
+        <p:nvPicPr>
+          <p:cNvPr id="2" name="Picture 1"/>
+          <p:cNvPicPr>
+            <a:picLocks noChangeAspect="1"/>
+          </p:cNvPicPr>
+          <p:nvPr/>
+        </p:nvPicPr>
+        <p:blipFill>
+          <a:blip r:embed="rId2"/>
+          <a:stretch>
+            <a:fillRect/>
+          </a:stretch>
+        </p:blipFill>
+        <p:spPr>
+          <a:xfrm>
+            <a:off x="1125538" y="1728565"/>
+            <a:ext cx="4272819" cy="2232248"/>
+          </a:xfrm>
+          <a:prstGeom prst="rect">
+            <a:avLst/>
+          </a:prstGeom>
+          <a:noFill/>
+          <a:ln>
+            <a:noFill/>
+          </a:ln>
+        </p:spPr>
+      </p:pic>
+      <p:pic>
+        <p:nvPicPr>
+          <p:cNvPr id="3" name="Picture 2"/>
+          <p:cNvPicPr>
+            <a:picLocks noChangeAspect="1"/>
+          </p:cNvPicPr>
+          <p:nvPr/>
+        </p:nvPicPr>
+        <p:blipFill>
+          <a:blip r:embed="rId3"/>
+          <a:stretch>
+            <a:fillRect/>
+          </a:stretch>
+        </p:blipFill>
+        <p:spPr>
+          <a:xfrm>
+            <a:off x="1" y="4083"/>
+            <a:ext cx="6814170" cy="1483337"/>
+          </a:xfrm>
+          <a:prstGeom prst="rect">
+            <a:avLst/>
+          </a:prstGeom>
+        </p:spPr>
+      </p:pic>
+      <p:sp>
+        <p:nvSpPr>
+          <p:cNvPr id="4" name="Rectangle 3"/>
+          <p:cNvSpPr/>
+          <p:nvPr/>
+        </p:nvSpPr>
+        <p:spPr>
+          <a:xfrm>
+            <a:off x="4437906" y="4083"/>
+            <a:ext cx="432048" cy="1400259"/>
+          </a:xfrm>
+          <a:prstGeom prst="rect">
+            <a:avLst/>
+          </a:prstGeom>
+          <a:noFill/>
+          <a:ln>
+            <a:solidFill>
+              <a:srgbClr val="C00000"/>
+            </a:solidFill>
+          </a:ln>
+        </p:spPr>
+        <p:style>
+          <a:lnRef idx="2">
+            <a:schemeClr val="accent1">
+              <a:shade val="50000"/>
+            </a:schemeClr>
+          </a:lnRef>
+          <a:fillRef idx="1">
+            <a:schemeClr val="accent1"/>
+          </a:fillRef>
+          <a:effectRef idx="0">
+            <a:schemeClr val="accent1"/>
+          </a:effectRef>
+          <a:fontRef idx="minor">
+            <a:schemeClr val="lt1"/>
+          </a:fontRef>
+        </p:style>
+        <p:txBody>
+          <a:bodyPr rtlCol="0" anchor="ctr"/>
+          <a:lstStyle/>
+          <a:p>
+            <a:pPr algn="ctr"/>
+            <a:endParaRPr lang="en-US"/>
+          </a:p>
+        </p:txBody>
+      </p:sp>
+    </p:spTree>
+    <p:extLst>
+      <p:ext uri="{BB962C8B-B14F-4D97-AF65-F5344CB8AC3E}">
+        <p14:creationId xmlns:p14="http://schemas.microsoft.com/office/powerpoint/2010/main" val="2318347098"/>
+      </p:ext>
+    </p:extLst>
+  </p:cSld>
+  <p:clrMapOvr>
+    <a:masterClrMapping/>
+  </p:clrMapOvr>
 </p:sld>
 </file>
 

</xml_diff>